<commit_message>
minor update on kublet
</commit_message>
<xml_diff>
--- a/kubernetes/01_k8s_core_components.pptx
+++ b/kubernetes/01_k8s_core_components.pptx
@@ -10427,7 +10427,7 @@
         </p:nvSpPr>
         <p:spPr>
           <a:xfrm>
-            <a:off x="504000" y="1124700"/>
+            <a:off x="504000" y="987540"/>
             <a:ext cx="8159939" cy="4727460"/>
           </a:xfrm>
         </p:spPr>
@@ -10478,6 +10478,13 @@
             </a:r>
           </a:p>
           <a:p>
+            <a:pPr lvl="1"/>
+            <a:r>
+              <a:rPr lang="en-US" dirty="0"/>
+              <a:t>Actually starts containers</a:t>
+            </a:r>
+          </a:p>
+          <a:p>
             <a:r>
               <a:rPr lang="en-US" dirty="0" err="1"/>
               <a:t>kube</a:t>
@@ -10530,7 +10537,7 @@
             <a:pPr lvl="1"/>
             <a:r>
               <a:rPr lang="en-US" dirty="0"/>
-              <a:t>A schedulable resource that is managed by </a:t>
+              <a:t>A the smallest, schedulable resource that is managed by </a:t>
             </a:r>
             <a:r>
               <a:rPr lang="en-US" dirty="0" err="1"/>
@@ -10539,6 +10546,21 @@
             <a:r>
               <a:rPr lang="en-US" dirty="0"/>
               <a:t> on the node</a:t>
+            </a:r>
+          </a:p>
+          <a:p>
+            <a:pPr lvl="1"/>
+            <a:r>
+              <a:rPr lang="en-US" dirty="0"/>
+              <a:t>Pods wrap around one or more (</a:t>
+            </a:r>
+            <a:r>
+              <a:rPr lang="en-US" dirty="0" err="1"/>
+              <a:t>docker</a:t>
+            </a:r>
+            <a:r>
+              <a:rPr lang="en-US" dirty="0"/>
+              <a:t>) containers</a:t>
             </a:r>
           </a:p>
         </p:txBody>

</xml_diff>

<commit_message>
fixed typo with pod description
</commit_message>
<xml_diff>
--- a/kubernetes/01_k8s_core_components.pptx
+++ b/kubernetes/01_k8s_core_components.pptx
@@ -14086,8 +14086,12 @@
           <a:p>
             <a:pPr lvl="1"/>
             <a:r>
-              <a:rPr lang="en-US" dirty="0"/>
-              <a:t>A the smallest, schedulable resource that is managed by </a:t>
+              <a:rPr lang="en-US"/>
+              <a:t>The </a:t>
+            </a:r>
+            <a:r>
+              <a:rPr lang="en-US" dirty="0"/>
+              <a:t>smallest, schedulable resource that is managed by </a:t>
             </a:r>
             <a:r>
               <a:rPr lang="en-US" dirty="0" err="1"/>

</xml_diff>

<commit_message>
updated landscape diagram with gardener
</commit_message>
<xml_diff>
--- a/kubernetes/01_k8s_core_components.pptx
+++ b/kubernetes/01_k8s_core_components.pptx
@@ -198,6 +198,10 @@
 </p:presentation>
 </file>
 
+<file path=ppt/revisionInfo.xml><?xml version="1.0" encoding="utf-8"?>
+<p1510:revInfo xmlns:a="http://schemas.openxmlformats.org/drawingml/2006/main" xmlns:r="http://schemas.openxmlformats.org/officeDocument/2006/relationships" xmlns:p1510="http://schemas.microsoft.com/office/powerpoint/2015/10/main"/>
+</file>
+
 <file path=ppt/handoutMasters/handoutMaster1.xml><?xml version="1.0" encoding="utf-8"?>
 <p:handoutMaster xmlns:a="http://schemas.openxmlformats.org/drawingml/2006/main" xmlns:r="http://schemas.openxmlformats.org/officeDocument/2006/relationships" xmlns:p="http://schemas.openxmlformats.org/presentationml/2006/main">
   <p:cSld>
@@ -570,22 +574,7 @@
           <a:bodyPr/>
           <a:lstStyle/>
           <a:p>
-            <a:r>
-              <a:rPr lang="en-US" dirty="0"/>
-              <a:t>Usually there is 1..1 relation between pod and container on a pod. Only if you have tightly coupled applications it makes sense to run multiple containers in one pod. </a:t>
-            </a:r>
-          </a:p>
-          <a:p>
-            <a:r>
-              <a:rPr lang="en-US" dirty="0"/>
-              <a:t>Example 1: Having a Jenkins and a logging database in one pod may perform better than in separate pod. However this needs to be evaluated case by case.</a:t>
-            </a:r>
-          </a:p>
-          <a:p>
-            <a:r>
-              <a:rPr lang="en-US" dirty="0"/>
-              <a:t>Example 2: Having a side car container for maintenance</a:t>
-            </a:r>
+            <a:endParaRPr lang="en-US"/>
           </a:p>
         </p:txBody>
       </p:sp>
@@ -607,7 +596,7 @@
             <a:fld id="{7D8C2C35-2B8A-446E-BEC0-FD36716C29AC}" type="slidenum">
               <a:rPr lang="de-DE" smtClean="0"/>
               <a:pPr/>
-              <a:t>2</a:t>
+              <a:t>1</a:t>
             </a:fld>
             <a:endParaRPr lang="de-DE" dirty="0"/>
           </a:p>
@@ -616,7 +605,7 @@
     </p:spTree>
     <p:extLst>
       <p:ext uri="{BB962C8B-B14F-4D97-AF65-F5344CB8AC3E}">
-        <p14:creationId xmlns:p14="http://schemas.microsoft.com/office/powerpoint/2010/main" val="4161297931"/>
+        <p14:creationId xmlns:p14="http://schemas.microsoft.com/office/powerpoint/2010/main" val="977588800"/>
       </p:ext>
     </p:extLst>
   </p:cSld>
@@ -672,13 +661,20 @@
           <a:p>
             <a:r>
               <a:rPr lang="en-US" dirty="0"/>
-              <a:t>The API Server is the center piece. All requests towards the cluster </a:t>
-            </a:r>
-            <a:r>
-              <a:rPr lang="en-US"/>
-              <a:t>go though it.</a:t>
-            </a:r>
-            <a:endParaRPr lang="en-US" dirty="0"/>
+              <a:t>Usually there is 1..1 relation between pod and container on a pod. Only if you have tightly coupled applications it makes sense to run multiple containers in one pod. </a:t>
+            </a:r>
+          </a:p>
+          <a:p>
+            <a:r>
+              <a:rPr lang="en-US" dirty="0"/>
+              <a:t>Example 1: Having a Jenkins and a logging database in one pod may perform better than in separate pod. However this needs to be evaluated case by case.</a:t>
+            </a:r>
+          </a:p>
+          <a:p>
+            <a:r>
+              <a:rPr lang="en-US" dirty="0"/>
+              <a:t>Example 2: Having a side car container for maintenance</a:t>
+            </a:r>
           </a:p>
         </p:txBody>
       </p:sp>
@@ -700,7 +696,7 @@
             <a:fld id="{7D8C2C35-2B8A-446E-BEC0-FD36716C29AC}" type="slidenum">
               <a:rPr lang="de-DE" smtClean="0"/>
               <a:pPr/>
-              <a:t>3</a:t>
+              <a:t>2</a:t>
             </a:fld>
             <a:endParaRPr lang="de-DE" dirty="0"/>
           </a:p>
@@ -709,7 +705,7 @@
     </p:spTree>
     <p:extLst>
       <p:ext uri="{BB962C8B-B14F-4D97-AF65-F5344CB8AC3E}">
-        <p14:creationId xmlns:p14="http://schemas.microsoft.com/office/powerpoint/2010/main" val="1730553019"/>
+        <p14:creationId xmlns:p14="http://schemas.microsoft.com/office/powerpoint/2010/main" val="4161297931"/>
       </p:ext>
     </p:extLst>
   </p:cSld>
@@ -738,6 +734,45 @@
       </p:grpSpPr>
       <p:sp>
         <p:nvSpPr>
+          <p:cNvPr id="2" name="Slide Image Placeholder 1"/>
+          <p:cNvSpPr>
+            <a:spLocks noGrp="1" noRot="1" noChangeAspect="1"/>
+          </p:cNvSpPr>
+          <p:nvPr>
+            <p:ph type="sldImg"/>
+          </p:nvPr>
+        </p:nvSpPr>
+        <p:spPr/>
+      </p:sp>
+      <p:sp>
+        <p:nvSpPr>
+          <p:cNvPr id="3" name="Notes Placeholder 2"/>
+          <p:cNvSpPr>
+            <a:spLocks noGrp="1"/>
+          </p:cNvSpPr>
+          <p:nvPr>
+            <p:ph type="body" idx="1"/>
+          </p:nvPr>
+        </p:nvSpPr>
+        <p:spPr/>
+        <p:txBody>
+          <a:bodyPr/>
+          <a:lstStyle/>
+          <a:p>
+            <a:r>
+              <a:rPr lang="en-US" dirty="0"/>
+              <a:t>The API Server is the center piece. All requests towards the cluster </a:t>
+            </a:r>
+            <a:r>
+              <a:rPr lang="en-US"/>
+              <a:t>go though it.</a:t>
+            </a:r>
+            <a:endParaRPr lang="en-US" dirty="0"/>
+          </a:p>
+        </p:txBody>
+      </p:sp>
+      <p:sp>
+        <p:nvSpPr>
           <p:cNvPr id="4" name="Slide Number Placeholder 3"/>
           <p:cNvSpPr>
             <a:spLocks noGrp="1"/>
@@ -754,54 +789,16 @@
             <a:fld id="{7D8C2C35-2B8A-446E-BEC0-FD36716C29AC}" type="slidenum">
               <a:rPr lang="de-DE" smtClean="0"/>
               <a:pPr/>
-              <a:t>5</a:t>
+              <a:t>3</a:t>
             </a:fld>
             <a:endParaRPr lang="de-DE" dirty="0"/>
-          </a:p>
-        </p:txBody>
-      </p:sp>
-      <p:sp>
-        <p:nvSpPr>
-          <p:cNvPr id="9" name="Slide Image Placeholder 8"/>
-          <p:cNvSpPr>
-            <a:spLocks noGrp="1" noRot="1" noChangeAspect="1"/>
-          </p:cNvSpPr>
-          <p:nvPr>
-            <p:ph type="sldImg"/>
-          </p:nvPr>
-        </p:nvSpPr>
-        <p:spPr>
-          <a:xfrm>
-            <a:off x="547688" y="612775"/>
-            <a:ext cx="5762625" cy="3241675"/>
-          </a:xfrm>
-        </p:spPr>
-      </p:sp>
-      <p:sp>
-        <p:nvSpPr>
-          <p:cNvPr id="10" name="Notes Placeholder 9"/>
-          <p:cNvSpPr>
-            <a:spLocks noGrp="1"/>
-          </p:cNvSpPr>
-          <p:nvPr>
-            <p:ph type="body" idx="1"/>
-          </p:nvPr>
-        </p:nvSpPr>
-        <p:spPr/>
-        <p:txBody>
-          <a:bodyPr>
-            <a:normAutofit/>
-          </a:bodyPr>
-          <a:lstStyle/>
-          <a:p>
-            <a:endParaRPr lang="en-US"/>
           </a:p>
         </p:txBody>
       </p:sp>
     </p:spTree>
     <p:extLst>
       <p:ext uri="{BB962C8B-B14F-4D97-AF65-F5344CB8AC3E}">
-        <p14:creationId xmlns:p14="http://schemas.microsoft.com/office/powerpoint/2010/main" val="3094605481"/>
+        <p14:creationId xmlns:p14="http://schemas.microsoft.com/office/powerpoint/2010/main" val="1730553019"/>
       </p:ext>
     </p:extLst>
   </p:cSld>
@@ -846,7 +843,7 @@
             <a:fld id="{7D8C2C35-2B8A-446E-BEC0-FD36716C29AC}" type="slidenum">
               <a:rPr lang="de-DE" smtClean="0"/>
               <a:pPr/>
-              <a:t>6</a:t>
+              <a:t>5</a:t>
             </a:fld>
             <a:endParaRPr lang="de-DE" dirty="0"/>
           </a:p>
@@ -893,7 +890,7 @@
     </p:spTree>
     <p:extLst>
       <p:ext uri="{BB962C8B-B14F-4D97-AF65-F5344CB8AC3E}">
-        <p14:creationId xmlns:p14="http://schemas.microsoft.com/office/powerpoint/2010/main" val="3887584667"/>
+        <p14:creationId xmlns:p14="http://schemas.microsoft.com/office/powerpoint/2010/main" val="3094605481"/>
       </p:ext>
     </p:extLst>
   </p:cSld>
@@ -938,7 +935,7 @@
             <a:fld id="{7D8C2C35-2B8A-446E-BEC0-FD36716C29AC}" type="slidenum">
               <a:rPr lang="de-DE" smtClean="0"/>
               <a:pPr/>
-              <a:t>7</a:t>
+              <a:t>6</a:t>
             </a:fld>
             <a:endParaRPr lang="de-DE" dirty="0"/>
           </a:p>
@@ -985,6 +982,98 @@
     </p:spTree>
     <p:extLst>
       <p:ext uri="{BB962C8B-B14F-4D97-AF65-F5344CB8AC3E}">
+        <p14:creationId xmlns:p14="http://schemas.microsoft.com/office/powerpoint/2010/main" val="3887584667"/>
+      </p:ext>
+    </p:extLst>
+  </p:cSld>
+  <p:clrMapOvr>
+    <a:masterClrMapping/>
+  </p:clrMapOvr>
+</p:notes>
+</file>
+
+<file path=ppt/notesSlides/notesSlide6.xml><?xml version="1.0" encoding="utf-8"?>
+<p:notes xmlns:a="http://schemas.openxmlformats.org/drawingml/2006/main" xmlns:r="http://schemas.openxmlformats.org/officeDocument/2006/relationships" xmlns:p="http://schemas.openxmlformats.org/presentationml/2006/main">
+  <p:cSld>
+    <p:spTree>
+      <p:nvGrpSpPr>
+        <p:cNvPr id="1" name=""/>
+        <p:cNvGrpSpPr/>
+        <p:nvPr/>
+      </p:nvGrpSpPr>
+      <p:grpSpPr>
+        <a:xfrm>
+          <a:off x="0" y="0"/>
+          <a:ext cx="0" cy="0"/>
+          <a:chOff x="0" y="0"/>
+          <a:chExt cx="0" cy="0"/>
+        </a:xfrm>
+      </p:grpSpPr>
+      <p:sp>
+        <p:nvSpPr>
+          <p:cNvPr id="4" name="Slide Number Placeholder 3"/>
+          <p:cNvSpPr>
+            <a:spLocks noGrp="1"/>
+          </p:cNvSpPr>
+          <p:nvPr>
+            <p:ph type="sldNum" sz="quarter" idx="10"/>
+          </p:nvPr>
+        </p:nvSpPr>
+        <p:spPr/>
+        <p:txBody>
+          <a:bodyPr/>
+          <a:lstStyle/>
+          <a:p>
+            <a:fld id="{7D8C2C35-2B8A-446E-BEC0-FD36716C29AC}" type="slidenum">
+              <a:rPr lang="de-DE" smtClean="0"/>
+              <a:pPr/>
+              <a:t>7</a:t>
+            </a:fld>
+            <a:endParaRPr lang="de-DE" dirty="0"/>
+          </a:p>
+        </p:txBody>
+      </p:sp>
+      <p:sp>
+        <p:nvSpPr>
+          <p:cNvPr id="9" name="Slide Image Placeholder 8"/>
+          <p:cNvSpPr>
+            <a:spLocks noGrp="1" noRot="1" noChangeAspect="1"/>
+          </p:cNvSpPr>
+          <p:nvPr>
+            <p:ph type="sldImg"/>
+          </p:nvPr>
+        </p:nvSpPr>
+        <p:spPr>
+          <a:xfrm>
+            <a:off x="547688" y="612775"/>
+            <a:ext cx="5762625" cy="3241675"/>
+          </a:xfrm>
+        </p:spPr>
+      </p:sp>
+      <p:sp>
+        <p:nvSpPr>
+          <p:cNvPr id="10" name="Notes Placeholder 9"/>
+          <p:cNvSpPr>
+            <a:spLocks noGrp="1"/>
+          </p:cNvSpPr>
+          <p:nvPr>
+            <p:ph type="body" idx="1"/>
+          </p:nvPr>
+        </p:nvSpPr>
+        <p:spPr/>
+        <p:txBody>
+          <a:bodyPr>
+            <a:normAutofit/>
+          </a:bodyPr>
+          <a:lstStyle/>
+          <a:p>
+            <a:endParaRPr lang="en-US"/>
+          </a:p>
+        </p:txBody>
+      </p:sp>
+    </p:spTree>
+    <p:extLst>
+      <p:ext uri="{BB962C8B-B14F-4D97-AF65-F5344CB8AC3E}">
         <p14:creationId xmlns:p14="http://schemas.microsoft.com/office/powerpoint/2010/main" val="3968705523"/>
       </p:ext>
     </p:extLst>
@@ -995,7 +1084,7 @@
 </p:notes>
 </file>
 
-<file path=ppt/notesSlides/notesSlide6.xml><?xml version="1.0" encoding="utf-8"?>
+<file path=ppt/notesSlides/notesSlide7.xml><?xml version="1.0" encoding="utf-8"?>
 <p:notes xmlns:a="http://schemas.openxmlformats.org/drawingml/2006/main" xmlns:r="http://schemas.openxmlformats.org/officeDocument/2006/relationships" xmlns:p="http://schemas.openxmlformats.org/presentationml/2006/main">
   <p:cSld>
     <p:spTree>
@@ -8640,7 +8729,7 @@
           </p:nvPr>
         </p:nvPicPr>
         <p:blipFill>
-          <a:blip r:embed="rId2"/>
+          <a:blip r:embed="rId3"/>
           <a:srcRect t="3112" b="3112"/>
           <a:stretch>
             <a:fillRect/>
@@ -14772,24 +14861,32 @@
                 <a:tabLst/>
               </a:pPr>
               <a:r>
-                <a:rPr kumimoji="0" lang="de-DE" sz="2400" b="1" i="0" strike="noStrike" kern="0" cap="none" spc="0" normalizeH="0" baseline="0" noProof="0" dirty="0" err="1">
-                  <a:ln>
-                    <a:noFill/>
-                  </a:ln>
-                  <a:effectLst/>
-                  <a:uLnTx/>
-                  <a:uFillTx/>
+                <a:rPr lang="de-DE" sz="2400" b="1" kern="0" dirty="0" err="1">
                   <a:ea typeface="Arial Unicode MS" pitchFamily="34" charset="-128"/>
                   <a:cs typeface="Arial Unicode MS" pitchFamily="34" charset="-128"/>
                 </a:rPr>
-                <a:t>pvxka</a:t>
+                <a:t>local</a:t>
               </a:r>
               <a:r>
                 <a:rPr lang="de-DE" sz="2400" b="1" kern="0" dirty="0">
                   <a:ea typeface="Arial Unicode MS" pitchFamily="34" charset="-128"/>
                   <a:cs typeface="Arial Unicode MS" pitchFamily="34" charset="-128"/>
                 </a:rPr>
-                <a:t>[01..22]</a:t>
+                <a:t> </a:t>
+              </a:r>
+              <a:r>
+                <a:rPr lang="de-DE" sz="2400" b="1" kern="0" dirty="0" err="1">
+                  <a:ea typeface="Arial Unicode MS" pitchFamily="34" charset="-128"/>
+                  <a:cs typeface="Arial Unicode MS" pitchFamily="34" charset="-128"/>
+                </a:rPr>
+                <a:t>participant</a:t>
+              </a:r>
+              <a:r>
+                <a:rPr lang="de-DE" sz="2400" b="1" kern="0" dirty="0">
+                  <a:ea typeface="Arial Unicode MS" pitchFamily="34" charset="-128"/>
+                  <a:cs typeface="Arial Unicode MS" pitchFamily="34" charset="-128"/>
+                </a:rPr>
+                <a:t> VM</a:t>
               </a:r>
               <a:endParaRPr kumimoji="0" lang="de-DE" sz="2400" b="1" i="0" strike="noStrike" kern="0" cap="none" spc="0" normalizeH="0" baseline="0" noProof="0" dirty="0">
                 <a:ln>
@@ -16152,8 +16249,8 @@
         </p:nvSpPr>
         <p:spPr bwMode="gray">
           <a:xfrm>
-            <a:off x="10179244" y="5650973"/>
-            <a:ext cx="1524000" cy="662940"/>
+            <a:off x="9066103" y="5738293"/>
+            <a:ext cx="2637141" cy="575620"/>
           </a:xfrm>
           <a:prstGeom prst="roundRect">
             <a:avLst/>
@@ -16198,7 +16295,7 @@
               <a:tabLst/>
             </a:pPr>
             <a:r>
-              <a:rPr kumimoji="0" lang="en-US" sz="3200" b="1" i="0" u="none" strike="noStrike" kern="0" cap="none" spc="0" normalizeH="0" baseline="0" noProof="0" dirty="0">
+              <a:rPr kumimoji="0" lang="en-US" sz="2000" b="1" i="0" u="none" strike="noStrike" kern="0" cap="none" spc="0" normalizeH="0" baseline="0" noProof="0" dirty="0">
                 <a:ln>
                   <a:noFill/>
                 </a:ln>
@@ -16208,7 +16305,7 @@
                 <a:ea typeface="Arial Unicode MS" pitchFamily="34" charset="-128"/>
                 <a:cs typeface="Arial Unicode MS" pitchFamily="34" charset="-128"/>
               </a:rPr>
-              <a:t>@GCP</a:t>
+              <a:t>Gardener on GCP</a:t>
             </a:r>
           </a:p>
         </p:txBody>

</xml_diff>

<commit_message>
detailed demo script & slide for demo/exercise
</commit_message>
<xml_diff>
--- a/kubernetes/01_k8s_core_components.pptx
+++ b/kubernetes/01_k8s_core_components.pptx
@@ -5,10 +5,10 @@
     <p:sldMasterId id="2147483733" r:id="rId1"/>
   </p:sldMasterIdLst>
   <p:notesMasterIdLst>
-    <p:notesMasterId r:id="rId15"/>
+    <p:notesMasterId r:id="rId16"/>
   </p:notesMasterIdLst>
   <p:handoutMasterIdLst>
-    <p:handoutMasterId r:id="rId16"/>
+    <p:handoutMasterId r:id="rId17"/>
   </p:handoutMasterIdLst>
   <p:sldIdLst>
     <p:sldId id="433" r:id="rId2"/>
@@ -21,9 +21,10 @@
     <p:sldId id="445" r:id="rId9"/>
     <p:sldId id="439" r:id="rId10"/>
     <p:sldId id="441" r:id="rId11"/>
-    <p:sldId id="442" r:id="rId12"/>
-    <p:sldId id="440" r:id="rId13"/>
-    <p:sldId id="265" r:id="rId14"/>
+    <p:sldId id="440" r:id="rId12"/>
+    <p:sldId id="442" r:id="rId13"/>
+    <p:sldId id="456" r:id="rId14"/>
+    <p:sldId id="265" r:id="rId15"/>
   </p:sldIdLst>
   <p:sldSz cx="12195175" cy="6858000"/>
   <p:notesSz cx="6858000" cy="9144000"/>
@@ -197,10 +198,6 @@
     </p:ext>
   </p:extLst>
 </p:presentation>
-</file>
-
-<file path=ppt/revisionInfo.xml><?xml version="1.0" encoding="utf-8"?>
-<p1510:revInfo xmlns:a="http://schemas.openxmlformats.org/drawingml/2006/main" xmlns:r="http://schemas.openxmlformats.org/officeDocument/2006/relationships" xmlns:p1510="http://schemas.microsoft.com/office/powerpoint/2015/10/main"/>
 </file>
 
 <file path=ppt/diagrams/colors1.xml><?xml version="1.0" encoding="utf-8"?>
@@ -4182,6 +4179,186 @@
 </p:notes>
 </file>
 
+<file path=ppt/notesSlides/notesSlide10.xml><?xml version="1.0" encoding="utf-8"?>
+<p:notes xmlns:a="http://schemas.openxmlformats.org/drawingml/2006/main" xmlns:r="http://schemas.openxmlformats.org/officeDocument/2006/relationships" xmlns:p="http://schemas.openxmlformats.org/presentationml/2006/main">
+  <p:cSld>
+    <p:spTree>
+      <p:nvGrpSpPr>
+        <p:cNvPr id="1" name=""/>
+        <p:cNvGrpSpPr/>
+        <p:nvPr/>
+      </p:nvGrpSpPr>
+      <p:grpSpPr>
+        <a:xfrm>
+          <a:off x="0" y="0"/>
+          <a:ext cx="0" cy="0"/>
+          <a:chOff x="0" y="0"/>
+          <a:chExt cx="0" cy="0"/>
+        </a:xfrm>
+      </p:grpSpPr>
+      <p:sp>
+        <p:nvSpPr>
+          <p:cNvPr id="2" name="Slide Image Placeholder 1"/>
+          <p:cNvSpPr>
+            <a:spLocks noGrp="1" noRot="1" noChangeAspect="1"/>
+          </p:cNvSpPr>
+          <p:nvPr>
+            <p:ph type="sldImg"/>
+          </p:nvPr>
+        </p:nvSpPr>
+        <p:spPr/>
+      </p:sp>
+      <p:sp>
+        <p:nvSpPr>
+          <p:cNvPr id="3" name="Notes Placeholder 2"/>
+          <p:cNvSpPr>
+            <a:spLocks noGrp="1"/>
+          </p:cNvSpPr>
+          <p:nvPr>
+            <p:ph type="body" idx="1"/>
+          </p:nvPr>
+        </p:nvSpPr>
+        <p:spPr/>
+        <p:txBody>
+          <a:bodyPr/>
+          <a:lstStyle/>
+          <a:p>
+            <a:r>
+              <a:rPr lang="en-US" dirty="0"/>
+              <a:t>~10min</a:t>
+            </a:r>
+          </a:p>
+        </p:txBody>
+      </p:sp>
+      <p:sp>
+        <p:nvSpPr>
+          <p:cNvPr id="4" name="Slide Number Placeholder 3"/>
+          <p:cNvSpPr>
+            <a:spLocks noGrp="1"/>
+          </p:cNvSpPr>
+          <p:nvPr>
+            <p:ph type="sldNum" sz="quarter" idx="10"/>
+          </p:nvPr>
+        </p:nvSpPr>
+        <p:spPr/>
+        <p:txBody>
+          <a:bodyPr/>
+          <a:lstStyle/>
+          <a:p>
+            <a:fld id="{7D8C2C35-2B8A-446E-BEC0-FD36716C29AC}" type="slidenum">
+              <a:rPr lang="de-DE" smtClean="0"/>
+              <a:pPr/>
+              <a:t>13</a:t>
+            </a:fld>
+            <a:endParaRPr lang="de-DE" dirty="0"/>
+          </a:p>
+        </p:txBody>
+      </p:sp>
+    </p:spTree>
+    <p:extLst>
+      <p:ext uri="{BB962C8B-B14F-4D97-AF65-F5344CB8AC3E}">
+        <p14:creationId xmlns:p14="http://schemas.microsoft.com/office/powerpoint/2010/main" val="3443248425"/>
+      </p:ext>
+    </p:extLst>
+  </p:cSld>
+  <p:clrMapOvr>
+    <a:masterClrMapping/>
+  </p:clrMapOvr>
+</p:notes>
+</file>
+
+<file path=ppt/notesSlides/notesSlide11.xml><?xml version="1.0" encoding="utf-8"?>
+<p:notes xmlns:a="http://schemas.openxmlformats.org/drawingml/2006/main" xmlns:r="http://schemas.openxmlformats.org/officeDocument/2006/relationships" xmlns:p="http://schemas.openxmlformats.org/presentationml/2006/main">
+  <p:cSld>
+    <p:spTree>
+      <p:nvGrpSpPr>
+        <p:cNvPr id="1" name=""/>
+        <p:cNvGrpSpPr/>
+        <p:nvPr/>
+      </p:nvGrpSpPr>
+      <p:grpSpPr>
+        <a:xfrm>
+          <a:off x="0" y="0"/>
+          <a:ext cx="0" cy="0"/>
+          <a:chOff x="0" y="0"/>
+          <a:chExt cx="0" cy="0"/>
+        </a:xfrm>
+      </p:grpSpPr>
+      <p:sp>
+        <p:nvSpPr>
+          <p:cNvPr id="4" name="Slide Number Placeholder 3"/>
+          <p:cNvSpPr>
+            <a:spLocks noGrp="1"/>
+          </p:cNvSpPr>
+          <p:nvPr>
+            <p:ph type="sldNum" sz="quarter" idx="10"/>
+          </p:nvPr>
+        </p:nvSpPr>
+        <p:spPr/>
+        <p:txBody>
+          <a:bodyPr/>
+          <a:lstStyle/>
+          <a:p>
+            <a:fld id="{7D8C2C35-2B8A-446E-BEC0-FD36716C29AC}" type="slidenum">
+              <a:rPr lang="de-DE" smtClean="0"/>
+              <a:pPr/>
+              <a:t>14</a:t>
+            </a:fld>
+            <a:endParaRPr lang="de-DE" dirty="0"/>
+          </a:p>
+        </p:txBody>
+      </p:sp>
+      <p:sp>
+        <p:nvSpPr>
+          <p:cNvPr id="6" name="Slide Image Placeholder 5"/>
+          <p:cNvSpPr>
+            <a:spLocks noGrp="1" noRot="1" noChangeAspect="1"/>
+          </p:cNvSpPr>
+          <p:nvPr>
+            <p:ph type="sldImg"/>
+          </p:nvPr>
+        </p:nvSpPr>
+        <p:spPr>
+          <a:xfrm>
+            <a:off x="547688" y="612775"/>
+            <a:ext cx="5762625" cy="3241675"/>
+          </a:xfrm>
+        </p:spPr>
+      </p:sp>
+      <p:sp>
+        <p:nvSpPr>
+          <p:cNvPr id="7" name="Notes Placeholder 6"/>
+          <p:cNvSpPr>
+            <a:spLocks noGrp="1"/>
+          </p:cNvSpPr>
+          <p:nvPr>
+            <p:ph type="body" idx="1"/>
+          </p:nvPr>
+        </p:nvSpPr>
+        <p:spPr/>
+        <p:txBody>
+          <a:bodyPr>
+            <a:normAutofit/>
+          </a:bodyPr>
+          <a:lstStyle/>
+          <a:p>
+            <a:endParaRPr lang="en-US"/>
+          </a:p>
+        </p:txBody>
+      </p:sp>
+    </p:spTree>
+    <p:extLst>
+      <p:ext uri="{BB962C8B-B14F-4D97-AF65-F5344CB8AC3E}">
+        <p14:creationId xmlns:p14="http://schemas.microsoft.com/office/powerpoint/2010/main" val="2544264309"/>
+      </p:ext>
+    </p:extLst>
+  </p:cSld>
+  <p:clrMapOvr>
+    <a:masterClrMapping/>
+  </p:clrMapOvr>
+</p:notes>
+</file>
+
 <file path=ppt/notesSlides/notesSlide2.xml><?xml version="1.0" encoding="utf-8"?>
 <p:notes xmlns:a="http://schemas.openxmlformats.org/drawingml/2006/main" xmlns:r="http://schemas.openxmlformats.org/officeDocument/2006/relationships" xmlns:p="http://schemas.openxmlformats.org/presentationml/2006/main">
   <p:cSld>
@@ -4981,6 +5158,325 @@
       </p:grpSpPr>
       <p:sp>
         <p:nvSpPr>
+          <p:cNvPr id="2" name="Slide Image Placeholder 1"/>
+          <p:cNvSpPr>
+            <a:spLocks noGrp="1" noRot="1" noChangeAspect="1"/>
+          </p:cNvSpPr>
+          <p:nvPr>
+            <p:ph type="sldImg"/>
+          </p:nvPr>
+        </p:nvSpPr>
+        <p:spPr/>
+      </p:sp>
+      <p:sp>
+        <p:nvSpPr>
+          <p:cNvPr id="3" name="Notes Placeholder 2"/>
+          <p:cNvSpPr>
+            <a:spLocks noGrp="1"/>
+          </p:cNvSpPr>
+          <p:nvPr>
+            <p:ph type="body" idx="1"/>
+          </p:nvPr>
+        </p:nvSpPr>
+        <p:spPr/>
+        <p:txBody>
+          <a:bodyPr/>
+          <a:lstStyle/>
+          <a:p>
+            <a:pPr marL="342900" indent="-342900">
+              <a:buSzPct val="100000"/>
+              <a:buFont typeface="Wingdings" panose="05000000000000000000" pitchFamily="2" charset="2"/>
+              <a:buChar char="§"/>
+            </a:pPr>
+            <a:r>
+              <a:rPr lang="en-US" dirty="0"/>
+              <a:t>Call </a:t>
+            </a:r>
+            <a:r>
+              <a:rPr lang="en-US" dirty="0" err="1"/>
+              <a:t>kubectl</a:t>
+            </a:r>
+            <a:r>
+              <a:rPr lang="en-US" dirty="0"/>
+              <a:t> without any sub-command and explain how to get more info </a:t>
+            </a:r>
+          </a:p>
+          <a:p>
+            <a:pPr marL="342900" indent="-342900">
+              <a:buSzPct val="100000"/>
+              <a:buFont typeface="Wingdings" panose="05000000000000000000" pitchFamily="2" charset="2"/>
+              <a:buChar char="§"/>
+            </a:pPr>
+            <a:r>
+              <a:rPr lang="en-US" dirty="0"/>
+              <a:t>Show and explain </a:t>
+            </a:r>
+            <a:r>
+              <a:rPr lang="en-US" dirty="0" err="1"/>
+              <a:t>kubectl</a:t>
+            </a:r>
+            <a:r>
+              <a:rPr lang="en-US" dirty="0"/>
+              <a:t> config *</a:t>
+            </a:r>
+          </a:p>
+          <a:p>
+            <a:pPr marL="522900" lvl="1" indent="-342900">
+              <a:buSzPct val="100000"/>
+              <a:buFont typeface="Wingdings" panose="05000000000000000000" pitchFamily="2" charset="2"/>
+              <a:buChar char="§"/>
+            </a:pPr>
+            <a:r>
+              <a:rPr lang="en-US" dirty="0"/>
+              <a:t>Explain KUBECONFIG </a:t>
+            </a:r>
+            <a:r>
+              <a:rPr lang="en-US" dirty="0" err="1"/>
+              <a:t>env</a:t>
+            </a:r>
+            <a:r>
+              <a:rPr lang="en-US" dirty="0"/>
+              <a:t> variable &amp; the default location ~/.</a:t>
+            </a:r>
+            <a:r>
+              <a:rPr lang="en-US" dirty="0" err="1"/>
+              <a:t>kube</a:t>
+            </a:r>
+            <a:r>
+              <a:rPr lang="en-US" dirty="0"/>
+              <a:t>/config</a:t>
+            </a:r>
+          </a:p>
+          <a:p>
+            <a:pPr marL="522900" lvl="1" indent="-342900">
+              <a:buSzPct val="100000"/>
+              <a:buFont typeface="Wingdings" panose="05000000000000000000" pitchFamily="2" charset="2"/>
+              <a:buChar char="§"/>
+            </a:pPr>
+            <a:r>
+              <a:rPr lang="en-US" dirty="0"/>
+              <a:t>Show the </a:t>
+            </a:r>
+            <a:r>
+              <a:rPr lang="en-US" dirty="0" err="1"/>
+              <a:t>kubeconfig</a:t>
+            </a:r>
+            <a:r>
+              <a:rPr lang="en-US" dirty="0"/>
+              <a:t> </a:t>
+            </a:r>
+            <a:r>
+              <a:rPr lang="en-US" dirty="0" err="1"/>
+              <a:t>yaml</a:t>
+            </a:r>
+            <a:r>
+              <a:rPr lang="en-US" dirty="0"/>
+              <a:t> file with the current context and the namespace</a:t>
+            </a:r>
+          </a:p>
+          <a:p>
+            <a:pPr marL="180000" lvl="1" indent="0">
+              <a:buSzPct val="100000"/>
+              <a:buFont typeface="Wingdings" panose="05000000000000000000" pitchFamily="2" charset="2"/>
+              <a:buNone/>
+            </a:pPr>
+            <a:endParaRPr lang="en-US" dirty="0"/>
+          </a:p>
+          <a:p>
+            <a:pPr marL="342900" indent="-342900">
+              <a:buSzPct val="100000"/>
+              <a:buFont typeface="Wingdings" panose="05000000000000000000" pitchFamily="2" charset="2"/>
+              <a:buChar char="§"/>
+            </a:pPr>
+            <a:r>
+              <a:rPr lang="en-US" dirty="0"/>
+              <a:t>Show access to cluster with </a:t>
+            </a:r>
+            <a:r>
+              <a:rPr lang="en-US" dirty="0" err="1"/>
+              <a:t>kubectl</a:t>
+            </a:r>
+            <a:r>
+              <a:rPr lang="en-US" dirty="0"/>
+              <a:t> -&gt; </a:t>
+            </a:r>
+            <a:r>
+              <a:rPr lang="en-US" dirty="0" err="1"/>
+              <a:t>kubectl</a:t>
+            </a:r>
+            <a:r>
+              <a:rPr lang="en-US" dirty="0"/>
+              <a:t> get nodes</a:t>
+            </a:r>
+          </a:p>
+          <a:p>
+            <a:pPr marL="342900" indent="-342900">
+              <a:buSzPct val="100000"/>
+              <a:buFont typeface="Wingdings" panose="05000000000000000000" pitchFamily="2" charset="2"/>
+              <a:buChar char="§"/>
+            </a:pPr>
+            <a:r>
+              <a:rPr lang="en-US" dirty="0"/>
+              <a:t>Explain basic syntax of </a:t>
+            </a:r>
+            <a:r>
+              <a:rPr lang="en-US" dirty="0" err="1"/>
+              <a:t>kubectl</a:t>
+            </a:r>
+            <a:r>
+              <a:rPr lang="en-US" dirty="0"/>
+              <a:t> [verb] [resource type] [specific resource by name or label] [options / switches like –o </a:t>
+            </a:r>
+            <a:r>
+              <a:rPr lang="en-US" dirty="0" err="1"/>
+              <a:t>yaml</a:t>
+            </a:r>
+            <a:r>
+              <a:rPr lang="en-US" dirty="0"/>
+              <a:t>]</a:t>
+            </a:r>
+          </a:p>
+          <a:p>
+            <a:pPr marL="342900" marR="0" lvl="0" indent="-342900" algn="l" defTabSz="1088776" rtl="0" eaLnBrk="1" fontAlgn="auto" latinLnBrk="0" hangingPunct="1">
+              <a:lnSpc>
+                <a:spcPct val="100000"/>
+              </a:lnSpc>
+              <a:spcBef>
+                <a:spcPts val="0"/>
+              </a:spcBef>
+              <a:spcAft>
+                <a:spcPts val="0"/>
+              </a:spcAft>
+              <a:buClrTx/>
+              <a:buSzPct val="100000"/>
+              <a:buFont typeface="Wingdings" panose="05000000000000000000" pitchFamily="2" charset="2"/>
+              <a:buChar char="§"/>
+              <a:tabLst/>
+              <a:defRPr/>
+            </a:pPr>
+            <a:r>
+              <a:rPr lang="en-US" dirty="0"/>
+              <a:t>Show </a:t>
+            </a:r>
+            <a:r>
+              <a:rPr lang="en-US" dirty="0" err="1"/>
+              <a:t>kubectl</a:t>
+            </a:r>
+            <a:r>
+              <a:rPr lang="en-US" dirty="0"/>
+              <a:t> get &amp; describe nodes and talk about details of the node, like resource utilization or docker version</a:t>
+            </a:r>
+          </a:p>
+          <a:p>
+            <a:pPr marL="342900" marR="0" lvl="0" indent="-342900" algn="l" defTabSz="1088776" rtl="0" eaLnBrk="1" fontAlgn="auto" latinLnBrk="0" hangingPunct="1">
+              <a:lnSpc>
+                <a:spcPct val="100000"/>
+              </a:lnSpc>
+              <a:spcBef>
+                <a:spcPts val="0"/>
+              </a:spcBef>
+              <a:spcAft>
+                <a:spcPts val="0"/>
+              </a:spcAft>
+              <a:buClrTx/>
+              <a:buSzPct val="100000"/>
+              <a:buFont typeface="Wingdings" panose="05000000000000000000" pitchFamily="2" charset="2"/>
+              <a:buChar char="§"/>
+              <a:tabLst/>
+              <a:defRPr/>
+            </a:pPr>
+            <a:endParaRPr lang="en-US" dirty="0"/>
+          </a:p>
+          <a:p>
+            <a:pPr marL="342900" marR="0" lvl="0" indent="-342900" algn="l" defTabSz="1088776" rtl="0" eaLnBrk="1" fontAlgn="auto" latinLnBrk="0" hangingPunct="1">
+              <a:lnSpc>
+                <a:spcPct val="100000"/>
+              </a:lnSpc>
+              <a:spcBef>
+                <a:spcPts val="0"/>
+              </a:spcBef>
+              <a:spcAft>
+                <a:spcPts val="0"/>
+              </a:spcAft>
+              <a:buClrTx/>
+              <a:buSzPct val="100000"/>
+              <a:buFont typeface="Wingdings" panose="05000000000000000000" pitchFamily="2" charset="2"/>
+              <a:buChar char="§"/>
+              <a:tabLst/>
+              <a:defRPr/>
+            </a:pPr>
+            <a:r>
+              <a:rPr lang="en-US" dirty="0"/>
+              <a:t>Run </a:t>
+            </a:r>
+            <a:r>
+              <a:rPr lang="en-US" dirty="0" err="1"/>
+              <a:t>kubectl</a:t>
+            </a:r>
+            <a:r>
+              <a:rPr lang="en-US" dirty="0"/>
+              <a:t> proxy &amp;</a:t>
+            </a:r>
+          </a:p>
+          <a:p>
+            <a:pPr marL="342900" marR="0" lvl="0" indent="-342900" algn="l" defTabSz="1088776" rtl="0" eaLnBrk="1" fontAlgn="auto" latinLnBrk="0" hangingPunct="1">
+              <a:lnSpc>
+                <a:spcPct val="100000"/>
+              </a:lnSpc>
+              <a:spcBef>
+                <a:spcPts val="0"/>
+              </a:spcBef>
+              <a:spcAft>
+                <a:spcPts val="0"/>
+              </a:spcAft>
+              <a:buClrTx/>
+              <a:buSzPct val="100000"/>
+              <a:buFont typeface="Wingdings" panose="05000000000000000000" pitchFamily="2" charset="2"/>
+              <a:buChar char="§"/>
+              <a:tabLst/>
+              <a:defRPr/>
+            </a:pPr>
+            <a:r>
+              <a:rPr lang="en-US" dirty="0"/>
+              <a:t>Open localhost:8001 in browser and show </a:t>
+            </a:r>
+            <a:r>
+              <a:rPr lang="en-US" dirty="0" err="1"/>
+              <a:t>api</a:t>
+            </a:r>
+            <a:r>
+              <a:rPr lang="en-US" dirty="0"/>
+              <a:t> tree, traverse through it and go to namespace </a:t>
+            </a:r>
+            <a:r>
+              <a:rPr lang="en-US" dirty="0" err="1"/>
+              <a:t>kube</a:t>
+            </a:r>
+            <a:r>
+              <a:rPr lang="en-US" dirty="0"/>
+              <a:t>-system and show some pods</a:t>
+            </a:r>
+          </a:p>
+          <a:p>
+            <a:pPr marL="342900" indent="-342900">
+              <a:buSzPct val="100000"/>
+              <a:buFont typeface="Wingdings" panose="05000000000000000000" pitchFamily="2" charset="2"/>
+              <a:buChar char="§"/>
+            </a:pPr>
+            <a:r>
+              <a:rPr lang="en-US" dirty="0"/>
+              <a:t>Query API server with curl (again </a:t>
+            </a:r>
+            <a:r>
+              <a:rPr lang="en-US"/>
+              <a:t>via localhost)</a:t>
+            </a:r>
+            <a:endParaRPr lang="en-US" dirty="0"/>
+          </a:p>
+        </p:txBody>
+      </p:sp>
+      <p:sp>
+        <p:nvSpPr>
           <p:cNvPr id="4" name="Slide Number Placeholder 3"/>
           <p:cNvSpPr>
             <a:spLocks noGrp="1"/>
@@ -4997,54 +5493,16 @@
             <a:fld id="{7D8C2C35-2B8A-446E-BEC0-FD36716C29AC}" type="slidenum">
               <a:rPr lang="de-DE" smtClean="0"/>
               <a:pPr/>
-              <a:t>13</a:t>
+              <a:t>11</a:t>
             </a:fld>
             <a:endParaRPr lang="de-DE" dirty="0"/>
-          </a:p>
-        </p:txBody>
-      </p:sp>
-      <p:sp>
-        <p:nvSpPr>
-          <p:cNvPr id="6" name="Slide Image Placeholder 5"/>
-          <p:cNvSpPr>
-            <a:spLocks noGrp="1" noRot="1" noChangeAspect="1"/>
-          </p:cNvSpPr>
-          <p:nvPr>
-            <p:ph type="sldImg"/>
-          </p:nvPr>
-        </p:nvSpPr>
-        <p:spPr>
-          <a:xfrm>
-            <a:off x="547688" y="612775"/>
-            <a:ext cx="5762625" cy="3241675"/>
-          </a:xfrm>
-        </p:spPr>
-      </p:sp>
-      <p:sp>
-        <p:nvSpPr>
-          <p:cNvPr id="7" name="Notes Placeholder 6"/>
-          <p:cNvSpPr>
-            <a:spLocks noGrp="1"/>
-          </p:cNvSpPr>
-          <p:nvPr>
-            <p:ph type="body" idx="1"/>
-          </p:nvPr>
-        </p:nvSpPr>
-        <p:spPr/>
-        <p:txBody>
-          <a:bodyPr>
-            <a:normAutofit/>
-          </a:bodyPr>
-          <a:lstStyle/>
-          <a:p>
-            <a:endParaRPr lang="en-US"/>
           </a:p>
         </p:txBody>
       </p:sp>
     </p:spTree>
     <p:extLst>
       <p:ext uri="{BB962C8B-B14F-4D97-AF65-F5344CB8AC3E}">
-        <p14:creationId xmlns:p14="http://schemas.microsoft.com/office/powerpoint/2010/main" val="2544264309"/>
+        <p14:creationId xmlns:p14="http://schemas.microsoft.com/office/powerpoint/2010/main" val="2072189787"/>
       </p:ext>
     </p:extLst>
   </p:cSld>
@@ -14298,6 +14756,88 @@
 </file>
 
 <file path=ppt/slides/slide11.xml><?xml version="1.0" encoding="utf-8"?>
+<p:sld xmlns:a="http://schemas.openxmlformats.org/drawingml/2006/main" xmlns:r="http://schemas.openxmlformats.org/officeDocument/2006/relationships" xmlns:p="http://schemas.openxmlformats.org/presentationml/2006/main">
+  <p:cSld>
+    <p:spTree>
+      <p:nvGrpSpPr>
+        <p:cNvPr id="1" name=""/>
+        <p:cNvGrpSpPr/>
+        <p:nvPr/>
+      </p:nvGrpSpPr>
+      <p:grpSpPr>
+        <a:xfrm>
+          <a:off x="0" y="0"/>
+          <a:ext cx="0" cy="0"/>
+          <a:chOff x="0" y="0"/>
+          <a:chExt cx="0" cy="0"/>
+        </a:xfrm>
+      </p:grpSpPr>
+      <p:sp>
+        <p:nvSpPr>
+          <p:cNvPr id="3" name="Title 2"/>
+          <p:cNvSpPr>
+            <a:spLocks noGrp="1"/>
+          </p:cNvSpPr>
+          <p:nvPr>
+            <p:ph type="title"/>
+          </p:nvPr>
+        </p:nvSpPr>
+        <p:spPr/>
+        <p:txBody>
+          <a:bodyPr/>
+          <a:lstStyle/>
+          <a:p>
+            <a:r>
+              <a:rPr lang="en-US" dirty="0"/>
+              <a:t>Demo</a:t>
+            </a:r>
+          </a:p>
+        </p:txBody>
+      </p:sp>
+      <p:pic>
+        <p:nvPicPr>
+          <p:cNvPr id="4" name="Picture 3">
+            <a:extLst>
+              <a:ext uri="{FF2B5EF4-FFF2-40B4-BE49-F238E27FC236}">
+                <a16:creationId xmlns:a16="http://schemas.microsoft.com/office/drawing/2014/main" id="{BBBF5AFC-BB7A-49E4-A5D6-B4DFE49342CD}"/>
+              </a:ext>
+            </a:extLst>
+          </p:cNvPr>
+          <p:cNvPicPr>
+            <a:picLocks noChangeAspect="1"/>
+          </p:cNvPicPr>
+          <p:nvPr/>
+        </p:nvPicPr>
+        <p:blipFill>
+          <a:blip r:embed="rId3"/>
+          <a:stretch>
+            <a:fillRect/>
+          </a:stretch>
+        </p:blipFill>
+        <p:spPr>
+          <a:xfrm>
+            <a:off x="3849419" y="1181180"/>
+            <a:ext cx="4495640" cy="4495640"/>
+          </a:xfrm>
+          <a:prstGeom prst="rect">
+            <a:avLst/>
+          </a:prstGeom>
+        </p:spPr>
+      </p:pic>
+    </p:spTree>
+    <p:extLst>
+      <p:ext uri="{BB962C8B-B14F-4D97-AF65-F5344CB8AC3E}">
+        <p14:creationId xmlns:p14="http://schemas.microsoft.com/office/powerpoint/2010/main" val="2819952857"/>
+      </p:ext>
+    </p:extLst>
+  </p:cSld>
+  <p:clrMapOvr>
+    <a:masterClrMapping/>
+  </p:clrMapOvr>
+</p:sld>
+</file>
+
+<file path=ppt/slides/slide12.xml><?xml version="1.0" encoding="utf-8"?>
 <p:sld xmlns:a="http://schemas.openxmlformats.org/drawingml/2006/main" xmlns:r="http://schemas.openxmlformats.org/officeDocument/2006/relationships" xmlns:p="http://schemas.openxmlformats.org/presentationml/2006/main">
   <p:cSld>
     <p:spTree>
@@ -15444,8 +15984,8 @@
 </p:sld>
 </file>
 
-<file path=ppt/slides/slide12.xml><?xml version="1.0" encoding="utf-8"?>
-<p:sld xmlns:a="http://schemas.openxmlformats.org/drawingml/2006/main" xmlns:r="http://schemas.openxmlformats.org/officeDocument/2006/relationships" xmlns:p="http://schemas.openxmlformats.org/presentationml/2006/main" show="0">
+<file path=ppt/slides/slide13.xml><?xml version="1.0" encoding="utf-8"?>
+<p:sld xmlns:a="http://schemas.openxmlformats.org/drawingml/2006/main" xmlns:r="http://schemas.openxmlformats.org/officeDocument/2006/relationships" xmlns:p="http://schemas.openxmlformats.org/presentationml/2006/main">
   <p:cSld>
     <p:spTree>
       <p:nvGrpSpPr>
@@ -15463,111 +16003,13 @@
       </p:grpSpPr>
       <p:sp>
         <p:nvSpPr>
-          <p:cNvPr id="2" name="Text Placeholder 1"/>
-          <p:cNvSpPr>
-            <a:spLocks noGrp="1"/>
-          </p:cNvSpPr>
-          <p:nvPr>
-            <p:ph type="body" sz="quarter" idx="10"/>
-          </p:nvPr>
-        </p:nvSpPr>
-        <p:spPr/>
-        <p:txBody>
-          <a:bodyPr/>
-          <a:lstStyle/>
-          <a:p>
-            <a:pPr marL="342900" indent="-342900">
-              <a:buSzPct val="100000"/>
-              <a:buFont typeface="Wingdings" panose="05000000000000000000" pitchFamily="2" charset="2"/>
-              <a:buChar char="§"/>
-            </a:pPr>
-            <a:r>
-              <a:rPr lang="en-US" dirty="0"/>
-              <a:t>Show access to cluster with </a:t>
-            </a:r>
-            <a:r>
-              <a:rPr lang="en-US" dirty="0" err="1"/>
-              <a:t>kubectl</a:t>
-            </a:r>
-            <a:endParaRPr lang="en-US" dirty="0"/>
-          </a:p>
-          <a:p>
-            <a:pPr marL="342900" indent="-342900">
-              <a:buSzPct val="100000"/>
-              <a:buFont typeface="Wingdings" panose="05000000000000000000" pitchFamily="2" charset="2"/>
-              <a:buChar char="§"/>
-            </a:pPr>
-            <a:r>
-              <a:rPr lang="en-US" dirty="0"/>
-              <a:t>Show and explain </a:t>
-            </a:r>
-            <a:r>
-              <a:rPr lang="en-US" dirty="0" err="1"/>
-              <a:t>kubeconfig</a:t>
-            </a:r>
-            <a:r>
-              <a:rPr lang="en-US" dirty="0"/>
-              <a:t> with namespace etc.</a:t>
-            </a:r>
-          </a:p>
-          <a:p>
-            <a:pPr marL="342900" indent="-342900">
-              <a:buSzPct val="100000"/>
-              <a:buFont typeface="Wingdings" panose="05000000000000000000" pitchFamily="2" charset="2"/>
-              <a:buChar char="§"/>
-            </a:pPr>
-            <a:r>
-              <a:rPr lang="en-US" dirty="0"/>
-              <a:t>Query API server with curl and get back the API’s</a:t>
-            </a:r>
-          </a:p>
-          <a:p>
-            <a:pPr marL="342900" indent="-342900">
-              <a:buSzPct val="100000"/>
-              <a:buFont typeface="Wingdings" panose="05000000000000000000" pitchFamily="2" charset="2"/>
-              <a:buChar char="§"/>
-            </a:pPr>
-            <a:r>
-              <a:rPr lang="en-US" dirty="0" err="1"/>
-              <a:t>Kubectl</a:t>
-            </a:r>
-            <a:r>
-              <a:rPr lang="en-US" dirty="0"/>
-              <a:t> get &amp; describe nodes</a:t>
-            </a:r>
-          </a:p>
-          <a:p>
-            <a:pPr marL="342900" indent="-342900">
-              <a:buSzPct val="100000"/>
-              <a:buFont typeface="Wingdings" panose="05000000000000000000" pitchFamily="2" charset="2"/>
-              <a:buChar char="§"/>
-            </a:pPr>
-            <a:r>
-              <a:rPr lang="en-US" dirty="0"/>
-              <a:t>SSH into one of the nodes and show kubelet (</a:t>
-            </a:r>
-            <a:r>
-              <a:rPr lang="en-US" dirty="0" err="1"/>
-              <a:t>ps</a:t>
-            </a:r>
-            <a:r>
-              <a:rPr lang="en-US" dirty="0"/>
-              <a:t> </a:t>
-            </a:r>
-            <a:r>
-              <a:rPr lang="en-US" dirty="0" err="1"/>
-              <a:t>aufx</a:t>
-            </a:r>
-            <a:r>
-              <a:rPr lang="en-US" dirty="0"/>
-              <a:t>)</a:t>
-            </a:r>
-          </a:p>
-        </p:txBody>
-      </p:sp>
-      <p:sp>
-        <p:nvSpPr>
-          <p:cNvPr id="3" name="Title 2"/>
+          <p:cNvPr id="3" name="Title 2">
+            <a:extLst>
+              <a:ext uri="{FF2B5EF4-FFF2-40B4-BE49-F238E27FC236}">
+                <a16:creationId xmlns:a16="http://schemas.microsoft.com/office/drawing/2014/main" id="{B4B6938A-7A0C-4712-A9B8-41F25B66C8A4}"/>
+              </a:ext>
+            </a:extLst>
+          </p:cNvPr>
           <p:cNvSpPr>
             <a:spLocks noGrp="1"/>
           </p:cNvSpPr>
@@ -15582,15 +16024,45 @@
           <a:p>
             <a:r>
               <a:rPr lang="en-US" dirty="0"/>
-              <a:t>Demo Info</a:t>
+              <a:t>Exercise 01</a:t>
             </a:r>
           </a:p>
         </p:txBody>
       </p:sp>
+      <p:pic>
+        <p:nvPicPr>
+          <p:cNvPr id="6" name="Picture 5">
+            <a:extLst>
+              <a:ext uri="{FF2B5EF4-FFF2-40B4-BE49-F238E27FC236}">
+                <a16:creationId xmlns:a16="http://schemas.microsoft.com/office/drawing/2014/main" id="{6449D282-DC4E-4479-991B-68509FF3A710}"/>
+              </a:ext>
+            </a:extLst>
+          </p:cNvPr>
+          <p:cNvPicPr>
+            <a:picLocks noChangeAspect="1"/>
+          </p:cNvPicPr>
+          <p:nvPr/>
+        </p:nvPicPr>
+        <p:blipFill>
+          <a:blip r:embed="rId3"/>
+          <a:stretch>
+            <a:fillRect/>
+          </a:stretch>
+        </p:blipFill>
+        <p:spPr>
+          <a:xfrm>
+            <a:off x="4261672" y="1181180"/>
+            <a:ext cx="3773347" cy="3773347"/>
+          </a:xfrm>
+          <a:prstGeom prst="rect">
+            <a:avLst/>
+          </a:prstGeom>
+        </p:spPr>
+      </p:pic>
     </p:spTree>
     <p:extLst>
       <p:ext uri="{BB962C8B-B14F-4D97-AF65-F5344CB8AC3E}">
-        <p14:creationId xmlns:p14="http://schemas.microsoft.com/office/powerpoint/2010/main" val="2819952857"/>
+        <p14:creationId xmlns:p14="http://schemas.microsoft.com/office/powerpoint/2010/main" val="2757824260"/>
       </p:ext>
     </p:extLst>
   </p:cSld>
@@ -15600,7 +16072,7 @@
 </p:sld>
 </file>
 
-<file path=ppt/slides/slide13.xml><?xml version="1.0" encoding="utf-8"?>
+<file path=ppt/slides/slide14.xml><?xml version="1.0" encoding="utf-8"?>
 <p:sld xmlns:a="http://schemas.openxmlformats.org/drawingml/2006/main" xmlns:r="http://schemas.openxmlformats.org/officeDocument/2006/relationships" xmlns:p="http://schemas.openxmlformats.org/presentationml/2006/main" show="0">
   <p:cSld>
     <p:spTree>

</xml_diff>

<commit_message>
only api server talks to etcd
</commit_message>
<xml_diff>
--- a/kubernetes/01_k8s_core_components.pptx
+++ b/kubernetes/01_k8s_core_components.pptx
@@ -198,6 +198,32 @@
     </p:ext>
   </p:extLst>
 </p:presentation>
+</file>
+
+<file path=ppt/commentAuthors.xml><?xml version="1.0" encoding="utf-8"?>
+<p:cmAuthorLst xmlns:a="http://schemas.openxmlformats.org/drawingml/2006/main" xmlns:r="http://schemas.openxmlformats.org/officeDocument/2006/relationships" xmlns:p="http://schemas.openxmlformats.org/presentationml/2006/main">
+  <p:cmAuthor id="1" name="Partsch, Holger" initials="PH" lastIdx="1" clrIdx="0">
+    <p:extLst>
+      <p:ext uri="{19B8F6BF-5375-455C-9EA6-DF929625EA0E}">
+        <p15:presenceInfo xmlns:p15="http://schemas.microsoft.com/office/powerpoint/2012/main" userId="S-1-5-21-74642-3284969411-2123768488-120253" providerId="AD"/>
+      </p:ext>
+    </p:extLst>
+  </p:cmAuthor>
+</p:cmAuthorLst>
+</file>
+
+<file path=ppt/comments/comment1.xml><?xml version="1.0" encoding="utf-8"?>
+<p:cmLst xmlns:a="http://schemas.openxmlformats.org/drawingml/2006/main" xmlns:r="http://schemas.openxmlformats.org/officeDocument/2006/relationships" xmlns:p="http://schemas.openxmlformats.org/presentationml/2006/main">
+  <p:cm authorId="1" dt="2018-08-07T17:14:08.631" idx="1">
+    <p:pos x="10" y="10"/>
+    <p:text>The api server is the only component that connects to etcd.</p:text>
+    <p:extLst>
+      <p:ext uri="{C676402C-5697-4E1C-873F-D02D1690AC5C}">
+        <p15:threadingInfo xmlns:p15="http://schemas.microsoft.com/office/powerpoint/2012/main" timeZoneBias="-120"/>
+      </p:ext>
+    </p:extLst>
+  </p:cm>
+</p:cmLst>
 </file>
 
 <file path=ppt/diagrams/colors1.xml><?xml version="1.0" encoding="utf-8"?>
@@ -18130,46 +18156,6 @@
       </p:cxnSp>
       <p:cxnSp>
         <p:nvCxnSpPr>
-          <p:cNvPr id="49" name="Straight Arrow Connector 48"/>
-          <p:cNvCxnSpPr>
-            <a:stCxn id="23" idx="3"/>
-            <a:endCxn id="28" idx="1"/>
-          </p:cNvCxnSpPr>
-          <p:nvPr/>
-        </p:nvCxnSpPr>
-        <p:spPr>
-          <a:xfrm flipV="1">
-            <a:off x="6678106" y="4095750"/>
-            <a:ext cx="638175" cy="632460"/>
-          </a:xfrm>
-          <a:prstGeom prst="straightConnector1">
-            <a:avLst/>
-          </a:prstGeom>
-          <a:ln w="57150">
-            <a:solidFill>
-              <a:schemeClr val="accent2"/>
-            </a:solidFill>
-            <a:headEnd type="triangle"/>
-            <a:tailEnd type="triangle"/>
-          </a:ln>
-        </p:spPr>
-        <p:style>
-          <a:lnRef idx="1">
-            <a:schemeClr val="accent1"/>
-          </a:lnRef>
-          <a:fillRef idx="0">
-            <a:schemeClr val="accent1"/>
-          </a:fillRef>
-          <a:effectRef idx="0">
-            <a:schemeClr val="accent1"/>
-          </a:effectRef>
-          <a:fontRef idx="minor">
-            <a:schemeClr val="tx1"/>
-          </a:fontRef>
-        </p:style>
-      </p:cxnSp>
-      <p:cxnSp>
-        <p:nvCxnSpPr>
           <p:cNvPr id="53" name="Straight Arrow Connector 52"/>
           <p:cNvCxnSpPr>
             <a:stCxn id="32" idx="2"/>
@@ -18388,15 +18374,7 @@
             <a:pPr lvl="1"/>
             <a:r>
               <a:rPr lang="en-US" dirty="0"/>
-              <a:t>watches </a:t>
-            </a:r>
-            <a:r>
-              <a:rPr lang="en-US" dirty="0" err="1"/>
-              <a:t>etcd</a:t>
-            </a:r>
-            <a:r>
-              <a:rPr lang="en-US" dirty="0"/>
-              <a:t> for replication tasks and uses the API to enforce the desired state</a:t>
+              <a:t>watches the API Server for replication tasks and uses the API to enforce the desired state</a:t>
             </a:r>
           </a:p>
           <a:p>
@@ -18408,9 +18386,10 @@
           <a:p>
             <a:pPr lvl="1"/>
             <a:r>
-              <a:rPr lang="en-US" dirty="0"/>
+              <a:rPr lang="en-US"/>
               <a:t>Assigns resources to nodes for execution</a:t>
             </a:r>
+            <a:endParaRPr lang="en-US" dirty="0"/>
           </a:p>
         </p:txBody>
       </p:sp>

</xml_diff>

<commit_message>
remove comments from slides
</commit_message>
<xml_diff>
--- a/kubernetes/01_k8s_core_components.pptx
+++ b/kubernetes/01_k8s_core_components.pptx
@@ -210,48 +210,6 @@
     </p:extLst>
   </p:cmAuthor>
 </p:cmAuthorLst>
-</file>
-
-<file path=ppt/comments/comment1.xml><?xml version="1.0" encoding="utf-8"?>
-<p:cmLst xmlns:a="http://schemas.openxmlformats.org/drawingml/2006/main" xmlns:r="http://schemas.openxmlformats.org/officeDocument/2006/relationships" xmlns:p="http://schemas.openxmlformats.org/presentationml/2006/main">
-  <p:cm authorId="1" dt="2018-08-07T17:14:08.631" idx="1">
-    <p:pos x="10" y="10"/>
-    <p:text>The api server is the only component that connects to etcd.</p:text>
-    <p:extLst>
-      <p:ext uri="{C676402C-5697-4E1C-873F-D02D1690AC5C}">
-        <p15:threadingInfo xmlns:p15="http://schemas.microsoft.com/office/powerpoint/2012/main" timeZoneBias="-120"/>
-      </p:ext>
-    </p:extLst>
-  </p:cm>
-</p:cmLst>
-</file>
-
-<file path=ppt/comments/comment2.xml><?xml version="1.0" encoding="utf-8"?>
-<p:cmLst xmlns:a="http://schemas.openxmlformats.org/drawingml/2006/main" xmlns:r="http://schemas.openxmlformats.org/officeDocument/2006/relationships" xmlns:p="http://schemas.openxmlformats.org/presentationml/2006/main">
-  <p:cm authorId="1" dt="2018-08-07T17:23:04.726" idx="2">
-    <p:pos x="1152" y="1916"/>
-    <p:text>kube-proxy: What you say is only true if proxy-mode = iptables</p:text>
-    <p:extLst>
-      <p:ext uri="{C676402C-5697-4E1C-873F-D02D1690AC5C}">
-        <p15:threadingInfo xmlns:p15="http://schemas.microsoft.com/office/powerpoint/2012/main" timeZoneBias="-120"/>
-      </p:ext>
-    </p:extLst>
-  </p:cm>
-</p:cmLst>
-</file>
-
-<file path=ppt/comments/comment3.xml><?xml version="1.0" encoding="utf-8"?>
-<p:cmLst xmlns:a="http://schemas.openxmlformats.org/drawingml/2006/main" xmlns:r="http://schemas.openxmlformats.org/officeDocument/2006/relationships" xmlns:p="http://schemas.openxmlformats.org/presentationml/2006/main">
-  <p:cm authorId="1" dt="2018-08-07T17:30:20.595" idx="3">
-    <p:pos x="10" y="10"/>
-    <p:text>What orchestrator?</p:text>
-    <p:extLst>
-      <p:ext uri="{C676402C-5697-4E1C-873F-D02D1690AC5C}">
-        <p15:threadingInfo xmlns:p15="http://schemas.microsoft.com/office/powerpoint/2012/main" timeZoneBias="-120"/>
-      </p:ext>
-    </p:extLst>
-  </p:cm>
-</p:cmLst>
 </file>
 
 <file path=ppt/diagrams/colors1.xml><?xml version="1.0" encoding="utf-8"?>

</xml_diff>

<commit_message>
fix animation on slide 7
</commit_message>
<xml_diff>
--- a/kubernetes/01_k8s_core_components.pptx
+++ b/kubernetes/01_k8s_core_components.pptx
@@ -16719,8 +16719,8 @@
         </p:nvSpPr>
         <p:spPr bwMode="gray">
           <a:xfrm>
-            <a:off x="504001" y="2377440"/>
-            <a:ext cx="3703320" cy="3070860"/>
+            <a:off x="504000" y="2377440"/>
+            <a:ext cx="5545429" cy="3070860"/>
           </a:xfrm>
           <a:prstGeom prst="rect">
             <a:avLst/>
@@ -17032,7 +17032,7 @@
         </p:nvSpPr>
         <p:spPr bwMode="gray">
           <a:xfrm>
-            <a:off x="2170052" y="1411605"/>
+            <a:off x="1255655" y="1411605"/>
             <a:ext cx="2037269" cy="434340"/>
           </a:xfrm>
           <a:prstGeom prst="rect">
@@ -17107,7 +17107,7 @@
         </p:nvSpPr>
         <p:spPr bwMode="gray">
           <a:xfrm>
-            <a:off x="2103120" y="1181100"/>
+            <a:off x="1188723" y="1181100"/>
             <a:ext cx="302071" cy="312420"/>
           </a:xfrm>
           <a:prstGeom prst="ellipse">
@@ -17164,7 +17164,7 @@
         </p:nvSpPr>
         <p:spPr bwMode="gray">
           <a:xfrm rot="16200000">
-            <a:off x="1981741" y="1589619"/>
+            <a:off x="1067344" y="1589619"/>
             <a:ext cx="544828" cy="459313"/>
           </a:xfrm>
           <a:prstGeom prst="flowChartDelay">
@@ -17221,7 +17221,7 @@
         </p:nvCxnSpPr>
         <p:spPr>
           <a:xfrm>
-            <a:off x="3314700" y="1845945"/>
+            <a:off x="2400303" y="1845945"/>
             <a:ext cx="7620" cy="1156335"/>
           </a:xfrm>
           <a:prstGeom prst="straightConnector1">
@@ -17332,7 +17332,7 @@
         </p:nvSpPr>
         <p:spPr bwMode="gray">
           <a:xfrm>
-            <a:off x="4975035" y="3997642"/>
+            <a:off x="4095594" y="3742372"/>
             <a:ext cx="1703071" cy="1461135"/>
           </a:xfrm>
           <a:prstGeom prst="rect">
@@ -17344,27 +17344,26 @@
           </a:ln>
         </p:spPr>
         <p:style>
-          <a:lnRef idx="1">
-            <a:schemeClr val="accent2"/>
+          <a:lnRef idx="2">
+            <a:schemeClr val="accent2">
+              <a:shade val="50000"/>
+            </a:schemeClr>
           </a:lnRef>
-          <a:fillRef idx="2">
+          <a:fillRef idx="1">
             <a:schemeClr val="accent2"/>
           </a:fillRef>
-          <a:effectRef idx="1">
+          <a:effectRef idx="0">
             <a:schemeClr val="accent2"/>
           </a:effectRef>
           <a:fontRef idx="minor">
-            <a:schemeClr val="dk1"/>
+            <a:schemeClr val="lt1"/>
           </a:fontRef>
         </p:style>
         <p:txBody>
           <a:bodyPr lIns="90000" tIns="72000" rIns="90000" bIns="72000" rtlCol="0" anchor="ctr"/>
           <a:lstStyle/>
           <a:p>
-            <a:pPr marR="0" algn="ctr" defTabSz="914400" eaLnBrk="1" fontAlgn="base" latinLnBrk="0" hangingPunct="1">
-              <a:lnSpc>
-                <a:spcPct val="100000"/>
-              </a:lnSpc>
+            <a:pPr algn="ctr" defTabSz="914400" fontAlgn="base">
               <a:spcBef>
                 <a:spcPct val="50000"/>
               </a:spcBef>
@@ -17375,37 +17374,25 @@
                 <a:srgbClr val="F0AB00"/>
               </a:buClr>
               <a:buSzPct val="80000"/>
-              <a:tabLst/>
             </a:pPr>
             <a:r>
-              <a:rPr kumimoji="0" lang="de-DE" sz="2400" b="1" i="0" strike="noStrike" kern="0" cap="none" spc="0" normalizeH="0" baseline="0" noProof="0" dirty="0" err="1">
-                <a:ln>
-                  <a:noFill/>
-                </a:ln>
-                <a:effectLst/>
-                <a:uLnTx/>
-                <a:uFillTx/>
+              <a:rPr lang="de-DE" sz="1800" b="1" kern="0" dirty="0" err="1">
+                <a:solidFill>
+                  <a:schemeClr val="lt1"/>
+                </a:solidFill>
                 <a:ea typeface="Arial Unicode MS" pitchFamily="34" charset="-128"/>
-                <a:cs typeface="Arial Unicode MS" pitchFamily="34" charset="-128"/>
               </a:rPr>
               <a:t>etcd</a:t>
             </a:r>
-            <a:endParaRPr kumimoji="0" lang="de-DE" sz="2400" b="1" i="0" strike="noStrike" kern="0" cap="none" spc="0" normalizeH="0" baseline="0" noProof="0" dirty="0">
-              <a:ln>
-                <a:noFill/>
-              </a:ln>
-              <a:effectLst/>
-              <a:uLnTx/>
-              <a:uFillTx/>
+            <a:endParaRPr lang="de-DE" sz="1800" b="1" kern="0" dirty="0">
+              <a:solidFill>
+                <a:schemeClr val="lt1"/>
+              </a:solidFill>
               <a:ea typeface="Arial Unicode MS" pitchFamily="34" charset="-128"/>
-              <a:cs typeface="Arial Unicode MS" pitchFamily="34" charset="-128"/>
             </a:endParaRPr>
           </a:p>
           <a:p>
-            <a:pPr marR="0" algn="ctr" defTabSz="914400" eaLnBrk="1" fontAlgn="base" latinLnBrk="0" hangingPunct="1">
-              <a:lnSpc>
-                <a:spcPct val="100000"/>
-              </a:lnSpc>
+            <a:pPr algn="ctr" defTabSz="914400" fontAlgn="base">
               <a:spcBef>
                 <a:spcPct val="50000"/>
               </a:spcBef>
@@ -17416,59 +17403,66 @@
                 <a:srgbClr val="F0AB00"/>
               </a:buClr>
               <a:buSzPct val="80000"/>
-              <a:tabLst/>
             </a:pPr>
             <a:r>
-              <a:rPr lang="de-DE" sz="1400" b="1" kern="0" dirty="0">
+              <a:rPr lang="de-DE" sz="1800" b="1" kern="0" dirty="0">
+                <a:solidFill>
+                  <a:schemeClr val="lt1"/>
+                </a:solidFill>
                 <a:ea typeface="Arial Unicode MS" pitchFamily="34" charset="-128"/>
-                <a:cs typeface="Arial Unicode MS" pitchFamily="34" charset="-128"/>
               </a:rPr>
               <a:t>(</a:t>
             </a:r>
             <a:r>
-              <a:rPr lang="de-DE" sz="1400" b="1" kern="0" dirty="0" err="1">
+              <a:rPr lang="de-DE" sz="1800" b="1" kern="0" dirty="0" err="1">
+                <a:solidFill>
+                  <a:schemeClr val="lt1"/>
+                </a:solidFill>
                 <a:ea typeface="Arial Unicode MS" pitchFamily="34" charset="-128"/>
-                <a:cs typeface="Arial Unicode MS" pitchFamily="34" charset="-128"/>
               </a:rPr>
               <a:t>distributed</a:t>
             </a:r>
             <a:r>
-              <a:rPr lang="de-DE" sz="1400" b="1" kern="0" dirty="0">
+              <a:rPr lang="de-DE" sz="1800" b="1" kern="0" dirty="0">
+                <a:solidFill>
+                  <a:schemeClr val="lt1"/>
+                </a:solidFill>
                 <a:ea typeface="Arial Unicode MS" pitchFamily="34" charset="-128"/>
-                <a:cs typeface="Arial Unicode MS" pitchFamily="34" charset="-128"/>
               </a:rPr>
               <a:t>) </a:t>
             </a:r>
             <a:r>
-              <a:rPr lang="de-DE" sz="1400" b="1" kern="0" dirty="0" err="1">
+              <a:rPr lang="de-DE" sz="1800" b="1" kern="0" dirty="0" err="1">
+                <a:solidFill>
+                  <a:schemeClr val="lt1"/>
+                </a:solidFill>
                 <a:ea typeface="Arial Unicode MS" pitchFamily="34" charset="-128"/>
-                <a:cs typeface="Arial Unicode MS" pitchFamily="34" charset="-128"/>
               </a:rPr>
               <a:t>key-value</a:t>
             </a:r>
             <a:r>
-              <a:rPr lang="de-DE" sz="1400" b="1" kern="0" dirty="0">
+              <a:rPr lang="de-DE" sz="1800" b="1" kern="0" dirty="0">
+                <a:solidFill>
+                  <a:schemeClr val="lt1"/>
+                </a:solidFill>
                 <a:ea typeface="Arial Unicode MS" pitchFamily="34" charset="-128"/>
-                <a:cs typeface="Arial Unicode MS" pitchFamily="34" charset="-128"/>
               </a:rPr>
               <a:t> </a:t>
             </a:r>
             <a:r>
-              <a:rPr lang="de-DE" sz="1400" b="1" kern="0" dirty="0" err="1">
+              <a:rPr lang="de-DE" sz="1800" b="1" kern="0" dirty="0" err="1">
+                <a:solidFill>
+                  <a:schemeClr val="lt1"/>
+                </a:solidFill>
                 <a:ea typeface="Arial Unicode MS" pitchFamily="34" charset="-128"/>
-                <a:cs typeface="Arial Unicode MS" pitchFamily="34" charset="-128"/>
               </a:rPr>
               <a:t>store</a:t>
             </a:r>
-            <a:endParaRPr kumimoji="0" lang="de-DE" sz="2400" b="1" i="0" strike="noStrike" kern="0" cap="none" spc="0" normalizeH="0" baseline="0" noProof="0" dirty="0">
-              <a:ln>
-                <a:noFill/>
-              </a:ln>
-              <a:effectLst/>
-              <a:uLnTx/>
-              <a:uFillTx/>
+            <a:endParaRPr lang="de-DE" sz="1800" b="1" kern="0" dirty="0">
+              <a:solidFill>
+                <a:schemeClr val="lt1"/>
+              </a:solidFill>
               <a:ea typeface="Arial Unicode MS" pitchFamily="34" charset="-128"/>
-              <a:cs typeface="Arial Unicode MS" pitchFamily="34" charset="-128"/>
             </a:endParaRPr>
           </a:p>
         </p:txBody>
@@ -17477,15 +17471,14 @@
         <p:nvCxnSpPr>
           <p:cNvPr id="25" name="Straight Arrow Connector 24"/>
           <p:cNvCxnSpPr>
-            <a:stCxn id="4" idx="3"/>
-            <a:endCxn id="23" idx="1"/>
+            <a:cxnSpLocks/>
           </p:cNvCxnSpPr>
           <p:nvPr/>
         </p:nvCxnSpPr>
         <p:spPr>
           <a:xfrm>
-            <a:off x="3563431" y="3425190"/>
-            <a:ext cx="1411604" cy="1303020"/>
+            <a:off x="3592226" y="3589020"/>
+            <a:ext cx="503368" cy="577637"/>
           </a:xfrm>
           <a:prstGeom prst="straightConnector1">
             <a:avLst/>
@@ -18819,7 +18812,7 @@
         <p:spPr bwMode="gray">
           <a:xfrm>
             <a:off x="504001" y="2377440"/>
-            <a:ext cx="3703320" cy="3070860"/>
+            <a:ext cx="5593586" cy="3070860"/>
           </a:xfrm>
           <a:prstGeom prst="rect">
             <a:avLst/>
@@ -19131,7 +19124,7 @@
         </p:nvSpPr>
         <p:spPr bwMode="gray">
           <a:xfrm>
-            <a:off x="2170052" y="1411605"/>
+            <a:off x="1183230" y="1547407"/>
             <a:ext cx="2037269" cy="434340"/>
           </a:xfrm>
           <a:prstGeom prst="rect">
@@ -19206,7 +19199,7 @@
         </p:nvSpPr>
         <p:spPr bwMode="gray">
           <a:xfrm>
-            <a:off x="2103120" y="1181100"/>
+            <a:off x="1116298" y="1316902"/>
             <a:ext cx="302071" cy="312420"/>
           </a:xfrm>
           <a:prstGeom prst="ellipse">
@@ -19263,7 +19256,7 @@
         </p:nvSpPr>
         <p:spPr bwMode="gray">
           <a:xfrm rot="16200000">
-            <a:off x="1981741" y="1589619"/>
+            <a:off x="994919" y="1725421"/>
             <a:ext cx="544828" cy="459313"/>
           </a:xfrm>
           <a:prstGeom prst="flowChartDelay">
@@ -19315,13 +19308,15 @@
       <p:cxnSp>
         <p:nvCxnSpPr>
           <p:cNvPr id="11" name="Straight Arrow Connector 10"/>
-          <p:cNvCxnSpPr/>
+          <p:cNvCxnSpPr>
+            <a:cxnSpLocks/>
+          </p:cNvCxnSpPr>
           <p:nvPr/>
         </p:nvCxnSpPr>
         <p:spPr>
           <a:xfrm>
-            <a:off x="3314700" y="1845945"/>
-            <a:ext cx="7620" cy="1156335"/>
+            <a:off x="2335498" y="1981747"/>
+            <a:ext cx="0" cy="1020533"/>
           </a:xfrm>
           <a:prstGeom prst="straightConnector1">
             <a:avLst/>
@@ -19925,13 +19920,13 @@
         </p:nvSpPr>
         <p:spPr bwMode="gray">
           <a:xfrm>
-            <a:off x="435998" y="1084901"/>
+            <a:off x="3952730" y="1242609"/>
             <a:ext cx="1279079" cy="521968"/>
           </a:xfrm>
           <a:prstGeom prst="wedgeRectCallout">
             <a:avLst>
-              <a:gd name="adj1" fmla="val 79847"/>
-              <a:gd name="adj2" fmla="val 17466"/>
+              <a:gd name="adj1" fmla="val -134620"/>
+              <a:gd name="adj2" fmla="val 26138"/>
             </a:avLst>
           </a:prstGeom>
           <a:solidFill>
@@ -20077,6 +20072,201 @@
           </a:fontRef>
         </p:style>
       </p:cxnSp>
+      <p:sp>
+        <p:nvSpPr>
+          <p:cNvPr id="26" name="Rectangle 25">
+            <a:extLst>
+              <a:ext uri="{FF2B5EF4-FFF2-40B4-BE49-F238E27FC236}">
+                <a16:creationId xmlns:a16="http://schemas.microsoft.com/office/drawing/2014/main" id="{2465639A-C163-41AC-B995-67CEDD36FC9E}"/>
+              </a:ext>
+            </a:extLst>
+          </p:cNvPr>
+          <p:cNvSpPr/>
+          <p:nvPr/>
+        </p:nvSpPr>
+        <p:spPr bwMode="gray">
+          <a:xfrm>
+            <a:off x="4095594" y="3742372"/>
+            <a:ext cx="1703071" cy="1461135"/>
+          </a:xfrm>
+          <a:prstGeom prst="rect">
+            <a:avLst/>
+          </a:prstGeom>
+          <a:ln>
+            <a:headEnd/>
+            <a:tailEnd/>
+          </a:ln>
+        </p:spPr>
+        <p:style>
+          <a:lnRef idx="2">
+            <a:schemeClr val="accent2">
+              <a:shade val="50000"/>
+            </a:schemeClr>
+          </a:lnRef>
+          <a:fillRef idx="1">
+            <a:schemeClr val="accent2"/>
+          </a:fillRef>
+          <a:effectRef idx="0">
+            <a:schemeClr val="accent2"/>
+          </a:effectRef>
+          <a:fontRef idx="minor">
+            <a:schemeClr val="lt1"/>
+          </a:fontRef>
+        </p:style>
+        <p:txBody>
+          <a:bodyPr lIns="90000" tIns="72000" rIns="90000" bIns="72000" rtlCol="0" anchor="ctr"/>
+          <a:lstStyle/>
+          <a:p>
+            <a:pPr algn="ctr" defTabSz="914400" fontAlgn="base">
+              <a:spcBef>
+                <a:spcPct val="50000"/>
+              </a:spcBef>
+              <a:spcAft>
+                <a:spcPct val="0"/>
+              </a:spcAft>
+              <a:buClr>
+                <a:srgbClr val="F0AB00"/>
+              </a:buClr>
+              <a:buSzPct val="80000"/>
+            </a:pPr>
+            <a:r>
+              <a:rPr lang="de-DE" sz="1800" b="1" kern="0" dirty="0" err="1">
+                <a:solidFill>
+                  <a:schemeClr val="lt1"/>
+                </a:solidFill>
+                <a:ea typeface="Arial Unicode MS" pitchFamily="34" charset="-128"/>
+              </a:rPr>
+              <a:t>etcd</a:t>
+            </a:r>
+            <a:endParaRPr lang="de-DE" sz="1800" b="1" kern="0" dirty="0">
+              <a:solidFill>
+                <a:schemeClr val="lt1"/>
+              </a:solidFill>
+              <a:ea typeface="Arial Unicode MS" pitchFamily="34" charset="-128"/>
+            </a:endParaRPr>
+          </a:p>
+          <a:p>
+            <a:pPr algn="ctr" defTabSz="914400" fontAlgn="base">
+              <a:spcBef>
+                <a:spcPct val="50000"/>
+              </a:spcBef>
+              <a:spcAft>
+                <a:spcPct val="0"/>
+              </a:spcAft>
+              <a:buClr>
+                <a:srgbClr val="F0AB00"/>
+              </a:buClr>
+              <a:buSzPct val="80000"/>
+            </a:pPr>
+            <a:r>
+              <a:rPr lang="de-DE" sz="1800" b="1" kern="0" dirty="0">
+                <a:solidFill>
+                  <a:schemeClr val="lt1"/>
+                </a:solidFill>
+                <a:ea typeface="Arial Unicode MS" pitchFamily="34" charset="-128"/>
+              </a:rPr>
+              <a:t>(</a:t>
+            </a:r>
+            <a:r>
+              <a:rPr lang="de-DE" sz="1800" b="1" kern="0" dirty="0" err="1">
+                <a:solidFill>
+                  <a:schemeClr val="lt1"/>
+                </a:solidFill>
+                <a:ea typeface="Arial Unicode MS" pitchFamily="34" charset="-128"/>
+              </a:rPr>
+              <a:t>distributed</a:t>
+            </a:r>
+            <a:r>
+              <a:rPr lang="de-DE" sz="1800" b="1" kern="0" dirty="0">
+                <a:solidFill>
+                  <a:schemeClr val="lt1"/>
+                </a:solidFill>
+                <a:ea typeface="Arial Unicode MS" pitchFamily="34" charset="-128"/>
+              </a:rPr>
+              <a:t>) </a:t>
+            </a:r>
+            <a:r>
+              <a:rPr lang="de-DE" sz="1800" b="1" kern="0" dirty="0" err="1">
+                <a:solidFill>
+                  <a:schemeClr val="lt1"/>
+                </a:solidFill>
+                <a:ea typeface="Arial Unicode MS" pitchFamily="34" charset="-128"/>
+              </a:rPr>
+              <a:t>key-value</a:t>
+            </a:r>
+            <a:r>
+              <a:rPr lang="de-DE" sz="1800" b="1" kern="0" dirty="0">
+                <a:solidFill>
+                  <a:schemeClr val="lt1"/>
+                </a:solidFill>
+                <a:ea typeface="Arial Unicode MS" pitchFamily="34" charset="-128"/>
+              </a:rPr>
+              <a:t> </a:t>
+            </a:r>
+            <a:r>
+              <a:rPr lang="de-DE" sz="1800" b="1" kern="0" dirty="0" err="1">
+                <a:solidFill>
+                  <a:schemeClr val="lt1"/>
+                </a:solidFill>
+                <a:ea typeface="Arial Unicode MS" pitchFamily="34" charset="-128"/>
+              </a:rPr>
+              <a:t>store</a:t>
+            </a:r>
+            <a:endParaRPr lang="de-DE" sz="1800" b="1" kern="0" dirty="0">
+              <a:solidFill>
+                <a:schemeClr val="lt1"/>
+              </a:solidFill>
+              <a:ea typeface="Arial Unicode MS" pitchFamily="34" charset="-128"/>
+            </a:endParaRPr>
+          </a:p>
+        </p:txBody>
+      </p:sp>
+      <p:cxnSp>
+        <p:nvCxnSpPr>
+          <p:cNvPr id="27" name="Straight Arrow Connector 26">
+            <a:extLst>
+              <a:ext uri="{FF2B5EF4-FFF2-40B4-BE49-F238E27FC236}">
+                <a16:creationId xmlns:a16="http://schemas.microsoft.com/office/drawing/2014/main" id="{CFB68573-EF2D-4B02-A454-22163105B859}"/>
+              </a:ext>
+            </a:extLst>
+          </p:cNvPr>
+          <p:cNvCxnSpPr>
+            <a:cxnSpLocks/>
+            <a:stCxn id="4" idx="3"/>
+          </p:cNvCxnSpPr>
+          <p:nvPr/>
+        </p:nvCxnSpPr>
+        <p:spPr>
+          <a:xfrm>
+            <a:off x="3563431" y="3425190"/>
+            <a:ext cx="532163" cy="666976"/>
+          </a:xfrm>
+          <a:prstGeom prst="straightConnector1">
+            <a:avLst/>
+          </a:prstGeom>
+          <a:ln w="57150">
+            <a:solidFill>
+              <a:schemeClr val="accent1"/>
+            </a:solidFill>
+            <a:headEnd type="none" w="med" len="med"/>
+            <a:tailEnd type="triangle"/>
+          </a:ln>
+        </p:spPr>
+        <p:style>
+          <a:lnRef idx="1">
+            <a:schemeClr val="accent2"/>
+          </a:lnRef>
+          <a:fillRef idx="0">
+            <a:schemeClr val="accent2"/>
+          </a:fillRef>
+          <a:effectRef idx="0">
+            <a:schemeClr val="accent2"/>
+          </a:effectRef>
+          <a:fontRef idx="minor">
+            <a:schemeClr val="tx1"/>
+          </a:fontRef>
+        </p:style>
+      </p:cxnSp>
     </p:spTree>
     <p:extLst>
       <p:ext uri="{BB962C8B-B14F-4D97-AF65-F5344CB8AC3E}">
@@ -20108,7 +20298,7 @@
                             </p:stCondLst>
                             <p:childTnLst>
                               <p:par>
-                                <p:cTn id="5" presetID="1" presetClass="entr" presetSubtype="0" fill="hold" grpId="0" nodeType="clickEffect">
+                                <p:cTn id="5" presetID="1" presetClass="entr" presetSubtype="0" fill="hold" nodeType="clickEffect">
                                   <p:stCondLst>
                                     <p:cond delay="0"/>
                                   </p:stCondLst>
@@ -20121,7 +20311,7 @@
                                           </p:stCondLst>
                                         </p:cTn>
                                         <p:tgtEl>
-                                          <p:spTgt spid="2"/>
+                                          <p:spTgt spid="11"/>
                                         </p:tgtEl>
                                         <p:attrNameLst>
                                           <p:attrName>style.visibility</p:attrName>
@@ -20166,7 +20356,7 @@
                                           </p:stCondLst>
                                         </p:cTn>
                                         <p:tgtEl>
-                                          <p:spTgt spid="11"/>
+                                          <p:spTgt spid="27"/>
                                         </p:tgtEl>
                                         <p:attrNameLst>
                                           <p:attrName>style.visibility</p:attrName>
@@ -20211,6 +20401,78 @@
                                           </p:stCondLst>
                                         </p:cTn>
                                         <p:tgtEl>
+                                          <p:spTgt spid="20"/>
+                                        </p:tgtEl>
+                                        <p:attrNameLst>
+                                          <p:attrName>style.visibility</p:attrName>
+                                        </p:attrNameLst>
+                                      </p:cBhvr>
+                                      <p:to>
+                                        <p:strVal val="visible"/>
+                                      </p:to>
+                                    </p:set>
+                                  </p:childTnLst>
+                                </p:cTn>
+                              </p:par>
+                              <p:par>
+                                <p:cTn id="15" presetID="1" presetClass="entr" presetSubtype="0" fill="hold" nodeType="withEffect">
+                                  <p:stCondLst>
+                                    <p:cond delay="0"/>
+                                  </p:stCondLst>
+                                  <p:childTnLst>
+                                    <p:set>
+                                      <p:cBhvr>
+                                        <p:cTn id="16" dur="1" fill="hold">
+                                          <p:stCondLst>
+                                            <p:cond delay="0"/>
+                                          </p:stCondLst>
+                                        </p:cTn>
+                                        <p:tgtEl>
+                                          <p:spTgt spid="22"/>
+                                        </p:tgtEl>
+                                        <p:attrNameLst>
+                                          <p:attrName>style.visibility</p:attrName>
+                                        </p:attrNameLst>
+                                      </p:cBhvr>
+                                      <p:to>
+                                        <p:strVal val="visible"/>
+                                      </p:to>
+                                    </p:set>
+                                  </p:childTnLst>
+                                </p:cTn>
+                              </p:par>
+                            </p:childTnLst>
+                          </p:cTn>
+                        </p:par>
+                      </p:childTnLst>
+                    </p:cTn>
+                  </p:par>
+                  <p:par>
+                    <p:cTn id="17" fill="hold">
+                      <p:stCondLst>
+                        <p:cond delay="indefinite"/>
+                      </p:stCondLst>
+                      <p:childTnLst>
+                        <p:par>
+                          <p:cTn id="18" fill="hold">
+                            <p:stCondLst>
+                              <p:cond delay="0"/>
+                            </p:stCondLst>
+                            <p:childTnLst>
+                              <p:par>
+                                <p:cTn id="19" presetID="1" presetClass="entr" presetSubtype="0" fill="hold" nodeType="clickEffect">
+                                  <p:stCondLst>
+                                    <p:cond delay="0"/>
+                                  </p:stCondLst>
+                                  <p:childTnLst>
+                                    <p:set>
+                                      <p:cBhvr>
+                                        <p:cTn id="20" dur="1" fill="hold">
+                                          <p:stCondLst>
+                                            <p:cond delay="0"/>
+                                          </p:stCondLst>
+                                        </p:cTn>
+                                        <p:tgtEl>
                                           <p:spTgt spid="25"/>
                                         </p:tgtEl>
                                         <p:attrNameLst>
@@ -20231,71 +20493,26 @@
                     </p:cTn>
                   </p:par>
                   <p:par>
-                    <p:cTn id="15" fill="hold">
+                    <p:cTn id="21" fill="hold">
                       <p:stCondLst>
                         <p:cond delay="indefinite"/>
                       </p:stCondLst>
                       <p:childTnLst>
                         <p:par>
-                          <p:cTn id="16" fill="hold">
+                          <p:cTn id="22" fill="hold">
                             <p:stCondLst>
                               <p:cond delay="0"/>
                             </p:stCondLst>
                             <p:childTnLst>
                               <p:par>
-                                <p:cTn id="17" presetID="1" presetClass="entr" presetSubtype="0" fill="hold" nodeType="clickEffect">
+                                <p:cTn id="23" presetID="1" presetClass="entr" presetSubtype="0" fill="hold" nodeType="clickEffect">
                                   <p:stCondLst>
                                     <p:cond delay="0"/>
                                   </p:stCondLst>
                                   <p:childTnLst>
                                     <p:set>
                                       <p:cBhvr>
-                                        <p:cTn id="18" dur="1" fill="hold">
-                                          <p:stCondLst>
-                                            <p:cond delay="0"/>
-                                          </p:stCondLst>
-                                        </p:cTn>
-                                        <p:tgtEl>
-                                          <p:spTgt spid="20"/>
-                                        </p:tgtEl>
-                                        <p:attrNameLst>
-                                          <p:attrName>style.visibility</p:attrName>
-                                        </p:attrNameLst>
-                                      </p:cBhvr>
-                                      <p:to>
-                                        <p:strVal val="visible"/>
-                                      </p:to>
-                                    </p:set>
-                                  </p:childTnLst>
-                                </p:cTn>
-                              </p:par>
-                            </p:childTnLst>
-                          </p:cTn>
-                        </p:par>
-                      </p:childTnLst>
-                    </p:cTn>
-                  </p:par>
-                  <p:par>
-                    <p:cTn id="19" fill="hold">
-                      <p:stCondLst>
-                        <p:cond delay="indefinite"/>
-                      </p:stCondLst>
-                      <p:childTnLst>
-                        <p:par>
-                          <p:cTn id="20" fill="hold">
-                            <p:stCondLst>
-                              <p:cond delay="0"/>
-                            </p:stCondLst>
-                            <p:childTnLst>
-                              <p:par>
-                                <p:cTn id="21" presetID="1" presetClass="entr" presetSubtype="0" fill="hold" nodeType="clickEffect">
-                                  <p:stCondLst>
-                                    <p:cond delay="0"/>
-                                  </p:stCondLst>
-                                  <p:childTnLst>
-                                    <p:set>
-                                      <p:cBhvr>
-                                        <p:cTn id="22" dur="1" fill="hold">
+                                        <p:cTn id="24" dur="1" fill="hold">
                                           <p:stCondLst>
                                             <p:cond delay="0"/>
                                           </p:stCondLst>
@@ -20315,65 +20532,20 @@
                                 </p:cTn>
                               </p:par>
                               <p:par>
-                                <p:cTn id="23" presetID="1" presetClass="entr" presetSubtype="0" fill="hold" nodeType="withEffect">
+                                <p:cTn id="25" presetID="1" presetClass="entr" presetSubtype="0" fill="hold" nodeType="withEffect">
                                   <p:stCondLst>
                                     <p:cond delay="0"/>
                                   </p:stCondLst>
                                   <p:childTnLst>
                                     <p:set>
                                       <p:cBhvr>
-                                        <p:cTn id="24" dur="1" fill="hold">
+                                        <p:cTn id="26" dur="1" fill="hold">
                                           <p:stCondLst>
                                             <p:cond delay="0"/>
                                           </p:stCondLst>
                                         </p:cTn>
                                         <p:tgtEl>
                                           <p:spTgt spid="57"/>
-                                        </p:tgtEl>
-                                        <p:attrNameLst>
-                                          <p:attrName>style.visibility</p:attrName>
-                                        </p:attrNameLst>
-                                      </p:cBhvr>
-                                      <p:to>
-                                        <p:strVal val="visible"/>
-                                      </p:to>
-                                    </p:set>
-                                  </p:childTnLst>
-                                </p:cTn>
-                              </p:par>
-                            </p:childTnLst>
-                          </p:cTn>
-                        </p:par>
-                      </p:childTnLst>
-                    </p:cTn>
-                  </p:par>
-                  <p:par>
-                    <p:cTn id="25" fill="hold">
-                      <p:stCondLst>
-                        <p:cond delay="indefinite"/>
-                      </p:stCondLst>
-                      <p:childTnLst>
-                        <p:par>
-                          <p:cTn id="26" fill="hold">
-                            <p:stCondLst>
-                              <p:cond delay="0"/>
-                            </p:stCondLst>
-                            <p:childTnLst>
-                              <p:par>
-                                <p:cTn id="27" presetID="1" presetClass="entr" presetSubtype="0" fill="hold" nodeType="clickEffect">
-                                  <p:stCondLst>
-                                    <p:cond delay="0"/>
-                                  </p:stCondLst>
-                                  <p:childTnLst>
-                                    <p:set>
-                                      <p:cBhvr>
-                                        <p:cTn id="28" dur="1" fill="hold">
-                                          <p:stCondLst>
-                                            <p:cond delay="0"/>
-                                          </p:stCondLst>
-                                        </p:cTn>
-                                        <p:tgtEl>
-                                          <p:spTgt spid="22"/>
                                         </p:tgtEl>
                                         <p:attrNameLst>
                                           <p:attrName>style.visibility</p:attrName>
@@ -20413,9 +20585,6 @@
         </p:cTn>
       </p:par>
     </p:tnLst>
-    <p:bldLst>
-      <p:bldP spid="2" grpId="0" animBg="1"/>
-    </p:bldLst>
   </p:timing>
 </p:sld>
 </file>

</xml_diff>

<commit_message>
more details on api
</commit_message>
<xml_diff>
--- a/kubernetes/01_k8s_core_components.pptx
+++ b/kubernetes/01_k8s_core_components.pptx
@@ -5,10 +5,10 @@
     <p:sldMasterId id="2147483733" r:id="rId1"/>
   </p:sldMasterIdLst>
   <p:notesMasterIdLst>
-    <p:notesMasterId r:id="rId16"/>
+    <p:notesMasterId r:id="rId18"/>
   </p:notesMasterIdLst>
   <p:handoutMasterIdLst>
-    <p:handoutMasterId r:id="rId17"/>
+    <p:handoutMasterId r:id="rId19"/>
   </p:handoutMasterIdLst>
   <p:sldIdLst>
     <p:sldId id="433" r:id="rId2"/>
@@ -19,12 +19,14 @@
     <p:sldId id="438" r:id="rId7"/>
     <p:sldId id="444" r:id="rId8"/>
     <p:sldId id="445" r:id="rId9"/>
-    <p:sldId id="439" r:id="rId10"/>
-    <p:sldId id="441" r:id="rId11"/>
-    <p:sldId id="440" r:id="rId12"/>
-    <p:sldId id="442" r:id="rId13"/>
-    <p:sldId id="456" r:id="rId14"/>
-    <p:sldId id="265" r:id="rId15"/>
+    <p:sldId id="448" r:id="rId10"/>
+    <p:sldId id="449" r:id="rId11"/>
+    <p:sldId id="439" r:id="rId12"/>
+    <p:sldId id="441" r:id="rId13"/>
+    <p:sldId id="440" r:id="rId14"/>
+    <p:sldId id="442" r:id="rId15"/>
+    <p:sldId id="456" r:id="rId16"/>
+    <p:sldId id="265" r:id="rId17"/>
   </p:sldIdLst>
   <p:sldSz cx="12195175" cy="6858000"/>
   <p:notesSz cx="6858000" cy="9144000"/>
@@ -4232,12 +4234,375 @@
         </p:nvSpPr>
         <p:spPr/>
         <p:txBody>
-          <a:bodyPr/>
+          <a:bodyPr>
+            <a:normAutofit lnSpcReduction="10000"/>
+          </a:bodyPr>
           <a:lstStyle/>
           <a:p>
+            <a:pPr marL="342900" indent="-342900">
+              <a:buSzPct val="100000"/>
+              <a:buFont typeface="Wingdings" panose="05000000000000000000" pitchFamily="2" charset="2"/>
+              <a:buChar char="§"/>
+            </a:pPr>
             <a:r>
               <a:rPr lang="en-US" dirty="0"/>
-              <a:t>~10min</a:t>
+              <a:t>Call </a:t>
+            </a:r>
+            <a:r>
+              <a:rPr lang="en-US" dirty="0" err="1"/>
+              <a:t>kubectl</a:t>
+            </a:r>
+            <a:r>
+              <a:rPr lang="en-US" dirty="0"/>
+              <a:t> without any sub-command and explain how to get more info </a:t>
+            </a:r>
+          </a:p>
+          <a:p>
+            <a:pPr marL="342900" indent="-342900">
+              <a:buSzPct val="100000"/>
+              <a:buFont typeface="Wingdings" panose="05000000000000000000" pitchFamily="2" charset="2"/>
+              <a:buChar char="§"/>
+            </a:pPr>
+            <a:r>
+              <a:rPr lang="en-US" dirty="0"/>
+              <a:t>Show and explain </a:t>
+            </a:r>
+            <a:r>
+              <a:rPr lang="en-US" dirty="0" err="1"/>
+              <a:t>kubectl</a:t>
+            </a:r>
+            <a:r>
+              <a:rPr lang="en-US" dirty="0"/>
+              <a:t> config *</a:t>
+            </a:r>
+          </a:p>
+          <a:p>
+            <a:pPr marL="522900" lvl="1" indent="-342900">
+              <a:buSzPct val="100000"/>
+              <a:buFont typeface="Wingdings" panose="05000000000000000000" pitchFamily="2" charset="2"/>
+              <a:buChar char="§"/>
+            </a:pPr>
+            <a:r>
+              <a:rPr lang="en-US" dirty="0"/>
+              <a:t>Explain KUBECONFIG </a:t>
+            </a:r>
+            <a:r>
+              <a:rPr lang="en-US" dirty="0" err="1"/>
+              <a:t>env</a:t>
+            </a:r>
+            <a:r>
+              <a:rPr lang="en-US" dirty="0"/>
+              <a:t> variable &amp; the default location ~/.</a:t>
+            </a:r>
+            <a:r>
+              <a:rPr lang="en-US" dirty="0" err="1"/>
+              <a:t>kube</a:t>
+            </a:r>
+            <a:r>
+              <a:rPr lang="en-US" dirty="0"/>
+              <a:t>/config</a:t>
+            </a:r>
+          </a:p>
+          <a:p>
+            <a:pPr marL="522900" lvl="1" indent="-342900">
+              <a:buSzPct val="100000"/>
+              <a:buFont typeface="Wingdings" panose="05000000000000000000" pitchFamily="2" charset="2"/>
+              <a:buChar char="§"/>
+            </a:pPr>
+            <a:r>
+              <a:rPr lang="en-US" dirty="0"/>
+              <a:t>Show the </a:t>
+            </a:r>
+            <a:r>
+              <a:rPr lang="en-US" dirty="0" err="1"/>
+              <a:t>kubeconfig</a:t>
+            </a:r>
+            <a:r>
+              <a:rPr lang="en-US" dirty="0"/>
+              <a:t> </a:t>
+            </a:r>
+            <a:r>
+              <a:rPr lang="en-US" dirty="0" err="1"/>
+              <a:t>yaml</a:t>
+            </a:r>
+            <a:r>
+              <a:rPr lang="en-US" dirty="0"/>
+              <a:t> file with the current context and the namespace</a:t>
+            </a:r>
+          </a:p>
+          <a:p>
+            <a:pPr marL="180000" lvl="1" indent="0">
+              <a:buSzPct val="100000"/>
+              <a:buFont typeface="Wingdings" panose="05000000000000000000" pitchFamily="2" charset="2"/>
+              <a:buNone/>
+            </a:pPr>
+            <a:endParaRPr lang="en-US" dirty="0"/>
+          </a:p>
+          <a:p>
+            <a:pPr marL="342900" indent="-342900">
+              <a:buSzPct val="100000"/>
+              <a:buFont typeface="Wingdings" panose="05000000000000000000" pitchFamily="2" charset="2"/>
+              <a:buChar char="§"/>
+            </a:pPr>
+            <a:r>
+              <a:rPr lang="en-US" dirty="0"/>
+              <a:t>Show access to cluster with </a:t>
+            </a:r>
+            <a:r>
+              <a:rPr lang="en-US" dirty="0" err="1"/>
+              <a:t>kubectl</a:t>
+            </a:r>
+            <a:r>
+              <a:rPr lang="en-US" dirty="0"/>
+              <a:t> -&gt; </a:t>
+            </a:r>
+            <a:r>
+              <a:rPr lang="en-US" dirty="0" err="1"/>
+              <a:t>kubectl</a:t>
+            </a:r>
+            <a:r>
+              <a:rPr lang="en-US" dirty="0"/>
+              <a:t> get nodes</a:t>
+            </a:r>
+          </a:p>
+          <a:p>
+            <a:pPr marL="342900" indent="-342900">
+              <a:buSzPct val="100000"/>
+              <a:buFont typeface="Wingdings" panose="05000000000000000000" pitchFamily="2" charset="2"/>
+              <a:buChar char="§"/>
+            </a:pPr>
+            <a:r>
+              <a:rPr lang="en-US" dirty="0"/>
+              <a:t>Explain basic syntax of </a:t>
+            </a:r>
+            <a:r>
+              <a:rPr lang="en-US" dirty="0" err="1"/>
+              <a:t>kubectl</a:t>
+            </a:r>
+            <a:r>
+              <a:rPr lang="en-US" dirty="0"/>
+              <a:t> [verb] [resource type] [specific resource by name or label] [options / switches like –o </a:t>
+            </a:r>
+            <a:r>
+              <a:rPr lang="en-US" dirty="0" err="1"/>
+              <a:t>yaml</a:t>
+            </a:r>
+            <a:r>
+              <a:rPr lang="en-US" dirty="0"/>
+              <a:t>]</a:t>
+            </a:r>
+          </a:p>
+          <a:p>
+            <a:pPr marL="342900" marR="0" lvl="0" indent="-342900" algn="l" defTabSz="1088776" rtl="0" eaLnBrk="1" fontAlgn="auto" latinLnBrk="0" hangingPunct="1">
+              <a:lnSpc>
+                <a:spcPct val="100000"/>
+              </a:lnSpc>
+              <a:spcBef>
+                <a:spcPts val="0"/>
+              </a:spcBef>
+              <a:spcAft>
+                <a:spcPts val="0"/>
+              </a:spcAft>
+              <a:buClrTx/>
+              <a:buSzPct val="100000"/>
+              <a:buFont typeface="Wingdings" panose="05000000000000000000" pitchFamily="2" charset="2"/>
+              <a:buChar char="§"/>
+              <a:tabLst/>
+              <a:defRPr/>
+            </a:pPr>
+            <a:r>
+              <a:rPr lang="en-US" dirty="0"/>
+              <a:t>Show </a:t>
+            </a:r>
+            <a:r>
+              <a:rPr lang="en-US" dirty="0" err="1"/>
+              <a:t>kubectl</a:t>
+            </a:r>
+            <a:r>
+              <a:rPr lang="en-US" dirty="0"/>
+              <a:t> get &amp; describe nodes and talk about details of the node, like resource utilization or docker version</a:t>
+            </a:r>
+          </a:p>
+          <a:p>
+            <a:pPr marL="342900" marR="0" lvl="0" indent="-342900" algn="l" defTabSz="1088776" rtl="0" eaLnBrk="1" fontAlgn="auto" latinLnBrk="0" hangingPunct="1">
+              <a:lnSpc>
+                <a:spcPct val="100000"/>
+              </a:lnSpc>
+              <a:spcBef>
+                <a:spcPts val="0"/>
+              </a:spcBef>
+              <a:spcAft>
+                <a:spcPts val="0"/>
+              </a:spcAft>
+              <a:buClrTx/>
+              <a:buSzPct val="100000"/>
+              <a:buFont typeface="Wingdings" panose="05000000000000000000" pitchFamily="2" charset="2"/>
+              <a:buChar char="§"/>
+              <a:tabLst/>
+              <a:defRPr/>
+            </a:pPr>
+            <a:endParaRPr lang="en-US" dirty="0"/>
+          </a:p>
+          <a:p>
+            <a:pPr marL="342900" marR="0" lvl="0" indent="-342900" algn="l" defTabSz="1088776" rtl="0" eaLnBrk="1" fontAlgn="auto" latinLnBrk="0" hangingPunct="1">
+              <a:lnSpc>
+                <a:spcPct val="100000"/>
+              </a:lnSpc>
+              <a:spcBef>
+                <a:spcPts val="0"/>
+              </a:spcBef>
+              <a:spcAft>
+                <a:spcPts val="0"/>
+              </a:spcAft>
+              <a:buClrTx/>
+              <a:buSzPct val="100000"/>
+              <a:buFont typeface="Wingdings" panose="05000000000000000000" pitchFamily="2" charset="2"/>
+              <a:buChar char="§"/>
+              <a:tabLst/>
+              <a:defRPr/>
+            </a:pPr>
+            <a:r>
+              <a:rPr lang="en-US" dirty="0"/>
+              <a:t>Run </a:t>
+            </a:r>
+            <a:r>
+              <a:rPr lang="en-US" dirty="0" err="1"/>
+              <a:t>kubectl</a:t>
+            </a:r>
+            <a:r>
+              <a:rPr lang="en-US" dirty="0"/>
+              <a:t> proxy &amp;</a:t>
+            </a:r>
+          </a:p>
+          <a:p>
+            <a:pPr marL="342900" marR="0" lvl="0" indent="-342900" algn="l" defTabSz="1088776" rtl="0" eaLnBrk="1" fontAlgn="auto" latinLnBrk="0" hangingPunct="1">
+              <a:lnSpc>
+                <a:spcPct val="100000"/>
+              </a:lnSpc>
+              <a:spcBef>
+                <a:spcPts val="0"/>
+              </a:spcBef>
+              <a:spcAft>
+                <a:spcPts val="0"/>
+              </a:spcAft>
+              <a:buClrTx/>
+              <a:buSzPct val="100000"/>
+              <a:buFont typeface="Wingdings" panose="05000000000000000000" pitchFamily="2" charset="2"/>
+              <a:buChar char="§"/>
+              <a:tabLst/>
+              <a:defRPr/>
+            </a:pPr>
+            <a:r>
+              <a:rPr lang="en-US" dirty="0"/>
+              <a:t>Open localhost:8001 in browser and show </a:t>
+            </a:r>
+            <a:r>
+              <a:rPr lang="en-US" dirty="0" err="1"/>
+              <a:t>api</a:t>
+            </a:r>
+            <a:r>
+              <a:rPr lang="en-US" dirty="0"/>
+              <a:t> tree, traverse through it and go to namespace </a:t>
+            </a:r>
+            <a:r>
+              <a:rPr lang="en-US" dirty="0" err="1"/>
+              <a:t>kube</a:t>
+            </a:r>
+            <a:r>
+              <a:rPr lang="en-US" dirty="0"/>
+              <a:t>-system and show some pods</a:t>
+            </a:r>
+          </a:p>
+          <a:p>
+            <a:pPr marL="342900" indent="-342900">
+              <a:buSzPct val="100000"/>
+              <a:buFont typeface="Wingdings" panose="05000000000000000000" pitchFamily="2" charset="2"/>
+              <a:buChar char="§"/>
+            </a:pPr>
+            <a:r>
+              <a:rPr lang="en-US" dirty="0"/>
+              <a:t>Query API server with curl (again via localhost)</a:t>
+            </a:r>
+          </a:p>
+          <a:p>
+            <a:pPr marL="342900" indent="-342900">
+              <a:buSzPct val="100000"/>
+              <a:buFont typeface="Wingdings" panose="05000000000000000000" pitchFamily="2" charset="2"/>
+              <a:buChar char="§"/>
+            </a:pPr>
+            <a:r>
+              <a:rPr lang="en-US" dirty="0"/>
+              <a:t>If you have </a:t>
+            </a:r>
+            <a:r>
+              <a:rPr lang="en-US" dirty="0" err="1"/>
+              <a:t>kubectl</a:t>
+            </a:r>
+            <a:r>
+              <a:rPr lang="en-US" dirty="0"/>
+              <a:t> version v1.11 or higher:</a:t>
+            </a:r>
+          </a:p>
+          <a:p>
+            <a:pPr marL="522900" lvl="1" indent="-342900">
+              <a:buSzPct val="100000"/>
+              <a:buFont typeface="Wingdings" panose="05000000000000000000" pitchFamily="2" charset="2"/>
+              <a:buChar char="§"/>
+            </a:pPr>
+            <a:r>
+              <a:rPr lang="en-US" dirty="0"/>
+              <a:t>Show </a:t>
+            </a:r>
+            <a:r>
+              <a:rPr lang="en-US" dirty="0" err="1"/>
+              <a:t>kubectl</a:t>
+            </a:r>
+            <a:r>
+              <a:rPr lang="en-US" dirty="0"/>
+              <a:t> </a:t>
+            </a:r>
+            <a:r>
+              <a:rPr lang="en-US" dirty="0" err="1"/>
+              <a:t>api</a:t>
+            </a:r>
+            <a:r>
+              <a:rPr lang="en-US" dirty="0"/>
+              <a:t>-versions =&gt; similar to what you did with the proxy, just easier</a:t>
+            </a:r>
+          </a:p>
+          <a:p>
+            <a:pPr marL="522900" lvl="1" indent="-342900">
+              <a:buSzPct val="100000"/>
+              <a:buFont typeface="Wingdings" panose="05000000000000000000" pitchFamily="2" charset="2"/>
+              <a:buChar char="§"/>
+            </a:pPr>
+            <a:r>
+              <a:rPr lang="en-US" dirty="0"/>
+              <a:t>Show </a:t>
+            </a:r>
+            <a:r>
+              <a:rPr lang="en-US" dirty="0" err="1"/>
+              <a:t>kubectl</a:t>
+            </a:r>
+            <a:r>
+              <a:rPr lang="en-US" dirty="0"/>
+              <a:t> </a:t>
+            </a:r>
+            <a:r>
+              <a:rPr lang="en-US" dirty="0" err="1"/>
+              <a:t>api</a:t>
+            </a:r>
+            <a:r>
+              <a:rPr lang="en-US" dirty="0"/>
+              <a:t>-resources =&gt; gives info about all the cluster resources </a:t>
+            </a:r>
+            <a:r>
+              <a:rPr lang="en-US" dirty="0" err="1"/>
+              <a:t>incl</a:t>
+            </a:r>
+            <a:r>
+              <a:rPr lang="en-US" dirty="0"/>
+              <a:t> short names!</a:t>
             </a:r>
           </a:p>
         </p:txBody>
@@ -4269,6 +4634,94 @@
     </p:spTree>
     <p:extLst>
       <p:ext uri="{BB962C8B-B14F-4D97-AF65-F5344CB8AC3E}">
+        <p14:creationId xmlns:p14="http://schemas.microsoft.com/office/powerpoint/2010/main" val="2072189787"/>
+      </p:ext>
+    </p:extLst>
+  </p:cSld>
+  <p:clrMapOvr>
+    <a:masterClrMapping/>
+  </p:clrMapOvr>
+</p:notes>
+</file>
+
+<file path=ppt/notesSlides/notesSlide11.xml><?xml version="1.0" encoding="utf-8"?>
+<p:notes xmlns:a="http://schemas.openxmlformats.org/drawingml/2006/main" xmlns:r="http://schemas.openxmlformats.org/officeDocument/2006/relationships" xmlns:p="http://schemas.openxmlformats.org/presentationml/2006/main">
+  <p:cSld>
+    <p:spTree>
+      <p:nvGrpSpPr>
+        <p:cNvPr id="1" name=""/>
+        <p:cNvGrpSpPr/>
+        <p:nvPr/>
+      </p:nvGrpSpPr>
+      <p:grpSpPr>
+        <a:xfrm>
+          <a:off x="0" y="0"/>
+          <a:ext cx="0" cy="0"/>
+          <a:chOff x="0" y="0"/>
+          <a:chExt cx="0" cy="0"/>
+        </a:xfrm>
+      </p:grpSpPr>
+      <p:sp>
+        <p:nvSpPr>
+          <p:cNvPr id="2" name="Slide Image Placeholder 1"/>
+          <p:cNvSpPr>
+            <a:spLocks noGrp="1" noRot="1" noChangeAspect="1"/>
+          </p:cNvSpPr>
+          <p:nvPr>
+            <p:ph type="sldImg"/>
+          </p:nvPr>
+        </p:nvSpPr>
+        <p:spPr/>
+      </p:sp>
+      <p:sp>
+        <p:nvSpPr>
+          <p:cNvPr id="3" name="Notes Placeholder 2"/>
+          <p:cNvSpPr>
+            <a:spLocks noGrp="1"/>
+          </p:cNvSpPr>
+          <p:nvPr>
+            <p:ph type="body" idx="1"/>
+          </p:nvPr>
+        </p:nvSpPr>
+        <p:spPr/>
+        <p:txBody>
+          <a:bodyPr/>
+          <a:lstStyle/>
+          <a:p>
+            <a:r>
+              <a:rPr lang="en-US" dirty="0"/>
+              <a:t>~10min</a:t>
+            </a:r>
+          </a:p>
+        </p:txBody>
+      </p:sp>
+      <p:sp>
+        <p:nvSpPr>
+          <p:cNvPr id="4" name="Slide Number Placeholder 3"/>
+          <p:cNvSpPr>
+            <a:spLocks noGrp="1"/>
+          </p:cNvSpPr>
+          <p:nvPr>
+            <p:ph type="sldNum" sz="quarter" idx="10"/>
+          </p:nvPr>
+        </p:nvSpPr>
+        <p:spPr/>
+        <p:txBody>
+          <a:bodyPr/>
+          <a:lstStyle/>
+          <a:p>
+            <a:fld id="{7D8C2C35-2B8A-446E-BEC0-FD36716C29AC}" type="slidenum">
+              <a:rPr lang="de-DE" smtClean="0"/>
+              <a:pPr/>
+              <a:t>15</a:t>
+            </a:fld>
+            <a:endParaRPr lang="de-DE" dirty="0"/>
+          </a:p>
+        </p:txBody>
+      </p:sp>
+    </p:spTree>
+    <p:extLst>
+      <p:ext uri="{BB962C8B-B14F-4D97-AF65-F5344CB8AC3E}">
         <p14:creationId xmlns:p14="http://schemas.microsoft.com/office/powerpoint/2010/main" val="3443248425"/>
       </p:ext>
     </p:extLst>
@@ -4279,7 +4732,7 @@
 </p:notes>
 </file>
 
-<file path=ppt/notesSlides/notesSlide11.xml><?xml version="1.0" encoding="utf-8"?>
+<file path=ppt/notesSlides/notesSlide12.xml><?xml version="1.0" encoding="utf-8"?>
 <p:notes xmlns:a="http://schemas.openxmlformats.org/drawingml/2006/main" xmlns:r="http://schemas.openxmlformats.org/officeDocument/2006/relationships" xmlns:p="http://schemas.openxmlformats.org/presentationml/2006/main">
   <p:cSld>
     <p:spTree>
@@ -4314,7 +4767,7 @@
             <a:fld id="{7D8C2C35-2B8A-446E-BEC0-FD36716C29AC}" type="slidenum">
               <a:rPr lang="de-DE" smtClean="0"/>
               <a:pPr/>
-              <a:t>14</a:t>
+              <a:t>16</a:t>
             </a:fld>
             <a:endParaRPr lang="de-DE" dirty="0"/>
           </a:p>
@@ -5234,295 +5687,228 @@
           <a:bodyPr/>
           <a:lstStyle/>
           <a:p>
-            <a:pPr marL="342900" indent="-342900">
-              <a:buSzPct val="100000"/>
-              <a:buFont typeface="Wingdings" panose="05000000000000000000" pitchFamily="2" charset="2"/>
-              <a:buChar char="§"/>
+            <a:r>
+              <a:rPr lang="de-DE" dirty="0" err="1"/>
+              <a:t>beta</a:t>
+            </a:r>
+            <a:r>
+              <a:rPr lang="de-DE" dirty="0"/>
+              <a:t>: </a:t>
+            </a:r>
+          </a:p>
+          <a:p>
+            <a:pPr marL="285750" indent="-285750">
+              <a:buFontTx/>
+              <a:buChar char="-"/>
             </a:pPr>
             <a:r>
-              <a:rPr lang="en-US" dirty="0"/>
-              <a:t>Call </a:t>
-            </a:r>
-            <a:r>
-              <a:rPr lang="en-US" dirty="0" err="1"/>
-              <a:t>kubectl</a:t>
-            </a:r>
-            <a:r>
-              <a:rPr lang="en-US" dirty="0"/>
-              <a:t> without any sub-command and explain how to get more info </a:t>
-            </a:r>
-          </a:p>
-          <a:p>
-            <a:pPr marL="342900" indent="-342900">
-              <a:buSzPct val="100000"/>
-              <a:buFont typeface="Wingdings" panose="05000000000000000000" pitchFamily="2" charset="2"/>
-              <a:buChar char="§"/>
+              <a:rPr lang="de-DE" dirty="0" err="1"/>
+              <a:t>aims</a:t>
+            </a:r>
+            <a:r>
+              <a:rPr lang="de-DE" dirty="0"/>
+              <a:t> </a:t>
+            </a:r>
+            <a:r>
+              <a:rPr lang="de-DE" dirty="0" err="1"/>
+              <a:t>for</a:t>
+            </a:r>
+            <a:r>
+              <a:rPr lang="de-DE" dirty="0"/>
+              <a:t> </a:t>
+            </a:r>
+            <a:r>
+              <a:rPr lang="de-DE" dirty="0" err="1"/>
+              <a:t>backwards</a:t>
+            </a:r>
+            <a:r>
+              <a:rPr lang="de-DE" dirty="0"/>
+              <a:t> </a:t>
+            </a:r>
+            <a:r>
+              <a:rPr lang="de-DE" dirty="0" err="1"/>
+              <a:t>compatibility</a:t>
+            </a:r>
+            <a:r>
+              <a:rPr lang="de-DE" dirty="0"/>
+              <a:t>, </a:t>
+            </a:r>
+          </a:p>
+          <a:p>
+            <a:pPr marL="285750" indent="-285750">
+              <a:buFontTx/>
+              <a:buChar char="-"/>
             </a:pPr>
             <a:r>
-              <a:rPr lang="en-US" dirty="0"/>
-              <a:t>Show and explain </a:t>
-            </a:r>
-            <a:r>
-              <a:rPr lang="en-US" dirty="0" err="1"/>
-              <a:t>kubectl</a:t>
-            </a:r>
-            <a:r>
-              <a:rPr lang="en-US" dirty="0"/>
-              <a:t> config *</a:t>
-            </a:r>
-          </a:p>
-          <a:p>
-            <a:pPr marL="522900" lvl="1" indent="-342900">
-              <a:buSzPct val="100000"/>
-              <a:buFont typeface="Wingdings" panose="05000000000000000000" pitchFamily="2" charset="2"/>
-              <a:buChar char="§"/>
+              <a:rPr lang="de-DE" dirty="0" err="1"/>
+              <a:t>may</a:t>
+            </a:r>
+            <a:r>
+              <a:rPr lang="de-DE" dirty="0"/>
+              <a:t> </a:t>
+            </a:r>
+            <a:r>
+              <a:rPr lang="de-DE" dirty="0" err="1"/>
+              <a:t>have</a:t>
+            </a:r>
+            <a:r>
+              <a:rPr lang="de-DE" dirty="0"/>
+              <a:t> </a:t>
+            </a:r>
+            <a:r>
+              <a:rPr lang="de-DE" dirty="0" err="1"/>
+              <a:t>bugs</a:t>
+            </a:r>
+            <a:endParaRPr lang="de-DE" dirty="0"/>
+          </a:p>
+          <a:p>
+            <a:pPr marL="285750" indent="-285750">
+              <a:buFontTx/>
+              <a:buChar char="-"/>
             </a:pPr>
             <a:r>
-              <a:rPr lang="en-US" dirty="0"/>
-              <a:t>Explain KUBECONFIG </a:t>
-            </a:r>
-            <a:r>
-              <a:rPr lang="en-US" dirty="0" err="1"/>
-              <a:t>env</a:t>
-            </a:r>
-            <a:r>
-              <a:rPr lang="en-US" dirty="0"/>
-              <a:t> variable &amp; the default location ~/.</a:t>
-            </a:r>
-            <a:r>
-              <a:rPr lang="en-US" dirty="0" err="1"/>
-              <a:t>kube</a:t>
-            </a:r>
-            <a:r>
-              <a:rPr lang="en-US" dirty="0"/>
-              <a:t>/config</a:t>
-            </a:r>
-          </a:p>
-          <a:p>
-            <a:pPr marL="522900" lvl="1" indent="-342900">
-              <a:buSzPct val="100000"/>
-              <a:buFont typeface="Wingdings" panose="05000000000000000000" pitchFamily="2" charset="2"/>
-              <a:buChar char="§"/>
+              <a:rPr lang="de-DE" dirty="0" err="1"/>
+              <a:t>used</a:t>
+            </a:r>
+            <a:r>
+              <a:rPr lang="de-DE" dirty="0"/>
+              <a:t> in </a:t>
+            </a:r>
+            <a:r>
+              <a:rPr lang="de-DE" dirty="0" err="1"/>
+              <a:t>production</a:t>
+            </a:r>
+            <a:r>
+              <a:rPr lang="de-DE" dirty="0"/>
+              <a:t> </a:t>
+            </a:r>
+            <a:r>
+              <a:rPr lang="de-DE" dirty="0" err="1"/>
+              <a:t>with</a:t>
+            </a:r>
+            <a:r>
+              <a:rPr lang="de-DE" dirty="0"/>
+              <a:t> </a:t>
+            </a:r>
+            <a:r>
+              <a:rPr lang="de-DE" dirty="0" err="1"/>
+              <a:t>caution</a:t>
+            </a:r>
+            <a:endParaRPr lang="de-DE" dirty="0"/>
+          </a:p>
+          <a:p>
+            <a:pPr marL="285750" indent="-285750">
+              <a:buFontTx/>
+              <a:buChar char="-"/>
             </a:pPr>
-            <a:r>
-              <a:rPr lang="en-US" dirty="0"/>
-              <a:t>Show the </a:t>
-            </a:r>
-            <a:r>
-              <a:rPr lang="en-US" dirty="0" err="1"/>
-              <a:t>kubeconfig</a:t>
-            </a:r>
-            <a:r>
-              <a:rPr lang="en-US" dirty="0"/>
-              <a:t> </a:t>
-            </a:r>
-            <a:r>
-              <a:rPr lang="en-US" dirty="0" err="1"/>
-              <a:t>yaml</a:t>
-            </a:r>
-            <a:r>
-              <a:rPr lang="en-US" dirty="0"/>
-              <a:t> file with the current context and the namespace</a:t>
-            </a:r>
-          </a:p>
-          <a:p>
-            <a:pPr marL="180000" lvl="1" indent="0">
-              <a:buSzPct val="100000"/>
-              <a:buFont typeface="Wingdings" panose="05000000000000000000" pitchFamily="2" charset="2"/>
+            <a:endParaRPr lang="de-DE" dirty="0"/>
+          </a:p>
+          <a:p>
+            <a:pPr marL="0" indent="0">
+              <a:buFontTx/>
               <a:buNone/>
             </a:pPr>
-            <a:endParaRPr lang="en-US" dirty="0"/>
-          </a:p>
-          <a:p>
-            <a:pPr marL="342900" indent="-342900">
-              <a:buSzPct val="100000"/>
-              <a:buFont typeface="Wingdings" panose="05000000000000000000" pitchFamily="2" charset="2"/>
-              <a:buChar char="§"/>
+            <a:r>
+              <a:rPr lang="de-DE" dirty="0"/>
+              <a:t>v1 / GA:</a:t>
+            </a:r>
+          </a:p>
+          <a:p>
+            <a:pPr marL="285750" indent="-285750">
+              <a:buFontTx/>
+              <a:buChar char="-"/>
             </a:pPr>
             <a:r>
-              <a:rPr lang="en-US" dirty="0"/>
-              <a:t>Show access to cluster with </a:t>
-            </a:r>
-            <a:r>
-              <a:rPr lang="en-US" dirty="0" err="1"/>
-              <a:t>kubectl</a:t>
-            </a:r>
-            <a:r>
-              <a:rPr lang="en-US" dirty="0"/>
-              <a:t> -&gt; </a:t>
-            </a:r>
-            <a:r>
-              <a:rPr lang="en-US" dirty="0" err="1"/>
-              <a:t>kubectl</a:t>
-            </a:r>
-            <a:r>
-              <a:rPr lang="en-US" dirty="0"/>
-              <a:t> get nodes</a:t>
-            </a:r>
-          </a:p>
-          <a:p>
-            <a:pPr marL="342900" indent="-342900">
-              <a:buSzPct val="100000"/>
-              <a:buFont typeface="Wingdings" panose="05000000000000000000" pitchFamily="2" charset="2"/>
-              <a:buChar char="§"/>
+              <a:rPr lang="de-DE" dirty="0" err="1"/>
+              <a:t>no</a:t>
+            </a:r>
+            <a:r>
+              <a:rPr lang="de-DE" dirty="0"/>
+              <a:t> </a:t>
+            </a:r>
+            <a:r>
+              <a:rPr lang="de-DE" dirty="0" err="1"/>
+              <a:t>bugs</a:t>
+            </a:r>
+            <a:r>
+              <a:rPr lang="de-DE" dirty="0"/>
+              <a:t> </a:t>
+            </a:r>
+            <a:r>
+              <a:rPr lang="de-DE" dirty="0" err="1"/>
+              <a:t>of</a:t>
+            </a:r>
+            <a:r>
+              <a:rPr lang="de-DE" dirty="0"/>
+              <a:t> </a:t>
+            </a:r>
+            <a:r>
+              <a:rPr lang="de-DE" dirty="0" err="1"/>
+              <a:t>course</a:t>
+            </a:r>
+            <a:endParaRPr lang="de-DE" dirty="0"/>
+          </a:p>
+          <a:p>
+            <a:pPr marL="285750" indent="-285750">
+              <a:buFontTx/>
+              <a:buChar char="-"/>
             </a:pPr>
             <a:r>
-              <a:rPr lang="en-US" dirty="0"/>
-              <a:t>Explain basic syntax of </a:t>
-            </a:r>
-            <a:r>
-              <a:rPr lang="en-US" dirty="0" err="1"/>
-              <a:t>kubectl</a:t>
-            </a:r>
-            <a:r>
-              <a:rPr lang="en-US" dirty="0"/>
-              <a:t> [verb] [resource type] [specific resource by name or label] [options / switches like –o </a:t>
-            </a:r>
-            <a:r>
-              <a:rPr lang="en-US" dirty="0" err="1"/>
-              <a:t>yaml</a:t>
-            </a:r>
-            <a:r>
-              <a:rPr lang="en-US" dirty="0"/>
-              <a:t>]</a:t>
-            </a:r>
-          </a:p>
-          <a:p>
-            <a:pPr marL="342900" marR="0" lvl="0" indent="-342900" algn="l" defTabSz="1088776" rtl="0" eaLnBrk="1" fontAlgn="auto" latinLnBrk="0" hangingPunct="1">
-              <a:lnSpc>
-                <a:spcPct val="100000"/>
-              </a:lnSpc>
-              <a:spcBef>
-                <a:spcPts val="0"/>
-              </a:spcBef>
-              <a:spcAft>
-                <a:spcPts val="0"/>
-              </a:spcAft>
-              <a:buClrTx/>
-              <a:buSzPct val="100000"/>
-              <a:buFont typeface="Wingdings" panose="05000000000000000000" pitchFamily="2" charset="2"/>
-              <a:buChar char="§"/>
-              <a:tabLst/>
-              <a:defRPr/>
-            </a:pPr>
-            <a:r>
-              <a:rPr lang="en-US" dirty="0"/>
-              <a:t>Show </a:t>
-            </a:r>
-            <a:r>
-              <a:rPr lang="en-US" dirty="0" err="1"/>
-              <a:t>kubectl</a:t>
-            </a:r>
-            <a:r>
-              <a:rPr lang="en-US" dirty="0"/>
-              <a:t> get &amp; describe nodes and talk about details of the node, like resource utilization or docker version</a:t>
-            </a:r>
-          </a:p>
-          <a:p>
-            <a:pPr marL="342900" marR="0" lvl="0" indent="-342900" algn="l" defTabSz="1088776" rtl="0" eaLnBrk="1" fontAlgn="auto" latinLnBrk="0" hangingPunct="1">
-              <a:lnSpc>
-                <a:spcPct val="100000"/>
-              </a:lnSpc>
-              <a:spcBef>
-                <a:spcPts val="0"/>
-              </a:spcBef>
-              <a:spcAft>
-                <a:spcPts val="0"/>
-              </a:spcAft>
-              <a:buClrTx/>
-              <a:buSzPct val="100000"/>
-              <a:buFont typeface="Wingdings" panose="05000000000000000000" pitchFamily="2" charset="2"/>
-              <a:buChar char="§"/>
-              <a:tabLst/>
-              <a:defRPr/>
-            </a:pPr>
-            <a:endParaRPr lang="en-US" dirty="0"/>
-          </a:p>
-          <a:p>
-            <a:pPr marL="342900" marR="0" lvl="0" indent="-342900" algn="l" defTabSz="1088776" rtl="0" eaLnBrk="1" fontAlgn="auto" latinLnBrk="0" hangingPunct="1">
-              <a:lnSpc>
-                <a:spcPct val="100000"/>
-              </a:lnSpc>
-              <a:spcBef>
-                <a:spcPts val="0"/>
-              </a:spcBef>
-              <a:spcAft>
-                <a:spcPts val="0"/>
-              </a:spcAft>
-              <a:buClrTx/>
-              <a:buSzPct val="100000"/>
-              <a:buFont typeface="Wingdings" panose="05000000000000000000" pitchFamily="2" charset="2"/>
-              <a:buChar char="§"/>
-              <a:tabLst/>
-              <a:defRPr/>
-            </a:pPr>
-            <a:r>
-              <a:rPr lang="en-US" dirty="0"/>
-              <a:t>Run </a:t>
-            </a:r>
-            <a:r>
-              <a:rPr lang="en-US" dirty="0" err="1"/>
-              <a:t>kubectl</a:t>
-            </a:r>
-            <a:r>
-              <a:rPr lang="en-US" dirty="0"/>
-              <a:t> proxy &amp;</a:t>
-            </a:r>
-          </a:p>
-          <a:p>
-            <a:pPr marL="342900" marR="0" lvl="0" indent="-342900" algn="l" defTabSz="1088776" rtl="0" eaLnBrk="1" fontAlgn="auto" latinLnBrk="0" hangingPunct="1">
-              <a:lnSpc>
-                <a:spcPct val="100000"/>
-              </a:lnSpc>
-              <a:spcBef>
-                <a:spcPts val="0"/>
-              </a:spcBef>
-              <a:spcAft>
-                <a:spcPts val="0"/>
-              </a:spcAft>
-              <a:buClrTx/>
-              <a:buSzPct val="100000"/>
-              <a:buFont typeface="Wingdings" panose="05000000000000000000" pitchFamily="2" charset="2"/>
-              <a:buChar char="§"/>
-              <a:tabLst/>
-              <a:defRPr/>
-            </a:pPr>
-            <a:r>
-              <a:rPr lang="en-US" dirty="0"/>
-              <a:t>Open localhost:8001 in browser and show </a:t>
-            </a:r>
-            <a:r>
-              <a:rPr lang="en-US" dirty="0" err="1"/>
-              <a:t>api</a:t>
-            </a:r>
-            <a:r>
-              <a:rPr lang="en-US" dirty="0"/>
-              <a:t> tree, traverse through it and go to namespace </a:t>
-            </a:r>
-            <a:r>
-              <a:rPr lang="en-US" dirty="0" err="1"/>
-              <a:t>kube</a:t>
-            </a:r>
-            <a:r>
-              <a:rPr lang="en-US" dirty="0"/>
-              <a:t>-system and show some pods</a:t>
-            </a:r>
-          </a:p>
-          <a:p>
-            <a:pPr marL="342900" indent="-342900">
-              <a:buSzPct val="100000"/>
-              <a:buFont typeface="Wingdings" panose="05000000000000000000" pitchFamily="2" charset="2"/>
-              <a:buChar char="§"/>
-            </a:pPr>
-            <a:r>
-              <a:rPr lang="en-US" dirty="0"/>
-              <a:t>Query API server with curl (again </a:t>
-            </a:r>
-            <a:r>
-              <a:rPr lang="en-US"/>
-              <a:t>via localhost)</a:t>
-            </a:r>
-            <a:endParaRPr lang="en-US" dirty="0"/>
+              <a:rPr lang="de-DE" dirty="0" err="1"/>
+              <a:t>available</a:t>
+            </a:r>
+            <a:r>
+              <a:rPr lang="de-DE" dirty="0"/>
+              <a:t> </a:t>
+            </a:r>
+            <a:r>
+              <a:rPr lang="de-DE" dirty="0" err="1"/>
+              <a:t>until</a:t>
+            </a:r>
+            <a:r>
+              <a:rPr lang="de-DE" dirty="0"/>
+              <a:t> </a:t>
+            </a:r>
+            <a:r>
+              <a:rPr lang="de-DE" dirty="0" err="1"/>
+              <a:t>deprecated</a:t>
+            </a:r>
+            <a:r>
+              <a:rPr lang="de-DE" dirty="0"/>
+              <a:t> (3 </a:t>
+            </a:r>
+            <a:r>
+              <a:rPr lang="de-DE" dirty="0" err="1"/>
+              <a:t>releases</a:t>
+            </a:r>
+            <a:r>
+              <a:rPr lang="de-DE" dirty="0"/>
+              <a:t> </a:t>
+            </a:r>
+            <a:r>
+              <a:rPr lang="de-DE" dirty="0" err="1"/>
+              <a:t>or</a:t>
+            </a:r>
+            <a:r>
+              <a:rPr lang="de-DE" dirty="0"/>
+              <a:t> </a:t>
+            </a:r>
+            <a:r>
+              <a:rPr lang="de-DE" dirty="0" err="1"/>
+              <a:t>max</a:t>
+            </a:r>
+            <a:r>
+              <a:rPr lang="de-DE" dirty="0"/>
+              <a:t> 1 </a:t>
+            </a:r>
+            <a:r>
+              <a:rPr lang="de-DE" dirty="0" err="1"/>
+              <a:t>year</a:t>
+            </a:r>
+            <a:r>
+              <a:rPr lang="de-DE" dirty="0"/>
+              <a:t>)</a:t>
+            </a:r>
           </a:p>
         </p:txBody>
       </p:sp>
@@ -5544,7 +5930,7 @@
             <a:fld id="{7D8C2C35-2B8A-446E-BEC0-FD36716C29AC}" type="slidenum">
               <a:rPr lang="de-DE" smtClean="0"/>
               <a:pPr/>
-              <a:t>11</a:t>
+              <a:t>10</a:t>
             </a:fld>
             <a:endParaRPr lang="de-DE" dirty="0"/>
           </a:p>
@@ -5553,7 +5939,7 @@
     </p:spTree>
     <p:extLst>
       <p:ext uri="{BB962C8B-B14F-4D97-AF65-F5344CB8AC3E}">
-        <p14:creationId xmlns:p14="http://schemas.microsoft.com/office/powerpoint/2010/main" val="2072189787"/>
+        <p14:creationId xmlns:p14="http://schemas.microsoft.com/office/powerpoint/2010/main" val="2368785414"/>
       </p:ext>
     </p:extLst>
   </p:cSld>
@@ -13216,6 +13602,525 @@
       </p:grpSpPr>
       <p:sp>
         <p:nvSpPr>
+          <p:cNvPr id="2" name="Text Placeholder 1">
+            <a:extLst>
+              <a:ext uri="{FF2B5EF4-FFF2-40B4-BE49-F238E27FC236}">
+                <a16:creationId xmlns:a16="http://schemas.microsoft.com/office/drawing/2014/main" id="{E187B6B1-1962-F343-B945-09936343593B}"/>
+              </a:ext>
+            </a:extLst>
+          </p:cNvPr>
+          <p:cNvSpPr>
+            <a:spLocks noGrp="1"/>
+          </p:cNvSpPr>
+          <p:nvPr>
+            <p:ph type="body" sz="quarter" idx="10"/>
+          </p:nvPr>
+        </p:nvSpPr>
+        <p:spPr/>
+        <p:txBody>
+          <a:bodyPr/>
+          <a:lstStyle/>
+          <a:p>
+            <a:r>
+              <a:rPr lang="de-DE" sz="2900" dirty="0"/>
+              <a:t>v1alpha1	</a:t>
+            </a:r>
+            <a:r>
+              <a:rPr lang="de-DE" sz="2900" dirty="0">
+                <a:solidFill>
+                  <a:schemeClr val="tx1">
+                    <a:lumMod val="75000"/>
+                  </a:schemeClr>
+                </a:solidFill>
+              </a:rPr>
+              <a:t>-- </a:t>
+            </a:r>
+            <a:r>
+              <a:rPr lang="de-DE" sz="2900" dirty="0" err="1">
+                <a:solidFill>
+                  <a:schemeClr val="tx1">
+                    <a:lumMod val="75000"/>
+                  </a:schemeClr>
+                </a:solidFill>
+              </a:rPr>
+              <a:t>cluster</a:t>
+            </a:r>
+            <a:r>
+              <a:rPr lang="de-DE" sz="2900" dirty="0">
+                <a:solidFill>
+                  <a:schemeClr val="tx1">
+                    <a:lumMod val="75000"/>
+                  </a:schemeClr>
+                </a:solidFill>
+              </a:rPr>
+              <a:t> </a:t>
+            </a:r>
+            <a:r>
+              <a:rPr lang="de-DE" sz="2900" dirty="0" err="1">
+                <a:solidFill>
+                  <a:schemeClr val="tx1">
+                    <a:lumMod val="75000"/>
+                  </a:schemeClr>
+                </a:solidFill>
+              </a:rPr>
+              <a:t>may</a:t>
+            </a:r>
+            <a:r>
+              <a:rPr lang="de-DE" sz="2900" dirty="0">
+                <a:solidFill>
+                  <a:schemeClr val="tx1">
+                    <a:lumMod val="75000"/>
+                  </a:schemeClr>
+                </a:solidFill>
+              </a:rPr>
+              <a:t> </a:t>
+            </a:r>
+            <a:r>
+              <a:rPr lang="de-DE" sz="2900" dirty="0" err="1">
+                <a:solidFill>
+                  <a:schemeClr val="tx1">
+                    <a:lumMod val="75000"/>
+                  </a:schemeClr>
+                </a:solidFill>
+              </a:rPr>
+              <a:t>explode</a:t>
+            </a:r>
+            <a:r>
+              <a:rPr lang="de-DE" sz="2900" dirty="0">
+                <a:solidFill>
+                  <a:schemeClr val="tx1">
+                    <a:lumMod val="75000"/>
+                  </a:schemeClr>
+                </a:solidFill>
+              </a:rPr>
+              <a:t>, volatile </a:t>
+            </a:r>
+            <a:r>
+              <a:rPr lang="de-DE" sz="2900" dirty="0" err="1">
+                <a:solidFill>
+                  <a:schemeClr val="tx1">
+                    <a:lumMod val="75000"/>
+                  </a:schemeClr>
+                </a:solidFill>
+              </a:rPr>
+              <a:t>api</a:t>
+            </a:r>
+            <a:r>
+              <a:rPr lang="de-DE" sz="2900" dirty="0">
+                <a:solidFill>
+                  <a:schemeClr val="tx1">
+                    <a:lumMod val="75000"/>
+                  </a:schemeClr>
+                </a:solidFill>
+              </a:rPr>
+              <a:t> </a:t>
+            </a:r>
+            <a:r>
+              <a:rPr lang="de-DE" sz="2900" dirty="0" err="1">
+                <a:solidFill>
+                  <a:schemeClr val="tx1">
+                    <a:lumMod val="75000"/>
+                  </a:schemeClr>
+                </a:solidFill>
+              </a:rPr>
+              <a:t>changes</a:t>
+            </a:r>
+            <a:r>
+              <a:rPr lang="de-DE" sz="2900" dirty="0">
+                <a:solidFill>
+                  <a:schemeClr val="tx1">
+                    <a:lumMod val="75000"/>
+                  </a:schemeClr>
+                </a:solidFill>
+              </a:rPr>
+              <a:t> </a:t>
+            </a:r>
+            <a:r>
+              <a:rPr lang="de-DE" sz="2900" dirty="0" err="1">
+                <a:solidFill>
+                  <a:schemeClr val="tx1">
+                    <a:lumMod val="75000"/>
+                  </a:schemeClr>
+                </a:solidFill>
+              </a:rPr>
+              <a:t>expected</a:t>
+            </a:r>
+            <a:br>
+              <a:rPr lang="de-DE" sz="2900" dirty="0"/>
+            </a:br>
+            <a:br>
+              <a:rPr lang="de-DE" sz="2900" dirty="0"/>
+            </a:br>
+            <a:r>
+              <a:rPr lang="de-DE" sz="2900" dirty="0"/>
+              <a:t>v1beta1	</a:t>
+            </a:r>
+            <a:r>
+              <a:rPr lang="de-DE" sz="2900" dirty="0">
+                <a:solidFill>
+                  <a:schemeClr val="tx1">
+                    <a:lumMod val="75000"/>
+                  </a:schemeClr>
+                </a:solidFill>
+              </a:rPr>
+              <a:t>-- </a:t>
+            </a:r>
+            <a:r>
+              <a:rPr lang="de-DE" sz="2900" dirty="0" err="1">
+                <a:solidFill>
+                  <a:schemeClr val="tx1">
+                    <a:lumMod val="75000"/>
+                  </a:schemeClr>
+                </a:solidFill>
+              </a:rPr>
+              <a:t>generally</a:t>
+            </a:r>
+            <a:r>
+              <a:rPr lang="de-DE" sz="2900" dirty="0">
+                <a:solidFill>
+                  <a:schemeClr val="tx1">
+                    <a:lumMod val="75000"/>
+                  </a:schemeClr>
+                </a:solidFill>
+              </a:rPr>
+              <a:t> </a:t>
+            </a:r>
+            <a:r>
+              <a:rPr lang="de-DE" sz="2900" dirty="0" err="1">
+                <a:solidFill>
+                  <a:schemeClr val="tx1">
+                    <a:lumMod val="75000"/>
+                  </a:schemeClr>
+                </a:solidFill>
+              </a:rPr>
+              <a:t>stable</a:t>
+            </a:r>
+            <a:br>
+              <a:rPr lang="de-DE" sz="2900" dirty="0">
+                <a:solidFill>
+                  <a:schemeClr val="tx1">
+                    <a:lumMod val="75000"/>
+                  </a:schemeClr>
+                </a:solidFill>
+              </a:rPr>
+            </a:br>
+            <a:br>
+              <a:rPr lang="de-DE" sz="2900" dirty="0">
+                <a:solidFill>
+                  <a:schemeClr val="tx1">
+                    <a:lumMod val="75000"/>
+                  </a:schemeClr>
+                </a:solidFill>
+              </a:rPr>
+            </a:br>
+            <a:r>
+              <a:rPr lang="de-DE" sz="2900" dirty="0"/>
+              <a:t>v1		</a:t>
+            </a:r>
+            <a:r>
+              <a:rPr lang="de-DE" sz="2900" dirty="0">
+                <a:solidFill>
+                  <a:schemeClr val="tx1">
+                    <a:lumMod val="75000"/>
+                  </a:schemeClr>
+                </a:solidFill>
+              </a:rPr>
+              <a:t>-- GA (</a:t>
+            </a:r>
+            <a:r>
+              <a:rPr lang="de-DE" sz="2900" dirty="0" err="1">
+                <a:solidFill>
+                  <a:schemeClr val="tx1">
+                    <a:lumMod val="75000"/>
+                  </a:schemeClr>
+                </a:solidFill>
+              </a:rPr>
+              <a:t>general</a:t>
+            </a:r>
+            <a:r>
+              <a:rPr lang="de-DE" sz="2900" dirty="0">
+                <a:solidFill>
+                  <a:schemeClr val="tx1">
+                    <a:lumMod val="75000"/>
+                  </a:schemeClr>
+                </a:solidFill>
+              </a:rPr>
+              <a:t> </a:t>
+            </a:r>
+            <a:r>
+              <a:rPr lang="de-DE" sz="2900" dirty="0" err="1">
+                <a:solidFill>
+                  <a:schemeClr val="tx1">
+                    <a:lumMod val="75000"/>
+                  </a:schemeClr>
+                </a:solidFill>
+              </a:rPr>
+              <a:t>availability</a:t>
+            </a:r>
+            <a:r>
+              <a:rPr lang="de-DE" sz="2900" dirty="0">
+                <a:solidFill>
+                  <a:schemeClr val="tx1">
+                    <a:lumMod val="75000"/>
+                  </a:schemeClr>
+                </a:solidFill>
+              </a:rPr>
+              <a:t>)</a:t>
+            </a:r>
+          </a:p>
+          <a:p>
+            <a:endParaRPr lang="de-DE" sz="2400" dirty="0">
+              <a:solidFill>
+                <a:schemeClr val="tx1">
+                  <a:lumMod val="75000"/>
+                </a:schemeClr>
+              </a:solidFill>
+            </a:endParaRPr>
+          </a:p>
+          <a:p>
+            <a:endParaRPr lang="de-DE" sz="2400" dirty="0"/>
+          </a:p>
+        </p:txBody>
+      </p:sp>
+      <p:sp>
+        <p:nvSpPr>
+          <p:cNvPr id="3" name="Title 2">
+            <a:extLst>
+              <a:ext uri="{FF2B5EF4-FFF2-40B4-BE49-F238E27FC236}">
+                <a16:creationId xmlns:a16="http://schemas.microsoft.com/office/drawing/2014/main" id="{60ADE174-6361-924B-9F5E-46A0C40DC7AB}"/>
+              </a:ext>
+            </a:extLst>
+          </p:cNvPr>
+          <p:cNvSpPr>
+            <a:spLocks noGrp="1"/>
+          </p:cNvSpPr>
+          <p:nvPr>
+            <p:ph type="title"/>
+          </p:nvPr>
+        </p:nvSpPr>
+        <p:spPr/>
+        <p:txBody>
+          <a:bodyPr/>
+          <a:lstStyle/>
+          <a:p>
+            <a:r>
+              <a:rPr lang="de-DE" dirty="0"/>
+              <a:t>API </a:t>
+            </a:r>
+            <a:r>
+              <a:rPr lang="de-DE" dirty="0" err="1"/>
+              <a:t>Versioning</a:t>
+            </a:r>
+            <a:endParaRPr lang="de-DE" dirty="0"/>
+          </a:p>
+        </p:txBody>
+      </p:sp>
+    </p:spTree>
+    <p:extLst>
+      <p:ext uri="{BB962C8B-B14F-4D97-AF65-F5344CB8AC3E}">
+        <p14:creationId xmlns:p14="http://schemas.microsoft.com/office/powerpoint/2010/main" val="2095446172"/>
+      </p:ext>
+    </p:extLst>
+  </p:cSld>
+  <p:clrMapOvr>
+    <a:masterClrMapping/>
+  </p:clrMapOvr>
+</p:sld>
+</file>
+
+<file path=ppt/slides/slide11.xml><?xml version="1.0" encoding="utf-8"?>
+<p:sld xmlns:a="http://schemas.openxmlformats.org/drawingml/2006/main" xmlns:r="http://schemas.openxmlformats.org/officeDocument/2006/relationships" xmlns:p="http://schemas.openxmlformats.org/presentationml/2006/main">
+  <p:cSld>
+    <p:spTree>
+      <p:nvGrpSpPr>
+        <p:cNvPr id="1" name=""/>
+        <p:cNvGrpSpPr/>
+        <p:nvPr/>
+      </p:nvGrpSpPr>
+      <p:grpSpPr>
+        <a:xfrm>
+          <a:off x="0" y="0"/>
+          <a:ext cx="0" cy="0"/>
+          <a:chOff x="0" y="0"/>
+          <a:chExt cx="0" cy="0"/>
+        </a:xfrm>
+      </p:grpSpPr>
+      <p:sp>
+        <p:nvSpPr>
+          <p:cNvPr id="2" name="Text Placeholder 1"/>
+          <p:cNvSpPr>
+            <a:spLocks noGrp="1"/>
+          </p:cNvSpPr>
+          <p:nvPr>
+            <p:ph type="body" sz="quarter" idx="10"/>
+          </p:nvPr>
+        </p:nvSpPr>
+        <p:spPr>
+          <a:xfrm>
+            <a:off x="504000" y="1620000"/>
+            <a:ext cx="6193980" cy="4230000"/>
+          </a:xfrm>
+        </p:spPr>
+        <p:txBody>
+          <a:bodyPr/>
+          <a:lstStyle/>
+          <a:p>
+            <a:r>
+              <a:rPr lang="en-US" dirty="0"/>
+              <a:t>YAML: “YAML </a:t>
+            </a:r>
+            <a:r>
+              <a:rPr lang="en-US" dirty="0" err="1"/>
+              <a:t>Ain't</a:t>
+            </a:r>
+            <a:r>
+              <a:rPr lang="en-US" dirty="0"/>
+              <a:t> Markup Language”</a:t>
+            </a:r>
+          </a:p>
+          <a:p>
+            <a:pPr marL="342900" indent="-342900">
+              <a:buSzPct val="100000"/>
+              <a:buFont typeface="Wingdings" panose="05000000000000000000" pitchFamily="2" charset="2"/>
+              <a:buChar char="§"/>
+            </a:pPr>
+            <a:r>
+              <a:rPr lang="en-US" dirty="0"/>
+              <a:t>YAML is a human friendly data serialization standard for all programming languages.</a:t>
+            </a:r>
+          </a:p>
+          <a:p>
+            <a:pPr marL="342900" indent="-342900">
+              <a:buSzPct val="100000"/>
+              <a:buFont typeface="Wingdings" panose="05000000000000000000" pitchFamily="2" charset="2"/>
+              <a:buChar char="§"/>
+            </a:pPr>
+            <a:r>
+              <a:rPr lang="en-US" dirty="0"/>
+              <a:t>          Indentation based</a:t>
+            </a:r>
+          </a:p>
+          <a:p>
+            <a:pPr marL="342900" indent="-342900">
+              <a:buSzPct val="100000"/>
+              <a:buFont typeface="Wingdings" panose="05000000000000000000" pitchFamily="2" charset="2"/>
+              <a:buChar char="§"/>
+            </a:pPr>
+            <a:r>
+              <a:rPr lang="en-US" dirty="0"/>
+              <a:t>Supports </a:t>
+            </a:r>
+            <a:r>
+              <a:rPr lang="en-US" dirty="0" err="1"/>
+              <a:t>key:value</a:t>
+            </a:r>
+            <a:r>
+              <a:rPr lang="en-US" dirty="0"/>
+              <a:t> maps and lists</a:t>
+            </a:r>
+          </a:p>
+          <a:p>
+            <a:pPr marL="342900" indent="-342900">
+              <a:buSzPct val="100000"/>
+              <a:buFont typeface="Wingdings" panose="05000000000000000000" pitchFamily="2" charset="2"/>
+              <a:buChar char="§"/>
+            </a:pPr>
+            <a:r>
+              <a:rPr lang="en-US" dirty="0"/>
+              <a:t>Supports nesting - a value can also contain another </a:t>
+            </a:r>
+            <a:r>
+              <a:rPr lang="en-US" dirty="0" err="1"/>
+              <a:t>key:value</a:t>
+            </a:r>
+            <a:r>
+              <a:rPr lang="en-US" dirty="0"/>
+              <a:t> map or a list</a:t>
+            </a:r>
+          </a:p>
+          <a:p>
+            <a:endParaRPr lang="en-US" dirty="0"/>
+          </a:p>
+        </p:txBody>
+      </p:sp>
+      <p:sp>
+        <p:nvSpPr>
+          <p:cNvPr id="3" name="Title 2"/>
+          <p:cNvSpPr>
+            <a:spLocks noGrp="1"/>
+          </p:cNvSpPr>
+          <p:nvPr>
+            <p:ph type="title"/>
+          </p:nvPr>
+        </p:nvSpPr>
+        <p:spPr/>
+        <p:txBody>
+          <a:bodyPr/>
+          <a:lstStyle/>
+          <a:p>
+            <a:r>
+              <a:rPr lang="de-DE" dirty="0"/>
+              <a:t>YAML</a:t>
+            </a:r>
+          </a:p>
+        </p:txBody>
+      </p:sp>
+      <p:pic>
+        <p:nvPicPr>
+          <p:cNvPr id="6" name="Picture 5"/>
+          <p:cNvPicPr>
+            <a:picLocks noChangeAspect="1"/>
+          </p:cNvPicPr>
+          <p:nvPr/>
+        </p:nvPicPr>
+        <p:blipFill>
+          <a:blip r:embed="rId2"/>
+          <a:stretch>
+            <a:fillRect/>
+          </a:stretch>
+        </p:blipFill>
+        <p:spPr>
+          <a:xfrm>
+            <a:off x="7146599" y="1028700"/>
+            <a:ext cx="4375972" cy="4991475"/>
+          </a:xfrm>
+          <a:prstGeom prst="rect">
+            <a:avLst/>
+          </a:prstGeom>
+        </p:spPr>
+      </p:pic>
+    </p:spTree>
+    <p:extLst>
+      <p:ext uri="{BB962C8B-B14F-4D97-AF65-F5344CB8AC3E}">
+        <p14:creationId xmlns:p14="http://schemas.microsoft.com/office/powerpoint/2010/main" val="1213574445"/>
+      </p:ext>
+    </p:extLst>
+  </p:cSld>
+  <p:clrMapOvr>
+    <a:masterClrMapping/>
+  </p:clrMapOvr>
+</p:sld>
+</file>
+
+<file path=ppt/slides/slide12.xml><?xml version="1.0" encoding="utf-8"?>
+<p:sld xmlns:a="http://schemas.openxmlformats.org/drawingml/2006/main" xmlns:r="http://schemas.openxmlformats.org/officeDocument/2006/relationships" xmlns:p="http://schemas.openxmlformats.org/presentationml/2006/main">
+  <p:cSld>
+    <p:spTree>
+      <p:nvGrpSpPr>
+        <p:cNvPr id="1" name=""/>
+        <p:cNvGrpSpPr/>
+        <p:nvPr/>
+      </p:nvGrpSpPr>
+      <p:grpSpPr>
+        <a:xfrm>
+          <a:off x="0" y="0"/>
+          <a:ext cx="0" cy="0"/>
+          <a:chOff x="0" y="0"/>
+          <a:chExt cx="0" cy="0"/>
+        </a:xfrm>
+      </p:grpSpPr>
+      <p:sp>
+        <p:nvSpPr>
           <p:cNvPr id="3" name="Title 2"/>
           <p:cNvSpPr>
             <a:spLocks noGrp="1"/>
@@ -14767,7 +15672,7 @@
 </p:sld>
 </file>
 
-<file path=ppt/slides/slide11.xml><?xml version="1.0" encoding="utf-8"?>
+<file path=ppt/slides/slide13.xml><?xml version="1.0" encoding="utf-8"?>
 <p:sld xmlns:a="http://schemas.openxmlformats.org/drawingml/2006/main" xmlns:r="http://schemas.openxmlformats.org/officeDocument/2006/relationships" xmlns:p="http://schemas.openxmlformats.org/presentationml/2006/main">
   <p:cSld>
     <p:spTree>
@@ -14849,7 +15754,7 @@
 </p:sld>
 </file>
 
-<file path=ppt/slides/slide12.xml><?xml version="1.0" encoding="utf-8"?>
+<file path=ppt/slides/slide14.xml><?xml version="1.0" encoding="utf-8"?>
 <p:sld xmlns:a="http://schemas.openxmlformats.org/drawingml/2006/main" xmlns:r="http://schemas.openxmlformats.org/officeDocument/2006/relationships" xmlns:p="http://schemas.openxmlformats.org/presentationml/2006/main">
   <p:cSld>
     <p:spTree>
@@ -15996,7 +16901,7 @@
 </p:sld>
 </file>
 
-<file path=ppt/slides/slide13.xml><?xml version="1.0" encoding="utf-8"?>
+<file path=ppt/slides/slide15.xml><?xml version="1.0" encoding="utf-8"?>
 <p:sld xmlns:a="http://schemas.openxmlformats.org/drawingml/2006/main" xmlns:r="http://schemas.openxmlformats.org/officeDocument/2006/relationships" xmlns:p="http://schemas.openxmlformats.org/presentationml/2006/main">
   <p:cSld>
     <p:spTree>
@@ -16084,7 +16989,7 @@
 </p:sld>
 </file>
 
-<file path=ppt/slides/slide14.xml><?xml version="1.0" encoding="utf-8"?>
+<file path=ppt/slides/slide16.xml><?xml version="1.0" encoding="utf-8"?>
 <p:sld xmlns:a="http://schemas.openxmlformats.org/drawingml/2006/main" xmlns:r="http://schemas.openxmlformats.org/officeDocument/2006/relationships" xmlns:p="http://schemas.openxmlformats.org/presentationml/2006/main" show="0">
   <p:cSld>
     <p:spTree>
@@ -20702,7 +21607,13 @@
       </p:grpSpPr>
       <p:sp>
         <p:nvSpPr>
-          <p:cNvPr id="2" name="Text Placeholder 1"/>
+          <p:cNvPr id="2" name="Text Placeholder 1">
+            <a:extLst>
+              <a:ext uri="{FF2B5EF4-FFF2-40B4-BE49-F238E27FC236}">
+                <a16:creationId xmlns:a16="http://schemas.microsoft.com/office/drawing/2014/main" id="{E187B6B1-1962-F343-B945-09936343593B}"/>
+              </a:ext>
+            </a:extLst>
+          </p:cNvPr>
           <p:cNvSpPr>
             <a:spLocks noGrp="1"/>
           </p:cNvSpPr>
@@ -20710,97 +21621,351 @@
             <p:ph type="body" sz="quarter" idx="10"/>
           </p:nvPr>
         </p:nvSpPr>
-        <p:spPr>
-          <a:xfrm>
-            <a:off x="504000" y="1620000"/>
-            <a:ext cx="6193980" cy="4230000"/>
-          </a:xfrm>
-        </p:spPr>
+        <p:spPr/>
         <p:txBody>
           <a:bodyPr/>
           <a:lstStyle/>
           <a:p>
             <a:r>
-              <a:rPr lang="en-US" dirty="0"/>
-              <a:t>YAML: “YAML </a:t>
-            </a:r>
-            <a:r>
-              <a:rPr lang="en-US" dirty="0" err="1"/>
-              <a:t>Ain't</a:t>
-            </a:r>
-            <a:r>
-              <a:rPr lang="en-US" dirty="0"/>
-              <a:t> Markup Language”</a:t>
-            </a:r>
-          </a:p>
-          <a:p>
-            <a:pPr marL="342900" indent="-342900">
-              <a:buSzPct val="100000"/>
-              <a:buFont typeface="Wingdings" panose="05000000000000000000" pitchFamily="2" charset="2"/>
-              <a:buChar char="§"/>
-            </a:pPr>
-            <a:r>
-              <a:rPr lang="en-US" dirty="0"/>
-              <a:t>YAML is a human friendly data serialization standard for all programming languages.</a:t>
-            </a:r>
-          </a:p>
-          <a:p>
-            <a:pPr marL="342900" indent="-342900">
-              <a:buSzPct val="100000"/>
-              <a:buFont typeface="Wingdings" panose="05000000000000000000" pitchFamily="2" charset="2"/>
-              <a:buChar char="§"/>
-            </a:pPr>
-            <a:r>
-              <a:rPr lang="en-US" dirty="0"/>
-              <a:t>          Indentation based</a:t>
-            </a:r>
-          </a:p>
-          <a:p>
-            <a:pPr marL="342900" indent="-342900">
-              <a:buSzPct val="100000"/>
-              <a:buFont typeface="Wingdings" panose="05000000000000000000" pitchFamily="2" charset="2"/>
-              <a:buChar char="§"/>
-            </a:pPr>
-            <a:r>
-              <a:rPr lang="en-US" dirty="0"/>
-              <a:t>Supports </a:t>
-            </a:r>
-            <a:r>
-              <a:rPr lang="en-US" dirty="0" err="1"/>
-              <a:t>key:value</a:t>
-            </a:r>
-            <a:r>
-              <a:rPr lang="en-US" dirty="0"/>
-              <a:t> maps and lists</a:t>
-            </a:r>
-          </a:p>
-          <a:p>
-            <a:pPr marL="342900" indent="-342900">
-              <a:buSzPct val="100000"/>
-              <a:buFont typeface="Wingdings" panose="05000000000000000000" pitchFamily="2" charset="2"/>
-              <a:buChar char="§"/>
-            </a:pPr>
-            <a:r>
-              <a:rPr lang="en-US" dirty="0"/>
-              <a:t>Supports nesting - a value can also contain another </a:t>
-            </a:r>
-            <a:r>
-              <a:rPr lang="en-US" dirty="0" err="1"/>
-              <a:t>key:value</a:t>
-            </a:r>
-            <a:r>
-              <a:rPr lang="en-US" dirty="0"/>
-              <a:t> map or a list</a:t>
-            </a:r>
-          </a:p>
-          <a:p>
-            <a:endParaRPr lang="en-US" dirty="0"/>
+              <a:rPr lang="de-DE" sz="2400" dirty="0"/>
+              <a:t>/</a:t>
+            </a:r>
+            <a:r>
+              <a:rPr lang="de-DE" sz="2400" dirty="0" err="1"/>
+              <a:t>api</a:t>
+            </a:r>
+            <a:r>
+              <a:rPr lang="de-DE" sz="2400" dirty="0"/>
+              <a:t>			</a:t>
+            </a:r>
+            <a:r>
+              <a:rPr lang="de-DE" sz="2400" dirty="0">
+                <a:solidFill>
+                  <a:schemeClr val="tx1">
+                    <a:lumMod val="75000"/>
+                  </a:schemeClr>
+                </a:solidFill>
+              </a:rPr>
+              <a:t>-- </a:t>
+            </a:r>
+            <a:r>
+              <a:rPr lang="de-DE" sz="2400" dirty="0" err="1">
+                <a:solidFill>
+                  <a:schemeClr val="tx1">
+                    <a:lumMod val="75000"/>
+                  </a:schemeClr>
+                </a:solidFill>
+              </a:rPr>
+              <a:t>core</a:t>
+            </a:r>
+            <a:r>
+              <a:rPr lang="de-DE" sz="2400" dirty="0">
+                <a:solidFill>
+                  <a:schemeClr val="tx1">
+                    <a:lumMod val="75000"/>
+                  </a:schemeClr>
+                </a:solidFill>
+              </a:rPr>
+              <a:t> </a:t>
+            </a:r>
+            <a:r>
+              <a:rPr lang="de-DE" sz="2400" dirty="0" err="1">
+                <a:solidFill>
+                  <a:schemeClr val="tx1">
+                    <a:lumMod val="75000"/>
+                  </a:schemeClr>
+                </a:solidFill>
+              </a:rPr>
+              <a:t>objects</a:t>
+            </a:r>
+            <a:r>
+              <a:rPr lang="de-DE" sz="2400" dirty="0">
+                <a:solidFill>
+                  <a:schemeClr val="tx1">
+                    <a:lumMod val="75000"/>
+                  </a:schemeClr>
+                </a:solidFill>
+              </a:rPr>
+              <a:t> like </a:t>
+            </a:r>
+            <a:r>
+              <a:rPr lang="de-DE" sz="2400" dirty="0" err="1">
+                <a:solidFill>
+                  <a:schemeClr val="tx1">
+                    <a:lumMod val="75000"/>
+                  </a:schemeClr>
+                </a:solidFill>
+              </a:rPr>
+              <a:t>pods</a:t>
+            </a:r>
+            <a:r>
+              <a:rPr lang="de-DE" sz="2400" dirty="0">
+                <a:solidFill>
+                  <a:schemeClr val="tx1">
+                    <a:lumMod val="75000"/>
+                  </a:schemeClr>
+                </a:solidFill>
+              </a:rPr>
+              <a:t> </a:t>
+            </a:r>
+            <a:r>
+              <a:rPr lang="de-DE" sz="2400" dirty="0" err="1">
+                <a:solidFill>
+                  <a:schemeClr val="tx1">
+                    <a:lumMod val="75000"/>
+                  </a:schemeClr>
+                </a:solidFill>
+              </a:rPr>
+              <a:t>or</a:t>
+            </a:r>
+            <a:r>
+              <a:rPr lang="de-DE" sz="2400" dirty="0">
+                <a:solidFill>
+                  <a:schemeClr val="tx1">
+                    <a:lumMod val="75000"/>
+                  </a:schemeClr>
+                </a:solidFill>
+              </a:rPr>
+              <a:t> </a:t>
+            </a:r>
+            <a:r>
+              <a:rPr lang="de-DE" sz="2400" dirty="0" err="1">
+                <a:solidFill>
+                  <a:schemeClr val="tx1">
+                    <a:lumMod val="75000"/>
+                  </a:schemeClr>
+                </a:solidFill>
+              </a:rPr>
+              <a:t>services</a:t>
+            </a:r>
+            <a:br>
+              <a:rPr lang="de-DE" sz="2400" dirty="0"/>
+            </a:br>
+            <a:r>
+              <a:rPr lang="de-DE" sz="2400" dirty="0"/>
+              <a:t>/</a:t>
+            </a:r>
+            <a:r>
+              <a:rPr lang="de-DE" sz="2400" dirty="0" err="1"/>
+              <a:t>api</a:t>
+            </a:r>
+            <a:r>
+              <a:rPr lang="de-DE" sz="2400" dirty="0"/>
+              <a:t>/&lt;</a:t>
+            </a:r>
+            <a:r>
+              <a:rPr lang="de-DE" sz="2400" dirty="0" err="1"/>
+              <a:t>apigroup</a:t>
+            </a:r>
+            <a:r>
+              <a:rPr lang="de-DE" sz="2400" dirty="0"/>
+              <a:t>&gt; 	</a:t>
+            </a:r>
+            <a:r>
+              <a:rPr lang="de-DE" sz="2400" dirty="0">
+                <a:solidFill>
+                  <a:schemeClr val="tx1">
+                    <a:lumMod val="75000"/>
+                  </a:schemeClr>
+                </a:solidFill>
+              </a:rPr>
+              <a:t>-- </a:t>
+            </a:r>
+            <a:r>
+              <a:rPr lang="de-DE" sz="2400" dirty="0" err="1">
+                <a:solidFill>
+                  <a:schemeClr val="tx1">
+                    <a:lumMod val="75000"/>
+                  </a:schemeClr>
+                </a:solidFill>
+              </a:rPr>
+              <a:t>added</a:t>
+            </a:r>
+            <a:r>
+              <a:rPr lang="de-DE" sz="2400" dirty="0">
+                <a:solidFill>
+                  <a:schemeClr val="tx1">
+                    <a:lumMod val="75000"/>
+                  </a:schemeClr>
+                </a:solidFill>
+              </a:rPr>
+              <a:t> </a:t>
+            </a:r>
+            <a:r>
+              <a:rPr lang="de-DE" sz="2400" dirty="0" err="1">
+                <a:solidFill>
+                  <a:schemeClr val="tx1">
+                    <a:lumMod val="75000"/>
+                  </a:schemeClr>
+                </a:solidFill>
+              </a:rPr>
+              <a:t>later</a:t>
+            </a:r>
+            <a:r>
+              <a:rPr lang="de-DE" sz="2400" dirty="0">
+                <a:solidFill>
+                  <a:schemeClr val="tx1">
+                    <a:lumMod val="75000"/>
+                  </a:schemeClr>
+                </a:solidFill>
+              </a:rPr>
+              <a:t> </a:t>
+            </a:r>
+            <a:r>
+              <a:rPr lang="de-DE" sz="2400" dirty="0" err="1">
+                <a:solidFill>
+                  <a:schemeClr val="tx1">
+                    <a:lumMod val="75000"/>
+                  </a:schemeClr>
+                </a:solidFill>
+              </a:rPr>
+              <a:t>as</a:t>
+            </a:r>
+            <a:r>
+              <a:rPr lang="de-DE" sz="2400" dirty="0">
+                <a:solidFill>
+                  <a:schemeClr val="tx1">
+                    <a:lumMod val="75000"/>
+                  </a:schemeClr>
+                </a:solidFill>
+              </a:rPr>
+              <a:t> </a:t>
+            </a:r>
+            <a:r>
+              <a:rPr lang="de-DE" sz="2400" dirty="0" err="1">
+                <a:solidFill>
+                  <a:schemeClr val="tx1">
+                    <a:lumMod val="75000"/>
+                  </a:schemeClr>
+                </a:solidFill>
+              </a:rPr>
+              <a:t>the</a:t>
+            </a:r>
+            <a:r>
+              <a:rPr lang="de-DE" sz="2400" dirty="0">
+                <a:solidFill>
+                  <a:schemeClr val="tx1">
+                    <a:lumMod val="75000"/>
+                  </a:schemeClr>
+                </a:solidFill>
+              </a:rPr>
+              <a:t> API </a:t>
+            </a:r>
+            <a:r>
+              <a:rPr lang="de-DE" sz="2400" dirty="0" err="1">
+                <a:solidFill>
+                  <a:schemeClr val="tx1">
+                    <a:lumMod val="75000"/>
+                  </a:schemeClr>
+                </a:solidFill>
+              </a:rPr>
+              <a:t>grew</a:t>
+            </a:r>
+            <a:endParaRPr lang="de-DE" sz="2400" dirty="0">
+              <a:solidFill>
+                <a:schemeClr val="tx1">
+                  <a:lumMod val="75000"/>
+                </a:schemeClr>
+              </a:solidFill>
+            </a:endParaRPr>
+          </a:p>
+          <a:p>
+            <a:r>
+              <a:rPr lang="de-DE" sz="2400" dirty="0"/>
+              <a:t>/ </a:t>
+            </a:r>
+            <a:r>
+              <a:rPr lang="de-DE" sz="2400" dirty="0" err="1"/>
+              <a:t>api</a:t>
+            </a:r>
+            <a:r>
+              <a:rPr lang="de-DE" sz="2400" dirty="0"/>
+              <a:t> / </a:t>
+            </a:r>
+            <a:r>
+              <a:rPr lang="de-DE" sz="2400" i="1" dirty="0"/>
+              <a:t>&lt;</a:t>
+            </a:r>
+            <a:r>
+              <a:rPr lang="de-DE" sz="2400" i="1" dirty="0" err="1"/>
+              <a:t>version</a:t>
+            </a:r>
+            <a:r>
+              <a:rPr lang="de-DE" sz="2400" i="1" dirty="0"/>
+              <a:t>&gt; </a:t>
+            </a:r>
+            <a:r>
+              <a:rPr lang="de-DE" sz="2400" dirty="0"/>
+              <a:t>/ </a:t>
+            </a:r>
+            <a:r>
+              <a:rPr lang="de-DE" sz="2400" dirty="0" err="1"/>
+              <a:t>namespaces</a:t>
+            </a:r>
+            <a:r>
+              <a:rPr lang="de-DE" sz="2400" dirty="0"/>
+              <a:t> / </a:t>
+            </a:r>
+            <a:r>
+              <a:rPr lang="de-DE" sz="2400" i="1" dirty="0"/>
+              <a:t>&lt;</a:t>
+            </a:r>
+            <a:r>
+              <a:rPr lang="de-DE" sz="2400" i="1" dirty="0" err="1"/>
+              <a:t>ns</a:t>
+            </a:r>
+            <a:r>
+              <a:rPr lang="de-DE" sz="2400" i="1" dirty="0"/>
+              <a:t>&gt; </a:t>
+            </a:r>
+            <a:r>
+              <a:rPr lang="de-DE" sz="2400" dirty="0"/>
+              <a:t>/ </a:t>
+            </a:r>
+            <a:r>
+              <a:rPr lang="de-DE" sz="2400" i="1" dirty="0"/>
+              <a:t>&lt;</a:t>
+            </a:r>
+            <a:r>
+              <a:rPr lang="de-DE" sz="2400" i="1" dirty="0" err="1"/>
+              <a:t>resource</a:t>
+            </a:r>
+            <a:r>
+              <a:rPr lang="de-DE" sz="2400" i="1" dirty="0"/>
+              <a:t>-type-name&gt; </a:t>
+            </a:r>
+            <a:r>
+              <a:rPr lang="de-DE" sz="2400" dirty="0"/>
+              <a:t>/ </a:t>
+            </a:r>
+            <a:r>
+              <a:rPr lang="de-DE" sz="2400" i="1" dirty="0"/>
+              <a:t>&lt;</a:t>
+            </a:r>
+            <a:r>
+              <a:rPr lang="de-DE" sz="2400" i="1" dirty="0" err="1"/>
+              <a:t>resource</a:t>
+            </a:r>
+            <a:r>
+              <a:rPr lang="de-DE" sz="2400" i="1" dirty="0"/>
+              <a:t>-name&gt;</a:t>
+            </a:r>
+            <a:endParaRPr lang="de-DE" dirty="0"/>
+          </a:p>
+          <a:p>
+            <a:endParaRPr lang="de-DE" sz="2400" dirty="0"/>
           </a:p>
         </p:txBody>
       </p:sp>
       <p:sp>
         <p:nvSpPr>
-          <p:cNvPr id="3" name="Title 2"/>
+          <p:cNvPr id="3" name="Title 2">
+            <a:extLst>
+              <a:ext uri="{FF2B5EF4-FFF2-40B4-BE49-F238E27FC236}">
+                <a16:creationId xmlns:a16="http://schemas.microsoft.com/office/drawing/2014/main" id="{60ADE174-6361-924B-9F5E-46A0C40DC7AB}"/>
+              </a:ext>
+            </a:extLst>
+          </p:cNvPr>
           <p:cNvSpPr>
             <a:spLocks noGrp="1"/>
           </p:cNvSpPr>
@@ -20815,39 +21980,20 @@
           <a:p>
             <a:r>
               <a:rPr lang="de-DE" dirty="0"/>
-              <a:t>YAML</a:t>
-            </a:r>
+              <a:t>API </a:t>
+            </a:r>
+            <a:r>
+              <a:rPr lang="de-DE" dirty="0" err="1"/>
+              <a:t>Structure</a:t>
+            </a:r>
+            <a:endParaRPr lang="de-DE" dirty="0"/>
           </a:p>
         </p:txBody>
       </p:sp>
-      <p:pic>
-        <p:nvPicPr>
-          <p:cNvPr id="6" name="Picture 5"/>
-          <p:cNvPicPr>
-            <a:picLocks noChangeAspect="1"/>
-          </p:cNvPicPr>
-          <p:nvPr/>
-        </p:nvPicPr>
-        <p:blipFill>
-          <a:blip r:embed="rId2"/>
-          <a:stretch>
-            <a:fillRect/>
-          </a:stretch>
-        </p:blipFill>
-        <p:spPr>
-          <a:xfrm>
-            <a:off x="7146599" y="1028700"/>
-            <a:ext cx="4375972" cy="4991475"/>
-          </a:xfrm>
-          <a:prstGeom prst="rect">
-            <a:avLst/>
-          </a:prstGeom>
-        </p:spPr>
-      </p:pic>
     </p:spTree>
     <p:extLst>
       <p:ext uri="{BB962C8B-B14F-4D97-AF65-F5344CB8AC3E}">
-        <p14:creationId xmlns:p14="http://schemas.microsoft.com/office/powerpoint/2010/main" val="1213574445"/>
+        <p14:creationId xmlns:p14="http://schemas.microsoft.com/office/powerpoint/2010/main" val="355482527"/>
       </p:ext>
     </p:extLst>
   </p:cSld>

</xml_diff>

<commit_message>
workers are now called nodes in slide deck
</commit_message>
<xml_diff>
--- a/kubernetes/01_k8s_core_components.pptx
+++ b/kubernetes/01_k8s_core_components.pptx
@@ -15190,12 +15190,16 @@
               <a:buSzPct val="80000"/>
             </a:pPr>
             <a:r>
-              <a:rPr lang="de-DE" sz="1400" b="1" kern="0" dirty="0">
+              <a:rPr lang="de-DE" sz="1400" b="1" kern="0">
                 <a:ea typeface="Arial Unicode MS" pitchFamily="34" charset="-128"/>
                 <a:cs typeface="Arial Unicode MS" pitchFamily="34" charset="-128"/>
               </a:rPr>
-              <a:t>Worker</a:t>
-            </a:r>
+              <a:t>Nodes</a:t>
+            </a:r>
+            <a:endParaRPr lang="de-DE" sz="1400" b="1" kern="0" dirty="0">
+              <a:ea typeface="Arial Unicode MS" pitchFamily="34" charset="-128"/>
+              <a:cs typeface="Arial Unicode MS" pitchFamily="34" charset="-128"/>
+            </a:endParaRPr>
           </a:p>
         </p:txBody>
       </p:sp>
@@ -18465,7 +18469,7 @@
                 <a:ea typeface="Arial Unicode MS" pitchFamily="34" charset="-128"/>
                 <a:cs typeface="Arial Unicode MS" pitchFamily="34" charset="-128"/>
               </a:rPr>
-              <a:t>Worker</a:t>
+              <a:t>Nodes</a:t>
             </a:r>
           </a:p>
         </p:txBody>
@@ -20340,7 +20344,7 @@
                 <a:ea typeface="Arial Unicode MS" pitchFamily="34" charset="-128"/>
                 <a:cs typeface="Arial Unicode MS" pitchFamily="34" charset="-128"/>
               </a:rPr>
-              <a:t>Worker</a:t>
+              <a:t>Nodes</a:t>
             </a:r>
           </a:p>
         </p:txBody>

</xml_diff>

<commit_message>
changed "worker" to "node"
</commit_message>
<xml_diff>
--- a/kubernetes/01_k8s_core_components.pptx
+++ b/kubernetes/01_k8s_core_components.pptx
@@ -16010,12 +16010,16 @@
               <a:buSzPct val="80000"/>
             </a:pPr>
             <a:r>
-              <a:rPr lang="de-DE" sz="2400" b="1" kern="0" dirty="0">
+              <a:rPr lang="de-DE" sz="2400" b="1" kern="0" dirty="0" err="1">
                 <a:ea typeface="Arial Unicode MS" pitchFamily="34" charset="-128"/>
                 <a:cs typeface="Arial Unicode MS" pitchFamily="34" charset="-128"/>
               </a:rPr>
-              <a:t>Worker</a:t>
-            </a:r>
+              <a:t>Node</a:t>
+            </a:r>
+            <a:endParaRPr lang="de-DE" sz="2400" b="1" kern="0" dirty="0">
+              <a:ea typeface="Arial Unicode MS" pitchFamily="34" charset="-128"/>
+              <a:cs typeface="Arial Unicode MS" pitchFamily="34" charset="-128"/>
+            </a:endParaRPr>
           </a:p>
         </p:txBody>
       </p:sp>
@@ -16312,12 +16316,16 @@
               <a:buSzPct val="80000"/>
             </a:pPr>
             <a:r>
-              <a:rPr lang="de-DE" sz="2400" b="1" kern="0" dirty="0">
+              <a:rPr lang="de-DE" sz="2400" b="1" kern="0" dirty="0" err="1">
                 <a:ea typeface="Arial Unicode MS" pitchFamily="34" charset="-128"/>
                 <a:cs typeface="Arial Unicode MS" pitchFamily="34" charset="-128"/>
               </a:rPr>
-              <a:t>Worker</a:t>
-            </a:r>
+              <a:t>Node</a:t>
+            </a:r>
+            <a:endParaRPr lang="de-DE" sz="2400" b="1" kern="0" dirty="0">
+              <a:ea typeface="Arial Unicode MS" pitchFamily="34" charset="-128"/>
+              <a:cs typeface="Arial Unicode MS" pitchFamily="34" charset="-128"/>
+            </a:endParaRPr>
           </a:p>
         </p:txBody>
       </p:sp>
@@ -16371,12 +16379,16 @@
               <a:buSzPct val="80000"/>
             </a:pPr>
             <a:r>
-              <a:rPr lang="de-DE" sz="2400" b="1" kern="0" dirty="0">
+              <a:rPr lang="de-DE" sz="2400" b="1" kern="0" dirty="0" err="1">
                 <a:ea typeface="Arial Unicode MS" pitchFamily="34" charset="-128"/>
                 <a:cs typeface="Arial Unicode MS" pitchFamily="34" charset="-128"/>
               </a:rPr>
-              <a:t>Worker</a:t>
-            </a:r>
+              <a:t>Node</a:t>
+            </a:r>
+            <a:endParaRPr lang="de-DE" sz="2400" b="1" kern="0" dirty="0">
+              <a:ea typeface="Arial Unicode MS" pitchFamily="34" charset="-128"/>
+              <a:cs typeface="Arial Unicode MS" pitchFamily="34" charset="-128"/>
+            </a:endParaRPr>
           </a:p>
         </p:txBody>
       </p:sp>

</xml_diff>

<commit_message>
switch to white background
</commit_message>
<xml_diff>
--- a/kubernetes/01_k8s_core_components.pptx
+++ b/kubernetes/01_k8s_core_components.pptx
@@ -5825,7 +5825,7 @@
           </a:bodyPr>
           <a:lstStyle/>
           <a:p>
-            <a:endParaRPr lang="en-US"/>
+            <a:endParaRPr lang="en-US" dirty="0"/>
           </a:p>
         </p:txBody>
       </p:sp>
@@ -6691,6 +6691,12 @@
               <a:t> server to sync their activities.</a:t>
             </a:r>
           </a:p>
+          <a:p>
+            <a:endParaRPr lang="en-US" dirty="0"/>
+          </a:p>
+          <a:p>
+            <a:endParaRPr lang="en-US" dirty="0"/>
+          </a:p>
         </p:txBody>
       </p:sp>
       <p:sp>
@@ -7161,7 +7167,7 @@
             </a:r>
             <a:r>
               <a:rPr lang="en-US" dirty="0"/>
-              <a:t> monitors, if there are new pods to be scheduled on its worker note. If yes, it takes action</a:t>
+              <a:t> monitors, if there are new pods to be scheduled on its worker note. If yes, it takes action -&gt; start a container and update the pods status</a:t>
             </a:r>
           </a:p>
           <a:p>
@@ -9427,14 +9433,6 @@
 <file path=ppt/slideLayouts/slideLayout15.xml><?xml version="1.0" encoding="utf-8"?>
 <p:sldLayout xmlns:a="http://schemas.openxmlformats.org/drawingml/2006/main" xmlns:r="http://schemas.openxmlformats.org/officeDocument/2006/relationships" xmlns:p="http://schemas.openxmlformats.org/presentationml/2006/main" preserve="1" userDrawn="1">
   <p:cSld name="Quote">
-    <p:bg>
-      <p:bgPr>
-        <a:solidFill>
-          <a:schemeClr val="bg1"/>
-        </a:solidFill>
-        <a:effectLst/>
-      </p:bgPr>
-    </p:bg>
     <p:spTree>
       <p:nvGrpSpPr>
         <p:cNvPr id="1" name=""/>
@@ -14396,7 +14394,7 @@
       </p:ext>
     </p:extLst>
   </p:cSld>
-  <p:clrMap bg1="dk1" tx1="lt1" bg2="dk2" tx2="lt2" accent1="accent1" accent2="accent2" accent3="accent3" accent4="accent4" accent5="accent5" accent6="accent6" hlink="hlink" folHlink="folHlink"/>
+  <p:clrMap bg1="lt1" tx1="dk1" bg2="lt2" tx2="dk2" accent1="accent1" accent2="accent2" accent3="accent3" accent4="accent4" accent5="accent5" accent6="accent6" hlink="hlink" folHlink="folHlink"/>
   <p:sldLayoutIdLst>
     <p:sldLayoutId id="2147483772" r:id="rId1"/>
     <p:sldLayoutId id="2147483776" r:id="rId2"/>
@@ -14756,25 +14754,6 @@
       </p:sp>
       <p:pic>
         <p:nvPicPr>
-          <p:cNvPr id="3" name="Picture Placeholder 2"/>
-          <p:cNvPicPr>
-            <a:picLocks noGrp="1" noChangeAspect="1"/>
-          </p:cNvPicPr>
-          <p:nvPr>
-            <p:ph type="pic" sz="quarter" idx="12"/>
-          </p:nvPr>
-        </p:nvPicPr>
-        <p:blipFill>
-          <a:blip r:embed="rId3"/>
-          <a:srcRect t="3112" b="3112"/>
-          <a:stretch>
-            <a:fillRect/>
-          </a:stretch>
-        </p:blipFill>
-        <p:spPr/>
-      </p:pic>
-      <p:pic>
-        <p:nvPicPr>
           <p:cNvPr id="4" name="Picture 3" descr="cid:image003.png@01D31CC6.A08B1C50">
             <a:extLst>
               <a:ext uri="{FF2B5EF4-FFF2-40B4-BE49-F238E27FC236}">
@@ -14788,7 +14767,7 @@
           <p:nvPr/>
         </p:nvPicPr>
         <p:blipFill>
-          <a:blip r:embed="rId4">
+          <a:blip r:embed="rId3">
             <a:extLst>
               <a:ext uri="{28A0092B-C50C-407E-A947-70E740481C1C}">
                 <a14:useLocalDpi xmlns:a14="http://schemas.microsoft.com/office/drawing/2010/main" val="0"/>
@@ -14831,6 +14810,36 @@
               </a14:hiddenLine>
             </a:ext>
           </a:extLst>
+        </p:spPr>
+      </p:pic>
+      <p:pic>
+        <p:nvPicPr>
+          <p:cNvPr id="8" name="Illustration" descr="Example of an illustration" title="Illustration for title slide">
+            <a:extLst>
+              <a:ext uri="{FF2B5EF4-FFF2-40B4-BE49-F238E27FC236}">
+                <a16:creationId xmlns:a16="http://schemas.microsoft.com/office/drawing/2014/main" id="{B362110C-4DD5-47C8-8FF0-FA1FFDF42CBA}"/>
+              </a:ext>
+            </a:extLst>
+          </p:cNvPr>
+          <p:cNvPicPr>
+            <a:picLocks noGrp="1" noChangeAspect="1"/>
+          </p:cNvPicPr>
+          <p:nvPr>
+            <p:ph type="pic" sz="quarter" idx="12"/>
+          </p:nvPr>
+        </p:nvPicPr>
+        <p:blipFill>
+          <a:blip r:embed="rId4"/>
+          <a:srcRect t="3112" b="3112"/>
+          <a:stretch>
+            <a:fillRect/>
+          </a:stretch>
+        </p:blipFill>
+        <p:spPr bwMode="gray">
+          <a:xfrm>
+            <a:off x="1" y="0"/>
+            <a:ext cx="12195174" cy="3430006"/>
+          </a:xfrm>
         </p:spPr>
       </p:pic>
     </p:spTree>
@@ -16039,8 +16048,8 @@
           </a:prstGeom>
           <a:solidFill>
             <a:schemeClr val="accent1">
-              <a:lumMod val="60000"/>
-              <a:lumOff val="40000"/>
+              <a:lumMod val="40000"/>
+              <a:lumOff val="60000"/>
             </a:schemeClr>
           </a:solidFill>
           <a:ln>
@@ -16483,8 +16492,8 @@
           </a:prstGeom>
           <a:solidFill>
             <a:schemeClr val="accent1">
-              <a:lumMod val="60000"/>
-              <a:lumOff val="40000"/>
+              <a:lumMod val="40000"/>
+              <a:lumOff val="60000"/>
             </a:schemeClr>
           </a:solidFill>
           <a:ln>
@@ -16885,8 +16894,8 @@
             </a:prstGeom>
             <a:solidFill>
               <a:schemeClr val="accent1">
-                <a:lumMod val="60000"/>
-                <a:lumOff val="40000"/>
+                <a:lumMod val="40000"/>
+                <a:lumOff val="60000"/>
               </a:schemeClr>
             </a:solidFill>
             <a:ln>
@@ -17230,8 +17239,8 @@
             </a:prstGeom>
             <a:solidFill>
               <a:schemeClr val="accent1">
-                <a:lumMod val="60000"/>
-                <a:lumOff val="40000"/>
+                <a:lumMod val="40000"/>
+                <a:lumOff val="60000"/>
               </a:schemeClr>
             </a:solidFill>
             <a:ln>
@@ -17571,8 +17580,8 @@
             </a:prstGeom>
             <a:solidFill>
               <a:schemeClr val="accent1">
-                <a:lumMod val="60000"/>
-                <a:lumOff val="40000"/>
+                <a:lumMod val="40000"/>
+                <a:lumOff val="60000"/>
               </a:schemeClr>
             </a:solidFill>
             <a:ln>
@@ -17889,6 +17898,9 @@
               <a:gd name="adj2" fmla="val -18124"/>
             </a:avLst>
           </a:prstGeom>
+          <a:solidFill>
+            <a:schemeClr val="bg1"/>
+          </a:solidFill>
           <a:ln>
             <a:headEnd/>
             <a:tailEnd/>
@@ -17971,6 +17983,9 @@
               <a:gd name="adj2" fmla="val -18124"/>
             </a:avLst>
           </a:prstGeom>
+          <a:solidFill>
+            <a:schemeClr val="bg1"/>
+          </a:solidFill>
           <a:ln>
             <a:headEnd/>
             <a:tailEnd/>
@@ -18075,6 +18090,9 @@
               <a:gd name="adj2" fmla="val -18124"/>
             </a:avLst>
           </a:prstGeom>
+          <a:solidFill>
+            <a:schemeClr val="bg1"/>
+          </a:solidFill>
           <a:ln>
             <a:headEnd/>
             <a:tailEnd/>
@@ -18286,7 +18304,13 @@
       </p:sp>
       <p:pic>
         <p:nvPicPr>
-          <p:cNvPr id="6" name="Picture 5"/>
+          <p:cNvPr id="5" name="Picture 4">
+            <a:extLst>
+              <a:ext uri="{FF2B5EF4-FFF2-40B4-BE49-F238E27FC236}">
+                <a16:creationId xmlns:a16="http://schemas.microsoft.com/office/drawing/2014/main" id="{4AB17704-E39D-46CB-BEE7-FFC756CAC527}"/>
+              </a:ext>
+            </a:extLst>
+          </p:cNvPr>
           <p:cNvPicPr>
             <a:picLocks noChangeAspect="1"/>
           </p:cNvPicPr>
@@ -18300,12 +18324,17 @@
         </p:blipFill>
         <p:spPr>
           <a:xfrm>
-            <a:off x="7146599" y="1028700"/>
-            <a:ext cx="4375972" cy="4991475"/>
+            <a:off x="7622655" y="680850"/>
+            <a:ext cx="3380968" cy="5673150"/>
           </a:xfrm>
           <a:prstGeom prst="rect">
             <a:avLst/>
           </a:prstGeom>
+          <a:ln>
+            <a:solidFill>
+              <a:schemeClr val="tx1"/>
+            </a:solidFill>
+          </a:ln>
         </p:spPr>
       </p:pic>
     </p:spTree>
@@ -19936,10 +19965,10 @@
       </p:sp>
       <p:pic>
         <p:nvPicPr>
-          <p:cNvPr id="4" name="Picture 3">
+          <p:cNvPr id="5" name="Picture 4">
             <a:extLst>
               <a:ext uri="{FF2B5EF4-FFF2-40B4-BE49-F238E27FC236}">
-                <a16:creationId xmlns:a16="http://schemas.microsoft.com/office/drawing/2014/main" id="{BBBF5AFC-BB7A-49E4-A5D6-B4DFE49342CD}"/>
+                <a16:creationId xmlns:a16="http://schemas.microsoft.com/office/drawing/2014/main" id="{95D1CED9-14BE-466A-944F-C9B60E3B7FEC}"/>
               </a:ext>
             </a:extLst>
           </p:cNvPr>
@@ -19956,8 +19985,8 @@
         </p:blipFill>
         <p:spPr>
           <a:xfrm>
-            <a:off x="3849419" y="1181180"/>
-            <a:ext cx="4495640" cy="4495640"/>
+            <a:off x="3645157" y="976918"/>
+            <a:ext cx="4904163" cy="4904163"/>
           </a:xfrm>
           <a:prstGeom prst="rect">
             <a:avLst/>
@@ -21177,10 +21206,10 @@
       </p:sp>
       <p:pic>
         <p:nvPicPr>
-          <p:cNvPr id="7" name="Picture 6">
+          <p:cNvPr id="3" name="Picture 2">
             <a:extLst>
               <a:ext uri="{FF2B5EF4-FFF2-40B4-BE49-F238E27FC236}">
-                <a16:creationId xmlns:a16="http://schemas.microsoft.com/office/drawing/2014/main" id="{367A4D87-0666-44E5-8C96-AF3E0CB7BD37}"/>
+                <a16:creationId xmlns:a16="http://schemas.microsoft.com/office/drawing/2014/main" id="{A6E1FDAE-762B-44B5-8E07-45431B300399}"/>
               </a:ext>
             </a:extLst>
           </p:cNvPr>
@@ -21197,8 +21226,8 @@
         </p:blipFill>
         <p:spPr>
           <a:xfrm>
-            <a:off x="4076104" y="2228465"/>
-            <a:ext cx="4042966" cy="4042966"/>
+            <a:off x="4259082" y="2228465"/>
+            <a:ext cx="3677010" cy="3677010"/>
           </a:xfrm>
           <a:prstGeom prst="rect">
             <a:avLst/>
@@ -21265,10 +21294,10 @@
       </p:sp>
       <p:pic>
         <p:nvPicPr>
-          <p:cNvPr id="6" name="Picture 5">
+          <p:cNvPr id="4" name="Picture 3">
             <a:extLst>
               <a:ext uri="{FF2B5EF4-FFF2-40B4-BE49-F238E27FC236}">
-                <a16:creationId xmlns:a16="http://schemas.microsoft.com/office/drawing/2014/main" id="{6449D282-DC4E-4479-991B-68509FF3A710}"/>
+                <a16:creationId xmlns:a16="http://schemas.microsoft.com/office/drawing/2014/main" id="{007708F0-FA7C-4914-AEF1-2FD5F947DD7C}"/>
               </a:ext>
             </a:extLst>
           </p:cNvPr>
@@ -21285,8 +21314,8 @@
         </p:blipFill>
         <p:spPr>
           <a:xfrm>
-            <a:off x="4261672" y="1181180"/>
-            <a:ext cx="3773347" cy="3773347"/>
+            <a:off x="4011439" y="1343200"/>
+            <a:ext cx="4171599" cy="4171599"/>
           </a:xfrm>
           <a:prstGeom prst="rect">
             <a:avLst/>
@@ -25374,10 +25403,10 @@
       </p:sp>
       <p:pic>
         <p:nvPicPr>
-          <p:cNvPr id="6" name="Picture 5">
+          <p:cNvPr id="3" name="Picture 2">
             <a:extLst>
               <a:ext uri="{FF2B5EF4-FFF2-40B4-BE49-F238E27FC236}">
-                <a16:creationId xmlns:a16="http://schemas.microsoft.com/office/drawing/2014/main" id="{7945B63D-25A7-4D24-9CFC-9450019A143F}"/>
+                <a16:creationId xmlns:a16="http://schemas.microsoft.com/office/drawing/2014/main" id="{674D8C43-632A-4ACD-ABBA-576C0600B9C5}"/>
               </a:ext>
             </a:extLst>
           </p:cNvPr>
@@ -25394,8 +25423,8 @@
         </p:blipFill>
         <p:spPr>
           <a:xfrm>
-            <a:off x="4223549" y="2375910"/>
-            <a:ext cx="3748075" cy="3748075"/>
+            <a:off x="4191761" y="2355536"/>
+            <a:ext cx="3811652" cy="3811652"/>
           </a:xfrm>
           <a:prstGeom prst="rect">
             <a:avLst/>
@@ -25440,8 +25469,8 @@
         </p:nvSpPr>
         <p:spPr bwMode="gray">
           <a:xfrm>
-            <a:off x="7798503" y="1657349"/>
-            <a:ext cx="3703320" cy="3070860"/>
+            <a:off x="7449184" y="1832717"/>
+            <a:ext cx="4142483" cy="3070860"/>
           </a:xfrm>
           <a:prstGeom prst="rect">
             <a:avLst/>
@@ -25496,8 +25525,8 @@
         </p:nvSpPr>
         <p:spPr bwMode="gray">
           <a:xfrm>
-            <a:off x="7557392" y="2053590"/>
-            <a:ext cx="3703320" cy="3070860"/>
+            <a:off x="7208073" y="2053590"/>
+            <a:ext cx="4142483" cy="3070860"/>
           </a:xfrm>
           <a:prstGeom prst="rect">
             <a:avLst/>
@@ -25637,100 +25666,6 @@
               </a:rPr>
               <a:t>Master</a:t>
             </a:r>
-          </a:p>
-        </p:txBody>
-      </p:sp>
-      <p:sp>
-        <p:nvSpPr>
-          <p:cNvPr id="4" name="Rectangle 3"/>
-          <p:cNvSpPr/>
-          <p:nvPr/>
-        </p:nvSpPr>
-        <p:spPr bwMode="gray">
-          <a:xfrm>
-            <a:off x="1147891" y="3002280"/>
-            <a:ext cx="2415540" cy="845820"/>
-          </a:xfrm>
-          <a:prstGeom prst="rect">
-            <a:avLst/>
-          </a:prstGeom>
-          <a:ln>
-            <a:headEnd/>
-            <a:tailEnd/>
-          </a:ln>
-        </p:spPr>
-        <p:style>
-          <a:lnRef idx="2">
-            <a:schemeClr val="accent2">
-              <a:shade val="50000"/>
-            </a:schemeClr>
-          </a:lnRef>
-          <a:fillRef idx="1">
-            <a:schemeClr val="accent2"/>
-          </a:fillRef>
-          <a:effectRef idx="0">
-            <a:schemeClr val="accent2"/>
-          </a:effectRef>
-          <a:fontRef idx="minor">
-            <a:schemeClr val="lt1"/>
-          </a:fontRef>
-        </p:style>
-        <p:txBody>
-          <a:bodyPr lIns="90000" tIns="72000" rIns="90000" bIns="72000" rtlCol="0" anchor="ctr"/>
-          <a:lstStyle/>
-          <a:p>
-            <a:pPr marR="0" algn="ctr" defTabSz="914400" eaLnBrk="1" fontAlgn="base" latinLnBrk="0" hangingPunct="1">
-              <a:lnSpc>
-                <a:spcPct val="100000"/>
-              </a:lnSpc>
-              <a:spcBef>
-                <a:spcPct val="50000"/>
-              </a:spcBef>
-              <a:spcAft>
-                <a:spcPct val="0"/>
-              </a:spcAft>
-              <a:buClr>
-                <a:srgbClr val="F0AB00"/>
-              </a:buClr>
-              <a:buSzPct val="80000"/>
-              <a:tabLst/>
-            </a:pPr>
-            <a:r>
-              <a:rPr kumimoji="0" lang="de-DE" sz="1800" b="1" i="0" u="none" strike="noStrike" kern="0" cap="none" spc="0" normalizeH="0" baseline="0" noProof="0" dirty="0">
-                <a:ln>
-                  <a:noFill/>
-                </a:ln>
-                <a:effectLst/>
-                <a:uLnTx/>
-                <a:uFillTx/>
-                <a:ea typeface="Arial Unicode MS" pitchFamily="34" charset="-128"/>
-                <a:cs typeface="Arial Unicode MS" pitchFamily="34" charset="-128"/>
-              </a:rPr>
-              <a:t>API</a:t>
-            </a:r>
-            <a:r>
-              <a:rPr kumimoji="0" lang="de-DE" sz="1800" b="1" i="0" u="none" strike="noStrike" kern="0" cap="none" spc="0" normalizeH="0" noProof="0" dirty="0">
-                <a:ln>
-                  <a:noFill/>
-                </a:ln>
-                <a:effectLst/>
-                <a:uLnTx/>
-                <a:uFillTx/>
-                <a:ea typeface="Arial Unicode MS" pitchFamily="34" charset="-128"/>
-                <a:cs typeface="Arial Unicode MS" pitchFamily="34" charset="-128"/>
-              </a:rPr>
-              <a:t> Server</a:t>
-            </a:r>
-            <a:endParaRPr kumimoji="0" lang="de-DE" sz="1800" b="1" i="0" u="none" strike="noStrike" kern="0" cap="none" spc="0" normalizeH="0" baseline="0" noProof="0" dirty="0">
-              <a:ln>
-                <a:noFill/>
-              </a:ln>
-              <a:effectLst/>
-              <a:uLnTx/>
-              <a:uFillTx/>
-              <a:ea typeface="Arial Unicode MS" pitchFamily="34" charset="-128"/>
-              <a:cs typeface="Arial Unicode MS" pitchFamily="34" charset="-128"/>
-            </a:endParaRPr>
           </a:p>
         </p:txBody>
       </p:sp>
@@ -26374,8 +26309,8 @@
         </p:nvSpPr>
         <p:spPr bwMode="gray">
           <a:xfrm>
-            <a:off x="7316281" y="2560320"/>
-            <a:ext cx="3703320" cy="3070860"/>
+            <a:off x="6966962" y="2280863"/>
+            <a:ext cx="4142483" cy="3350317"/>
           </a:xfrm>
           <a:prstGeom prst="rect">
             <a:avLst/>
@@ -26433,8 +26368,8 @@
         </p:nvSpPr>
         <p:spPr bwMode="gray">
           <a:xfrm>
-            <a:off x="7445821" y="3805346"/>
-            <a:ext cx="3467358" cy="1653431"/>
+            <a:off x="7155812" y="3444087"/>
+            <a:ext cx="3757367" cy="2114703"/>
           </a:xfrm>
           <a:prstGeom prst="rect">
             <a:avLst/>
@@ -26468,7 +26403,7 @@
           <a:bodyPr lIns="90000" tIns="72000" rIns="90000" bIns="72000" rtlCol="0" anchor="b"/>
           <a:lstStyle/>
           <a:p>
-            <a:pPr marR="0" defTabSz="914400" eaLnBrk="1" fontAlgn="base" latinLnBrk="0" hangingPunct="1">
+            <a:pPr marR="0" algn="ctr" defTabSz="914400" eaLnBrk="1" fontAlgn="base" latinLnBrk="0" hangingPunct="1">
               <a:lnSpc>
                 <a:spcPct val="100000"/>
               </a:lnSpc>
@@ -26525,7 +26460,7 @@
         </p:nvSpPr>
         <p:spPr bwMode="gray">
           <a:xfrm>
-            <a:off x="7823552" y="3172886"/>
+            <a:off x="7484508" y="2782474"/>
             <a:ext cx="1237682" cy="434340"/>
           </a:xfrm>
           <a:prstGeom prst="rect">
@@ -26600,7 +26535,7 @@
         </p:nvSpPr>
         <p:spPr bwMode="gray">
           <a:xfrm>
-            <a:off x="7857403" y="4251482"/>
+            <a:off x="7518359" y="3840520"/>
             <a:ext cx="1208595" cy="773906"/>
           </a:xfrm>
           <a:prstGeom prst="rect">
@@ -26648,11 +26583,11 @@
               <a:tabLst/>
             </a:pPr>
             <a:r>
-              <a:rPr lang="de-DE" sz="1600" b="1" kern="0" noProof="0" dirty="0" err="1">
+              <a:rPr lang="de-DE" sz="1600" b="1" kern="0" noProof="0" dirty="0">
                 <a:ea typeface="Arial Unicode MS" pitchFamily="34" charset="-128"/>
                 <a:cs typeface="Arial Unicode MS" pitchFamily="34" charset="-128"/>
               </a:rPr>
-              <a:t>Pod</a:t>
+              <a:t>Container</a:t>
             </a:r>
             <a:endParaRPr kumimoji="0" lang="de-DE" sz="1600" b="1" i="0" u="none" strike="noStrike" kern="0" cap="none" spc="0" normalizeH="0" baseline="0" noProof="0" dirty="0">
               <a:ln>
@@ -26675,7 +26610,7 @@
         </p:nvSpPr>
         <p:spPr bwMode="gray">
           <a:xfrm>
-            <a:off x="9375019" y="4251482"/>
+            <a:off x="9375019" y="3840520"/>
             <a:ext cx="1208595" cy="773906"/>
           </a:xfrm>
           <a:prstGeom prst="rect">
@@ -26723,11 +26658,11 @@
               <a:tabLst/>
             </a:pPr>
             <a:r>
-              <a:rPr lang="de-DE" sz="1600" b="1" kern="0" noProof="0" dirty="0" err="1">
+              <a:rPr lang="de-DE" sz="1600" b="1" kern="0" noProof="0" dirty="0">
                 <a:ea typeface="Arial Unicode MS" pitchFamily="34" charset="-128"/>
                 <a:cs typeface="Arial Unicode MS" pitchFamily="34" charset="-128"/>
               </a:rPr>
-              <a:t>Pod</a:t>
+              <a:t>Container</a:t>
             </a:r>
             <a:endParaRPr kumimoji="0" lang="de-DE" sz="1600" b="1" i="0" u="none" strike="noStrike" kern="0" cap="none" spc="0" normalizeH="0" baseline="0" noProof="0" dirty="0">
               <a:ln>
@@ -26750,7 +26685,7 @@
         </p:nvSpPr>
         <p:spPr bwMode="gray">
           <a:xfrm>
-            <a:off x="9375019" y="3189077"/>
+            <a:off x="9360476" y="2788712"/>
             <a:ext cx="1237682" cy="434340"/>
           </a:xfrm>
           <a:prstGeom prst="rect">
@@ -26879,13 +26814,14 @@
           <p:cNvPr id="38" name="Straight Arrow Connector 37"/>
           <p:cNvCxnSpPr>
             <a:cxnSpLocks/>
+            <a:endCxn id="36" idx="0"/>
           </p:cNvCxnSpPr>
           <p:nvPr/>
         </p:nvCxnSpPr>
         <p:spPr>
-          <a:xfrm>
-            <a:off x="9993860" y="1319842"/>
-            <a:ext cx="0" cy="1869235"/>
+          <a:xfrm flipH="1">
+            <a:off x="9979317" y="1319842"/>
+            <a:ext cx="14544" cy="1468870"/>
           </a:xfrm>
           <a:prstGeom prst="straightConnector1">
             <a:avLst/>
@@ -26923,9 +26859,9 @@
           <p:nvPr/>
         </p:nvCxnSpPr>
         <p:spPr>
-          <a:xfrm flipH="1">
-            <a:off x="9979317" y="3623417"/>
-            <a:ext cx="14543" cy="628065"/>
+          <a:xfrm>
+            <a:off x="9979317" y="3223052"/>
+            <a:ext cx="0" cy="617468"/>
           </a:xfrm>
           <a:prstGeom prst="straightConnector1">
             <a:avLst/>
@@ -26964,8 +26900,8 @@
         </p:nvCxnSpPr>
         <p:spPr>
           <a:xfrm flipH="1">
-            <a:off x="8461701" y="3623417"/>
-            <a:ext cx="1532159" cy="628065"/>
+            <a:off x="8122657" y="3223052"/>
+            <a:ext cx="1856660" cy="617468"/>
           </a:xfrm>
           <a:prstGeom prst="straightConnector1">
             <a:avLst/>
@@ -27004,8 +26940,8 @@
         </p:nvCxnSpPr>
         <p:spPr>
           <a:xfrm>
-            <a:off x="8442393" y="3607226"/>
-            <a:ext cx="19308" cy="644256"/>
+            <a:off x="8103349" y="3216814"/>
+            <a:ext cx="19308" cy="623706"/>
           </a:xfrm>
           <a:prstGeom prst="straightConnector1">
             <a:avLst/>
@@ -27044,8 +26980,8 @@
         </p:nvCxnSpPr>
         <p:spPr>
           <a:xfrm>
-            <a:off x="8442393" y="3607226"/>
-            <a:ext cx="1536924" cy="644256"/>
+            <a:off x="8103349" y="3216814"/>
+            <a:ext cx="1875968" cy="623706"/>
           </a:xfrm>
           <a:prstGeom prst="straightConnector1">
             <a:avLst/>
@@ -27084,8 +27020,8 @@
         </p:nvCxnSpPr>
         <p:spPr>
           <a:xfrm flipH="1">
-            <a:off x="3563431" y="3390056"/>
-            <a:ext cx="4260121" cy="0"/>
+            <a:off x="3544584" y="2999644"/>
+            <a:ext cx="3939924" cy="20958"/>
           </a:xfrm>
           <a:prstGeom prst="straightConnector1">
             <a:avLst/>
@@ -27094,8 +27030,8 @@
             <a:solidFill>
               <a:schemeClr val="accent2"/>
             </a:solidFill>
-            <a:headEnd type="none" w="med" len="med"/>
-            <a:tailEnd type="triangle"/>
+            <a:headEnd type="triangle" w="med" len="med"/>
+            <a:tailEnd type="triangle" w="med" len="med"/>
           </a:ln>
         </p:spPr>
         <p:style>
@@ -27113,6 +27049,234 @@
           </a:fontRef>
         </p:style>
       </p:cxnSp>
+      <p:sp>
+        <p:nvSpPr>
+          <p:cNvPr id="2" name="Rectangle: Rounded Corners 1">
+            <a:extLst>
+              <a:ext uri="{FF2B5EF4-FFF2-40B4-BE49-F238E27FC236}">
+                <a16:creationId xmlns:a16="http://schemas.microsoft.com/office/drawing/2014/main" id="{2A37C6D0-F857-43F3-9FFE-BF75EF04DD52}"/>
+              </a:ext>
+            </a:extLst>
+          </p:cNvPr>
+          <p:cNvSpPr/>
+          <p:nvPr/>
+        </p:nvSpPr>
+        <p:spPr bwMode="gray">
+          <a:xfrm>
+            <a:off x="7421347" y="3639487"/>
+            <a:ext cx="1402246" cy="1403553"/>
+          </a:xfrm>
+          <a:prstGeom prst="roundRect">
+            <a:avLst/>
+          </a:prstGeom>
+          <a:noFill/>
+          <a:ln w="19050" algn="ctr">
+            <a:solidFill>
+              <a:schemeClr val="tx1"/>
+            </a:solidFill>
+            <a:prstDash val="dash"/>
+            <a:miter lim="800000"/>
+            <a:headEnd/>
+            <a:tailEnd/>
+          </a:ln>
+        </p:spPr>
+        <p:txBody>
+          <a:bodyPr lIns="90000" tIns="72000" rIns="90000" bIns="72000" rtlCol="0" anchor="b"/>
+          <a:lstStyle/>
+          <a:p>
+            <a:pPr marR="0" algn="ctr" defTabSz="914400" eaLnBrk="1" fontAlgn="base" latinLnBrk="0" hangingPunct="1">
+              <a:lnSpc>
+                <a:spcPct val="100000"/>
+              </a:lnSpc>
+              <a:spcBef>
+                <a:spcPct val="50000"/>
+              </a:spcBef>
+              <a:spcAft>
+                <a:spcPct val="0"/>
+              </a:spcAft>
+              <a:buClr>
+                <a:srgbClr val="F0AB00"/>
+              </a:buClr>
+              <a:buSzPct val="80000"/>
+              <a:tabLst/>
+            </a:pPr>
+            <a:r>
+              <a:rPr kumimoji="0" lang="en-US" sz="1800" b="0" i="0" u="none" strike="noStrike" kern="0" cap="none" spc="0" normalizeH="0" baseline="0" noProof="0" dirty="0">
+                <a:ln>
+                  <a:noFill/>
+                </a:ln>
+                <a:effectLst/>
+                <a:uLnTx/>
+                <a:uFillTx/>
+                <a:ea typeface="Arial Unicode MS" pitchFamily="34" charset="-128"/>
+                <a:cs typeface="Arial Unicode MS" pitchFamily="34" charset="-128"/>
+              </a:rPr>
+              <a:t>Pod</a:t>
+            </a:r>
+          </a:p>
+        </p:txBody>
+      </p:sp>
+      <p:sp>
+        <p:nvSpPr>
+          <p:cNvPr id="4" name="Rectangle 3"/>
+          <p:cNvSpPr/>
+          <p:nvPr/>
+        </p:nvSpPr>
+        <p:spPr bwMode="gray">
+          <a:xfrm>
+            <a:off x="1147891" y="2981732"/>
+            <a:ext cx="2415540" cy="845820"/>
+          </a:xfrm>
+          <a:prstGeom prst="rect">
+            <a:avLst/>
+          </a:prstGeom>
+          <a:ln>
+            <a:headEnd/>
+            <a:tailEnd/>
+          </a:ln>
+        </p:spPr>
+        <p:style>
+          <a:lnRef idx="2">
+            <a:schemeClr val="accent2">
+              <a:shade val="50000"/>
+            </a:schemeClr>
+          </a:lnRef>
+          <a:fillRef idx="1">
+            <a:schemeClr val="accent2"/>
+          </a:fillRef>
+          <a:effectRef idx="0">
+            <a:schemeClr val="accent2"/>
+          </a:effectRef>
+          <a:fontRef idx="minor">
+            <a:schemeClr val="lt1"/>
+          </a:fontRef>
+        </p:style>
+        <p:txBody>
+          <a:bodyPr lIns="90000" tIns="72000" rIns="90000" bIns="72000" rtlCol="0" anchor="ctr"/>
+          <a:lstStyle/>
+          <a:p>
+            <a:pPr marR="0" algn="ctr" defTabSz="914400" eaLnBrk="1" fontAlgn="base" latinLnBrk="0" hangingPunct="1">
+              <a:lnSpc>
+                <a:spcPct val="100000"/>
+              </a:lnSpc>
+              <a:spcBef>
+                <a:spcPct val="50000"/>
+              </a:spcBef>
+              <a:spcAft>
+                <a:spcPct val="0"/>
+              </a:spcAft>
+              <a:buClr>
+                <a:srgbClr val="F0AB00"/>
+              </a:buClr>
+              <a:buSzPct val="80000"/>
+              <a:tabLst/>
+            </a:pPr>
+            <a:r>
+              <a:rPr kumimoji="0" lang="de-DE" sz="1800" b="1" i="0" u="none" strike="noStrike" kern="0" cap="none" spc="0" normalizeH="0" baseline="0" noProof="0" dirty="0">
+                <a:ln>
+                  <a:noFill/>
+                </a:ln>
+                <a:effectLst/>
+                <a:uLnTx/>
+                <a:uFillTx/>
+                <a:ea typeface="Arial Unicode MS" pitchFamily="34" charset="-128"/>
+                <a:cs typeface="Arial Unicode MS" pitchFamily="34" charset="-128"/>
+              </a:rPr>
+              <a:t>API</a:t>
+            </a:r>
+            <a:r>
+              <a:rPr kumimoji="0" lang="de-DE" sz="1800" b="1" i="0" u="none" strike="noStrike" kern="0" cap="none" spc="0" normalizeH="0" noProof="0" dirty="0">
+                <a:ln>
+                  <a:noFill/>
+                </a:ln>
+                <a:effectLst/>
+                <a:uLnTx/>
+                <a:uFillTx/>
+                <a:ea typeface="Arial Unicode MS" pitchFamily="34" charset="-128"/>
+                <a:cs typeface="Arial Unicode MS" pitchFamily="34" charset="-128"/>
+              </a:rPr>
+              <a:t> Server</a:t>
+            </a:r>
+            <a:endParaRPr kumimoji="0" lang="de-DE" sz="1800" b="1" i="0" u="none" strike="noStrike" kern="0" cap="none" spc="0" normalizeH="0" baseline="0" noProof="0" dirty="0">
+              <a:ln>
+                <a:noFill/>
+              </a:ln>
+              <a:effectLst/>
+              <a:uLnTx/>
+              <a:uFillTx/>
+              <a:ea typeface="Arial Unicode MS" pitchFamily="34" charset="-128"/>
+              <a:cs typeface="Arial Unicode MS" pitchFamily="34" charset="-128"/>
+            </a:endParaRPr>
+          </a:p>
+        </p:txBody>
+      </p:sp>
+      <p:sp>
+        <p:nvSpPr>
+          <p:cNvPr id="45" name="Rectangle: Rounded Corners 44">
+            <a:extLst>
+              <a:ext uri="{FF2B5EF4-FFF2-40B4-BE49-F238E27FC236}">
+                <a16:creationId xmlns:a16="http://schemas.microsoft.com/office/drawing/2014/main" id="{6A1B9FB8-E0C7-4972-AB85-18F2C06E6708}"/>
+              </a:ext>
+            </a:extLst>
+          </p:cNvPr>
+          <p:cNvSpPr/>
+          <p:nvPr/>
+        </p:nvSpPr>
+        <p:spPr bwMode="gray">
+          <a:xfrm>
+            <a:off x="9292738" y="3636368"/>
+            <a:ext cx="1402246" cy="1403553"/>
+          </a:xfrm>
+          <a:prstGeom prst="roundRect">
+            <a:avLst/>
+          </a:prstGeom>
+          <a:noFill/>
+          <a:ln w="19050" algn="ctr">
+            <a:solidFill>
+              <a:schemeClr val="tx1"/>
+            </a:solidFill>
+            <a:prstDash val="dash"/>
+            <a:miter lim="800000"/>
+            <a:headEnd/>
+            <a:tailEnd/>
+          </a:ln>
+        </p:spPr>
+        <p:txBody>
+          <a:bodyPr lIns="90000" tIns="72000" rIns="90000" bIns="72000" rtlCol="0" anchor="b"/>
+          <a:lstStyle/>
+          <a:p>
+            <a:pPr marR="0" algn="ctr" defTabSz="914400" eaLnBrk="1" fontAlgn="base" latinLnBrk="0" hangingPunct="1">
+              <a:lnSpc>
+                <a:spcPct val="100000"/>
+              </a:lnSpc>
+              <a:spcBef>
+                <a:spcPct val="50000"/>
+              </a:spcBef>
+              <a:spcAft>
+                <a:spcPct val="0"/>
+              </a:spcAft>
+              <a:buClr>
+                <a:srgbClr val="F0AB00"/>
+              </a:buClr>
+              <a:buSzPct val="80000"/>
+              <a:tabLst/>
+            </a:pPr>
+            <a:r>
+              <a:rPr kumimoji="0" lang="en-US" sz="1800" b="0" i="0" u="none" strike="noStrike" kern="0" cap="none" spc="0" normalizeH="0" baseline="0" noProof="0" dirty="0">
+                <a:ln>
+                  <a:noFill/>
+                </a:ln>
+                <a:effectLst/>
+                <a:uLnTx/>
+                <a:uFillTx/>
+                <a:ea typeface="Arial Unicode MS" pitchFamily="34" charset="-128"/>
+                <a:cs typeface="Arial Unicode MS" pitchFamily="34" charset="-128"/>
+              </a:rPr>
+              <a:t>Pod</a:t>
+            </a:r>
+          </a:p>
+        </p:txBody>
+      </p:sp>
     </p:spTree>
     <p:extLst>
       <p:ext uri="{BB962C8B-B14F-4D97-AF65-F5344CB8AC3E}">
@@ -27740,7 +27904,7 @@
         </p:nvSpPr>
         <p:spPr bwMode="gray">
           <a:xfrm>
-            <a:off x="1147891" y="3002280"/>
+            <a:off x="1147891" y="2950910"/>
             <a:ext cx="2415540" cy="845820"/>
           </a:xfrm>
           <a:prstGeom prst="rect">
@@ -28523,11 +28687,11 @@
               <a:tabLst/>
             </a:pPr>
             <a:r>
-              <a:rPr lang="de-DE" sz="1600" b="1" kern="0" noProof="0" dirty="0" err="1">
+              <a:rPr lang="de-DE" sz="1600" b="1" kern="0" noProof="0" dirty="0">
                 <a:ea typeface="Arial Unicode MS" pitchFamily="34" charset="-128"/>
                 <a:cs typeface="Arial Unicode MS" pitchFamily="34" charset="-128"/>
               </a:rPr>
-              <a:t>Pod</a:t>
+              <a:t>Container</a:t>
             </a:r>
             <a:endParaRPr kumimoji="0" lang="de-DE" sz="1600" b="1" i="0" u="none" strike="noStrike" kern="0" cap="none" spc="0" normalizeH="0" baseline="0" noProof="0" dirty="0">
               <a:ln>
@@ -28598,11 +28762,11 @@
               <a:tabLst/>
             </a:pPr>
             <a:r>
-              <a:rPr lang="de-DE" sz="1600" b="1" kern="0" noProof="0" dirty="0" err="1">
+              <a:rPr lang="de-DE" sz="1600" b="1" kern="0" noProof="0" dirty="0">
                 <a:ea typeface="Arial Unicode MS" pitchFamily="34" charset="-128"/>
                 <a:cs typeface="Arial Unicode MS" pitchFamily="34" charset="-128"/>
               </a:rPr>
-              <a:t>Pod</a:t>
+              <a:t>Container</a:t>
             </a:r>
             <a:endParaRPr kumimoji="0" lang="de-DE" sz="1600" b="1" i="0" u="none" strike="noStrike" kern="0" cap="none" spc="0" normalizeH="0" baseline="0" noProof="0" dirty="0">
               <a:ln>
@@ -28891,47 +29055,6 @@
           </a:fontRef>
         </p:style>
       </p:cxnSp>
-      <p:cxnSp>
-        <p:nvCxnSpPr>
-          <p:cNvPr id="25" name="Straight Arrow Connector 24"/>
-          <p:cNvCxnSpPr>
-            <a:cxnSpLocks/>
-            <a:stCxn id="4" idx="3"/>
-            <a:endCxn id="32" idx="1"/>
-          </p:cNvCxnSpPr>
-          <p:nvPr/>
-        </p:nvCxnSpPr>
-        <p:spPr>
-          <a:xfrm flipV="1">
-            <a:off x="3563431" y="3390056"/>
-            <a:ext cx="4260121" cy="35134"/>
-          </a:xfrm>
-          <a:prstGeom prst="straightConnector1">
-            <a:avLst/>
-          </a:prstGeom>
-          <a:ln w="57150">
-            <a:solidFill>
-              <a:schemeClr val="accent1"/>
-            </a:solidFill>
-            <a:headEnd type="triangle"/>
-            <a:tailEnd type="triangle"/>
-          </a:ln>
-        </p:spPr>
-        <p:style>
-          <a:lnRef idx="1">
-            <a:schemeClr val="accent1"/>
-          </a:lnRef>
-          <a:fillRef idx="0">
-            <a:schemeClr val="accent1"/>
-          </a:fillRef>
-          <a:effectRef idx="0">
-            <a:schemeClr val="accent1"/>
-          </a:effectRef>
-          <a:fontRef idx="minor">
-            <a:schemeClr val="tx1"/>
-          </a:fontRef>
-        </p:style>
-      </p:cxnSp>
       <p:sp>
         <p:nvSpPr>
           <p:cNvPr id="26" name="Rectangle 25">
@@ -29098,7 +29221,7 @@
         </p:nvCxnSpPr>
         <p:spPr>
           <a:xfrm>
-            <a:off x="3563431" y="3425190"/>
+            <a:off x="3563431" y="3373820"/>
             <a:ext cx="532163" cy="666976"/>
           </a:xfrm>
           <a:prstGeom prst="straightConnector1">
@@ -29121,6 +29244,759 @@
           </a:fillRef>
           <a:effectRef idx="0">
             <a:schemeClr val="accent2"/>
+          </a:effectRef>
+          <a:fontRef idx="minor">
+            <a:schemeClr val="tx1"/>
+          </a:fontRef>
+        </p:style>
+      </p:cxnSp>
+      <p:sp>
+        <p:nvSpPr>
+          <p:cNvPr id="33" name="Rectangle 32">
+            <a:extLst>
+              <a:ext uri="{FF2B5EF4-FFF2-40B4-BE49-F238E27FC236}">
+                <a16:creationId xmlns:a16="http://schemas.microsoft.com/office/drawing/2014/main" id="{87CF6B3A-EC01-4B8F-BF08-4EA147BCB724}"/>
+              </a:ext>
+            </a:extLst>
+          </p:cNvPr>
+          <p:cNvSpPr/>
+          <p:nvPr/>
+        </p:nvSpPr>
+        <p:spPr bwMode="gray">
+          <a:xfrm>
+            <a:off x="6966962" y="2280863"/>
+            <a:ext cx="4142483" cy="3350317"/>
+          </a:xfrm>
+          <a:prstGeom prst="rect">
+            <a:avLst/>
+          </a:prstGeom>
+          <a:ln>
+            <a:headEnd/>
+            <a:tailEnd/>
+          </a:ln>
+        </p:spPr>
+        <p:style>
+          <a:lnRef idx="1">
+            <a:schemeClr val="accent2"/>
+          </a:lnRef>
+          <a:fillRef idx="2">
+            <a:schemeClr val="accent2"/>
+          </a:fillRef>
+          <a:effectRef idx="1">
+            <a:schemeClr val="accent2"/>
+          </a:effectRef>
+          <a:fontRef idx="minor">
+            <a:schemeClr val="dk1"/>
+          </a:fontRef>
+        </p:style>
+        <p:txBody>
+          <a:bodyPr lIns="90000" tIns="72000" rIns="90000" bIns="72000" rtlCol="0" anchor="t"/>
+          <a:lstStyle/>
+          <a:p>
+            <a:pPr algn="ctr" defTabSz="914400" fontAlgn="base">
+              <a:spcBef>
+                <a:spcPct val="50000"/>
+              </a:spcBef>
+              <a:spcAft>
+                <a:spcPct val="0"/>
+              </a:spcAft>
+              <a:buClr>
+                <a:srgbClr val="F0AB00"/>
+              </a:buClr>
+              <a:buSzPct val="80000"/>
+            </a:pPr>
+            <a:r>
+              <a:rPr lang="de-DE" sz="2400" b="1" kern="0" dirty="0">
+                <a:ea typeface="Arial Unicode MS" pitchFamily="34" charset="-128"/>
+                <a:cs typeface="Arial Unicode MS" pitchFamily="34" charset="-128"/>
+              </a:rPr>
+              <a:t>Nodes</a:t>
+            </a:r>
+          </a:p>
+        </p:txBody>
+      </p:sp>
+      <p:sp>
+        <p:nvSpPr>
+          <p:cNvPr id="37" name="Rectangle 36">
+            <a:extLst>
+              <a:ext uri="{FF2B5EF4-FFF2-40B4-BE49-F238E27FC236}">
+                <a16:creationId xmlns:a16="http://schemas.microsoft.com/office/drawing/2014/main" id="{DF9A87C0-2943-4372-A5D2-4C300C83D39D}"/>
+              </a:ext>
+            </a:extLst>
+          </p:cNvPr>
+          <p:cNvSpPr/>
+          <p:nvPr/>
+        </p:nvSpPr>
+        <p:spPr bwMode="gray">
+          <a:xfrm>
+            <a:off x="7155812" y="3444087"/>
+            <a:ext cx="3757367" cy="2114703"/>
+          </a:xfrm>
+          <a:prstGeom prst="rect">
+            <a:avLst/>
+          </a:prstGeom>
+          <a:solidFill>
+            <a:schemeClr val="accent1">
+              <a:lumMod val="60000"/>
+              <a:lumOff val="40000"/>
+            </a:schemeClr>
+          </a:solidFill>
+          <a:ln>
+            <a:headEnd/>
+            <a:tailEnd/>
+          </a:ln>
+        </p:spPr>
+        <p:style>
+          <a:lnRef idx="1">
+            <a:schemeClr val="accent1"/>
+          </a:lnRef>
+          <a:fillRef idx="2">
+            <a:schemeClr val="accent1"/>
+          </a:fillRef>
+          <a:effectRef idx="1">
+            <a:schemeClr val="accent1"/>
+          </a:effectRef>
+          <a:fontRef idx="minor">
+            <a:schemeClr val="dk1"/>
+          </a:fontRef>
+        </p:style>
+        <p:txBody>
+          <a:bodyPr lIns="90000" tIns="72000" rIns="90000" bIns="72000" rtlCol="0" anchor="b"/>
+          <a:lstStyle/>
+          <a:p>
+            <a:pPr marR="0" algn="ctr" defTabSz="914400" eaLnBrk="1" fontAlgn="base" latinLnBrk="0" hangingPunct="1">
+              <a:lnSpc>
+                <a:spcPct val="100000"/>
+              </a:lnSpc>
+              <a:spcBef>
+                <a:spcPct val="50000"/>
+              </a:spcBef>
+              <a:spcAft>
+                <a:spcPct val="0"/>
+              </a:spcAft>
+              <a:buClr>
+                <a:srgbClr val="F0AB00"/>
+              </a:buClr>
+              <a:buSzPct val="80000"/>
+              <a:tabLst/>
+            </a:pPr>
+            <a:r>
+              <a:rPr lang="de-DE" sz="2000" b="1" kern="0" noProof="0" dirty="0">
+                <a:ea typeface="Arial Unicode MS" pitchFamily="34" charset="-128"/>
+                <a:cs typeface="Arial Unicode MS" pitchFamily="34" charset="-128"/>
+              </a:rPr>
+              <a:t>D</a:t>
+            </a:r>
+            <a:r>
+              <a:rPr kumimoji="0" lang="de-DE" sz="2000" b="1" i="0" strike="noStrike" kern="0" cap="none" spc="0" normalizeH="0" baseline="0" noProof="0" dirty="0">
+                <a:ln>
+                  <a:noFill/>
+                </a:ln>
+                <a:effectLst/>
+                <a:uLnTx/>
+                <a:uFillTx/>
+                <a:ea typeface="Arial Unicode MS" pitchFamily="34" charset="-128"/>
+                <a:cs typeface="Arial Unicode MS" pitchFamily="34" charset="-128"/>
+              </a:rPr>
+              <a:t>ocker</a:t>
+            </a:r>
+            <a:endParaRPr kumimoji="0" lang="de-DE" sz="2400" b="1" i="0" strike="noStrike" kern="0" cap="none" spc="0" normalizeH="0" baseline="0" noProof="0" dirty="0">
+              <a:ln>
+                <a:noFill/>
+              </a:ln>
+              <a:effectLst/>
+              <a:uLnTx/>
+              <a:uFillTx/>
+              <a:ea typeface="Arial Unicode MS" pitchFamily="34" charset="-128"/>
+              <a:cs typeface="Arial Unicode MS" pitchFamily="34" charset="-128"/>
+            </a:endParaRPr>
+          </a:p>
+        </p:txBody>
+      </p:sp>
+      <p:sp>
+        <p:nvSpPr>
+          <p:cNvPr id="38" name="Rectangle 37">
+            <a:extLst>
+              <a:ext uri="{FF2B5EF4-FFF2-40B4-BE49-F238E27FC236}">
+                <a16:creationId xmlns:a16="http://schemas.microsoft.com/office/drawing/2014/main" id="{51359FDF-4DC2-46E3-A282-F78B91475E8E}"/>
+              </a:ext>
+            </a:extLst>
+          </p:cNvPr>
+          <p:cNvSpPr/>
+          <p:nvPr/>
+        </p:nvSpPr>
+        <p:spPr bwMode="gray">
+          <a:xfrm>
+            <a:off x="7484508" y="2782474"/>
+            <a:ext cx="1237682" cy="434340"/>
+          </a:xfrm>
+          <a:prstGeom prst="rect">
+            <a:avLst/>
+          </a:prstGeom>
+          <a:ln>
+            <a:headEnd/>
+            <a:tailEnd/>
+          </a:ln>
+        </p:spPr>
+        <p:style>
+          <a:lnRef idx="2">
+            <a:schemeClr val="accent2">
+              <a:shade val="50000"/>
+            </a:schemeClr>
+          </a:lnRef>
+          <a:fillRef idx="1">
+            <a:schemeClr val="accent2"/>
+          </a:fillRef>
+          <a:effectRef idx="0">
+            <a:schemeClr val="accent2"/>
+          </a:effectRef>
+          <a:fontRef idx="minor">
+            <a:schemeClr val="lt1"/>
+          </a:fontRef>
+        </p:style>
+        <p:txBody>
+          <a:bodyPr lIns="90000" tIns="72000" rIns="90000" bIns="72000" rtlCol="0" anchor="ctr"/>
+          <a:lstStyle/>
+          <a:p>
+            <a:pPr marR="0" algn="ctr" defTabSz="914400" eaLnBrk="1" fontAlgn="base" latinLnBrk="0" hangingPunct="1">
+              <a:lnSpc>
+                <a:spcPct val="100000"/>
+              </a:lnSpc>
+              <a:spcBef>
+                <a:spcPct val="50000"/>
+              </a:spcBef>
+              <a:spcAft>
+                <a:spcPct val="0"/>
+              </a:spcAft>
+              <a:buClr>
+                <a:srgbClr val="F0AB00"/>
+              </a:buClr>
+              <a:buSzPct val="80000"/>
+              <a:tabLst/>
+            </a:pPr>
+            <a:r>
+              <a:rPr lang="de-DE" sz="1600" kern="0" dirty="0" err="1">
+                <a:ea typeface="Arial Unicode MS" pitchFamily="34" charset="-128"/>
+                <a:cs typeface="Arial Unicode MS" pitchFamily="34" charset="-128"/>
+              </a:rPr>
+              <a:t>kubelet</a:t>
+            </a:r>
+            <a:endParaRPr kumimoji="0" lang="de-DE" sz="1600" i="0" u="none" strike="noStrike" kern="0" cap="none" spc="0" normalizeH="0" baseline="0" noProof="0" dirty="0">
+              <a:ln>
+                <a:noFill/>
+              </a:ln>
+              <a:effectLst/>
+              <a:uLnTx/>
+              <a:uFillTx/>
+              <a:ea typeface="Arial Unicode MS" pitchFamily="34" charset="-128"/>
+              <a:cs typeface="Arial Unicode MS" pitchFamily="34" charset="-128"/>
+            </a:endParaRPr>
+          </a:p>
+        </p:txBody>
+      </p:sp>
+      <p:sp>
+        <p:nvSpPr>
+          <p:cNvPr id="39" name="Rectangle 38">
+            <a:extLst>
+              <a:ext uri="{FF2B5EF4-FFF2-40B4-BE49-F238E27FC236}">
+                <a16:creationId xmlns:a16="http://schemas.microsoft.com/office/drawing/2014/main" id="{1C887E78-8D2B-41DD-A394-D0B85AEAE0EB}"/>
+              </a:ext>
+            </a:extLst>
+          </p:cNvPr>
+          <p:cNvSpPr/>
+          <p:nvPr/>
+        </p:nvSpPr>
+        <p:spPr bwMode="gray">
+          <a:xfrm>
+            <a:off x="7518359" y="3840520"/>
+            <a:ext cx="1208595" cy="773906"/>
+          </a:xfrm>
+          <a:prstGeom prst="rect">
+            <a:avLst/>
+          </a:prstGeom>
+          <a:ln>
+            <a:headEnd/>
+            <a:tailEnd/>
+          </a:ln>
+        </p:spPr>
+        <p:style>
+          <a:lnRef idx="2">
+            <a:schemeClr val="accent2">
+              <a:shade val="50000"/>
+            </a:schemeClr>
+          </a:lnRef>
+          <a:fillRef idx="1">
+            <a:schemeClr val="accent2"/>
+          </a:fillRef>
+          <a:effectRef idx="0">
+            <a:schemeClr val="accent2"/>
+          </a:effectRef>
+          <a:fontRef idx="minor">
+            <a:schemeClr val="lt1"/>
+          </a:fontRef>
+        </p:style>
+        <p:txBody>
+          <a:bodyPr lIns="90000" tIns="72000" rIns="90000" bIns="72000" rtlCol="0" anchor="ctr"/>
+          <a:lstStyle/>
+          <a:p>
+            <a:pPr marR="0" algn="ctr" defTabSz="914400" eaLnBrk="1" fontAlgn="base" latinLnBrk="0" hangingPunct="1">
+              <a:lnSpc>
+                <a:spcPct val="100000"/>
+              </a:lnSpc>
+              <a:spcBef>
+                <a:spcPct val="50000"/>
+              </a:spcBef>
+              <a:spcAft>
+                <a:spcPct val="0"/>
+              </a:spcAft>
+              <a:buClr>
+                <a:srgbClr val="F0AB00"/>
+              </a:buClr>
+              <a:buSzPct val="80000"/>
+              <a:tabLst/>
+            </a:pPr>
+            <a:r>
+              <a:rPr lang="de-DE" sz="1600" b="1" kern="0" noProof="0" dirty="0">
+                <a:ea typeface="Arial Unicode MS" pitchFamily="34" charset="-128"/>
+                <a:cs typeface="Arial Unicode MS" pitchFamily="34" charset="-128"/>
+              </a:rPr>
+              <a:t>Container</a:t>
+            </a:r>
+            <a:endParaRPr kumimoji="0" lang="de-DE" sz="1600" b="1" i="0" u="none" strike="noStrike" kern="0" cap="none" spc="0" normalizeH="0" baseline="0" noProof="0" dirty="0">
+              <a:ln>
+                <a:noFill/>
+              </a:ln>
+              <a:effectLst/>
+              <a:uLnTx/>
+              <a:uFillTx/>
+              <a:ea typeface="Arial Unicode MS" pitchFamily="34" charset="-128"/>
+              <a:cs typeface="Arial Unicode MS" pitchFamily="34" charset="-128"/>
+            </a:endParaRPr>
+          </a:p>
+        </p:txBody>
+      </p:sp>
+      <p:sp>
+        <p:nvSpPr>
+          <p:cNvPr id="40" name="Rectangle 39">
+            <a:extLst>
+              <a:ext uri="{FF2B5EF4-FFF2-40B4-BE49-F238E27FC236}">
+                <a16:creationId xmlns:a16="http://schemas.microsoft.com/office/drawing/2014/main" id="{6B8FC342-06C9-45FE-B51F-1D6F3BAC05C9}"/>
+              </a:ext>
+            </a:extLst>
+          </p:cNvPr>
+          <p:cNvSpPr/>
+          <p:nvPr/>
+        </p:nvSpPr>
+        <p:spPr bwMode="gray">
+          <a:xfrm>
+            <a:off x="9375019" y="3840520"/>
+            <a:ext cx="1208595" cy="773906"/>
+          </a:xfrm>
+          <a:prstGeom prst="rect">
+            <a:avLst/>
+          </a:prstGeom>
+          <a:ln>
+            <a:headEnd/>
+            <a:tailEnd/>
+          </a:ln>
+        </p:spPr>
+        <p:style>
+          <a:lnRef idx="2">
+            <a:schemeClr val="accent2">
+              <a:shade val="50000"/>
+            </a:schemeClr>
+          </a:lnRef>
+          <a:fillRef idx="1">
+            <a:schemeClr val="accent2"/>
+          </a:fillRef>
+          <a:effectRef idx="0">
+            <a:schemeClr val="accent2"/>
+          </a:effectRef>
+          <a:fontRef idx="minor">
+            <a:schemeClr val="lt1"/>
+          </a:fontRef>
+        </p:style>
+        <p:txBody>
+          <a:bodyPr lIns="90000" tIns="72000" rIns="90000" bIns="72000" rtlCol="0" anchor="ctr"/>
+          <a:lstStyle/>
+          <a:p>
+            <a:pPr marR="0" algn="ctr" defTabSz="914400" eaLnBrk="1" fontAlgn="base" latinLnBrk="0" hangingPunct="1">
+              <a:lnSpc>
+                <a:spcPct val="100000"/>
+              </a:lnSpc>
+              <a:spcBef>
+                <a:spcPct val="50000"/>
+              </a:spcBef>
+              <a:spcAft>
+                <a:spcPct val="0"/>
+              </a:spcAft>
+              <a:buClr>
+                <a:srgbClr val="F0AB00"/>
+              </a:buClr>
+              <a:buSzPct val="80000"/>
+              <a:tabLst/>
+            </a:pPr>
+            <a:r>
+              <a:rPr lang="de-DE" sz="1600" b="1" kern="0" noProof="0" dirty="0">
+                <a:ea typeface="Arial Unicode MS" pitchFamily="34" charset="-128"/>
+                <a:cs typeface="Arial Unicode MS" pitchFamily="34" charset="-128"/>
+              </a:rPr>
+              <a:t>Container</a:t>
+            </a:r>
+            <a:endParaRPr kumimoji="0" lang="de-DE" sz="1600" b="1" i="0" u="none" strike="noStrike" kern="0" cap="none" spc="0" normalizeH="0" baseline="0" noProof="0" dirty="0">
+              <a:ln>
+                <a:noFill/>
+              </a:ln>
+              <a:effectLst/>
+              <a:uLnTx/>
+              <a:uFillTx/>
+              <a:ea typeface="Arial Unicode MS" pitchFamily="34" charset="-128"/>
+              <a:cs typeface="Arial Unicode MS" pitchFamily="34" charset="-128"/>
+            </a:endParaRPr>
+          </a:p>
+        </p:txBody>
+      </p:sp>
+      <p:sp>
+        <p:nvSpPr>
+          <p:cNvPr id="41" name="Rectangle 40">
+            <a:extLst>
+              <a:ext uri="{FF2B5EF4-FFF2-40B4-BE49-F238E27FC236}">
+                <a16:creationId xmlns:a16="http://schemas.microsoft.com/office/drawing/2014/main" id="{191F07E6-1C1C-441B-A55F-1EF0A8C1F0F2}"/>
+              </a:ext>
+            </a:extLst>
+          </p:cNvPr>
+          <p:cNvSpPr/>
+          <p:nvPr/>
+        </p:nvSpPr>
+        <p:spPr bwMode="gray">
+          <a:xfrm>
+            <a:off x="9360476" y="2788712"/>
+            <a:ext cx="1237682" cy="434340"/>
+          </a:xfrm>
+          <a:prstGeom prst="rect">
+            <a:avLst/>
+          </a:prstGeom>
+          <a:ln>
+            <a:headEnd/>
+            <a:tailEnd/>
+          </a:ln>
+        </p:spPr>
+        <p:style>
+          <a:lnRef idx="2">
+            <a:schemeClr val="accent2">
+              <a:shade val="50000"/>
+            </a:schemeClr>
+          </a:lnRef>
+          <a:fillRef idx="1">
+            <a:schemeClr val="accent2"/>
+          </a:fillRef>
+          <a:effectRef idx="0">
+            <a:schemeClr val="accent2"/>
+          </a:effectRef>
+          <a:fontRef idx="minor">
+            <a:schemeClr val="lt1"/>
+          </a:fontRef>
+        </p:style>
+        <p:txBody>
+          <a:bodyPr lIns="90000" tIns="72000" rIns="90000" bIns="72000" rtlCol="0" anchor="ctr"/>
+          <a:lstStyle/>
+          <a:p>
+            <a:pPr marR="0" algn="ctr" defTabSz="914400" eaLnBrk="1" fontAlgn="base" latinLnBrk="0" hangingPunct="1">
+              <a:lnSpc>
+                <a:spcPct val="100000"/>
+              </a:lnSpc>
+              <a:spcBef>
+                <a:spcPct val="50000"/>
+              </a:spcBef>
+              <a:spcAft>
+                <a:spcPct val="0"/>
+              </a:spcAft>
+              <a:buClr>
+                <a:srgbClr val="F0AB00"/>
+              </a:buClr>
+              <a:buSzPct val="80000"/>
+              <a:tabLst/>
+            </a:pPr>
+            <a:r>
+              <a:rPr lang="de-DE" sz="1600" kern="0" dirty="0" err="1">
+                <a:ea typeface="Arial Unicode MS" pitchFamily="34" charset="-128"/>
+                <a:cs typeface="Arial Unicode MS" pitchFamily="34" charset="-128"/>
+              </a:rPr>
+              <a:t>proxy</a:t>
+            </a:r>
+            <a:endParaRPr kumimoji="0" lang="de-DE" sz="1600" i="0" u="none" strike="noStrike" kern="0" cap="none" spc="0" normalizeH="0" baseline="0" noProof="0" dirty="0">
+              <a:ln>
+                <a:noFill/>
+              </a:ln>
+              <a:effectLst/>
+              <a:uLnTx/>
+              <a:uFillTx/>
+              <a:ea typeface="Arial Unicode MS" pitchFamily="34" charset="-128"/>
+              <a:cs typeface="Arial Unicode MS" pitchFamily="34" charset="-128"/>
+            </a:endParaRPr>
+          </a:p>
+        </p:txBody>
+      </p:sp>
+      <p:cxnSp>
+        <p:nvCxnSpPr>
+          <p:cNvPr id="46" name="Straight Arrow Connector 45">
+            <a:extLst>
+              <a:ext uri="{FF2B5EF4-FFF2-40B4-BE49-F238E27FC236}">
+                <a16:creationId xmlns:a16="http://schemas.microsoft.com/office/drawing/2014/main" id="{B6E2B7DC-7459-4EA2-97E3-D505020D8F79}"/>
+              </a:ext>
+            </a:extLst>
+          </p:cNvPr>
+          <p:cNvCxnSpPr>
+            <a:stCxn id="38" idx="2"/>
+            <a:endCxn id="39" idx="0"/>
+          </p:cNvCxnSpPr>
+          <p:nvPr/>
+        </p:nvCxnSpPr>
+        <p:spPr>
+          <a:xfrm>
+            <a:off x="8103349" y="3216814"/>
+            <a:ext cx="19308" cy="623706"/>
+          </a:xfrm>
+          <a:prstGeom prst="straightConnector1">
+            <a:avLst/>
+          </a:prstGeom>
+          <a:ln w="38100">
+            <a:solidFill>
+              <a:schemeClr val="accent1"/>
+            </a:solidFill>
+            <a:headEnd type="none" w="med" len="med"/>
+            <a:tailEnd type="triangle" w="med" len="med"/>
+          </a:ln>
+        </p:spPr>
+        <p:style>
+          <a:lnRef idx="1">
+            <a:schemeClr val="accent1"/>
+          </a:lnRef>
+          <a:fillRef idx="0">
+            <a:schemeClr val="accent1"/>
+          </a:fillRef>
+          <a:effectRef idx="0">
+            <a:schemeClr val="accent1"/>
+          </a:effectRef>
+          <a:fontRef idx="minor">
+            <a:schemeClr val="tx1"/>
+          </a:fontRef>
+        </p:style>
+      </p:cxnSp>
+      <p:cxnSp>
+        <p:nvCxnSpPr>
+          <p:cNvPr id="47" name="Straight Arrow Connector 46">
+            <a:extLst>
+              <a:ext uri="{FF2B5EF4-FFF2-40B4-BE49-F238E27FC236}">
+                <a16:creationId xmlns:a16="http://schemas.microsoft.com/office/drawing/2014/main" id="{BCF2F381-F004-4A0E-9AE9-D5725B07F9B9}"/>
+              </a:ext>
+            </a:extLst>
+          </p:cNvPr>
+          <p:cNvCxnSpPr>
+            <a:stCxn id="38" idx="2"/>
+            <a:endCxn id="40" idx="0"/>
+          </p:cNvCxnSpPr>
+          <p:nvPr/>
+        </p:nvCxnSpPr>
+        <p:spPr>
+          <a:xfrm>
+            <a:off x="8103349" y="3216814"/>
+            <a:ext cx="1875968" cy="623706"/>
+          </a:xfrm>
+          <a:prstGeom prst="straightConnector1">
+            <a:avLst/>
+          </a:prstGeom>
+          <a:ln w="38100">
+            <a:solidFill>
+              <a:schemeClr val="accent1"/>
+            </a:solidFill>
+            <a:headEnd type="none" w="med" len="med"/>
+            <a:tailEnd type="triangle" w="med" len="med"/>
+          </a:ln>
+        </p:spPr>
+        <p:style>
+          <a:lnRef idx="1">
+            <a:schemeClr val="accent1"/>
+          </a:lnRef>
+          <a:fillRef idx="0">
+            <a:schemeClr val="accent1"/>
+          </a:fillRef>
+          <a:effectRef idx="0">
+            <a:schemeClr val="accent1"/>
+          </a:effectRef>
+          <a:fontRef idx="minor">
+            <a:schemeClr val="tx1"/>
+          </a:fontRef>
+        </p:style>
+      </p:cxnSp>
+      <p:sp>
+        <p:nvSpPr>
+          <p:cNvPr id="49" name="Rectangle: Rounded Corners 48">
+            <a:extLst>
+              <a:ext uri="{FF2B5EF4-FFF2-40B4-BE49-F238E27FC236}">
+                <a16:creationId xmlns:a16="http://schemas.microsoft.com/office/drawing/2014/main" id="{B1C1FD03-CCDD-4667-B60B-8BA9C18D41CF}"/>
+              </a:ext>
+            </a:extLst>
+          </p:cNvPr>
+          <p:cNvSpPr/>
+          <p:nvPr/>
+        </p:nvSpPr>
+        <p:spPr bwMode="gray">
+          <a:xfrm>
+            <a:off x="7421347" y="3639487"/>
+            <a:ext cx="1402246" cy="1403553"/>
+          </a:xfrm>
+          <a:prstGeom prst="roundRect">
+            <a:avLst/>
+          </a:prstGeom>
+          <a:noFill/>
+          <a:ln w="19050" algn="ctr">
+            <a:solidFill>
+              <a:schemeClr val="tx1"/>
+            </a:solidFill>
+            <a:prstDash val="dash"/>
+            <a:miter lim="800000"/>
+            <a:headEnd/>
+            <a:tailEnd/>
+          </a:ln>
+        </p:spPr>
+        <p:txBody>
+          <a:bodyPr lIns="90000" tIns="72000" rIns="90000" bIns="72000" rtlCol="0" anchor="b"/>
+          <a:lstStyle/>
+          <a:p>
+            <a:pPr marR="0" algn="ctr" defTabSz="914400" eaLnBrk="1" fontAlgn="base" latinLnBrk="0" hangingPunct="1">
+              <a:lnSpc>
+                <a:spcPct val="100000"/>
+              </a:lnSpc>
+              <a:spcBef>
+                <a:spcPct val="50000"/>
+              </a:spcBef>
+              <a:spcAft>
+                <a:spcPct val="0"/>
+              </a:spcAft>
+              <a:buClr>
+                <a:srgbClr val="F0AB00"/>
+              </a:buClr>
+              <a:buSzPct val="80000"/>
+              <a:tabLst/>
+            </a:pPr>
+            <a:r>
+              <a:rPr kumimoji="0" lang="en-US" sz="1800" b="0" i="0" u="none" strike="noStrike" kern="0" cap="none" spc="0" normalizeH="0" baseline="0" noProof="0" dirty="0">
+                <a:ln>
+                  <a:noFill/>
+                </a:ln>
+                <a:effectLst/>
+                <a:uLnTx/>
+                <a:uFillTx/>
+                <a:ea typeface="Arial Unicode MS" pitchFamily="34" charset="-128"/>
+                <a:cs typeface="Arial Unicode MS" pitchFamily="34" charset="-128"/>
+              </a:rPr>
+              <a:t>Pod</a:t>
+            </a:r>
+          </a:p>
+        </p:txBody>
+      </p:sp>
+      <p:sp>
+        <p:nvSpPr>
+          <p:cNvPr id="50" name="Rectangle: Rounded Corners 49">
+            <a:extLst>
+              <a:ext uri="{FF2B5EF4-FFF2-40B4-BE49-F238E27FC236}">
+                <a16:creationId xmlns:a16="http://schemas.microsoft.com/office/drawing/2014/main" id="{7AC3DDD0-A7F3-4AA9-8C17-9FB26547FF54}"/>
+              </a:ext>
+            </a:extLst>
+          </p:cNvPr>
+          <p:cNvSpPr/>
+          <p:nvPr/>
+        </p:nvSpPr>
+        <p:spPr bwMode="gray">
+          <a:xfrm>
+            <a:off x="9292738" y="3636368"/>
+            <a:ext cx="1402246" cy="1403553"/>
+          </a:xfrm>
+          <a:prstGeom prst="roundRect">
+            <a:avLst/>
+          </a:prstGeom>
+          <a:noFill/>
+          <a:ln w="19050" algn="ctr">
+            <a:solidFill>
+              <a:schemeClr val="tx1"/>
+            </a:solidFill>
+            <a:prstDash val="dash"/>
+            <a:miter lim="800000"/>
+            <a:headEnd/>
+            <a:tailEnd/>
+          </a:ln>
+        </p:spPr>
+        <p:txBody>
+          <a:bodyPr lIns="90000" tIns="72000" rIns="90000" bIns="72000" rtlCol="0" anchor="b"/>
+          <a:lstStyle/>
+          <a:p>
+            <a:pPr marR="0" algn="ctr" defTabSz="914400" eaLnBrk="1" fontAlgn="base" latinLnBrk="0" hangingPunct="1">
+              <a:lnSpc>
+                <a:spcPct val="100000"/>
+              </a:lnSpc>
+              <a:spcBef>
+                <a:spcPct val="50000"/>
+              </a:spcBef>
+              <a:spcAft>
+                <a:spcPct val="0"/>
+              </a:spcAft>
+              <a:buClr>
+                <a:srgbClr val="F0AB00"/>
+              </a:buClr>
+              <a:buSzPct val="80000"/>
+              <a:tabLst/>
+            </a:pPr>
+            <a:r>
+              <a:rPr kumimoji="0" lang="en-US" sz="1800" b="0" i="0" u="none" strike="noStrike" kern="0" cap="none" spc="0" normalizeH="0" baseline="0" noProof="0" dirty="0">
+                <a:ln>
+                  <a:noFill/>
+                </a:ln>
+                <a:effectLst/>
+                <a:uLnTx/>
+                <a:uFillTx/>
+                <a:ea typeface="Arial Unicode MS" pitchFamily="34" charset="-128"/>
+                <a:cs typeface="Arial Unicode MS" pitchFamily="34" charset="-128"/>
+              </a:rPr>
+              <a:t>Pod</a:t>
+            </a:r>
+          </a:p>
+        </p:txBody>
+      </p:sp>
+      <p:cxnSp>
+        <p:nvCxnSpPr>
+          <p:cNvPr id="25" name="Straight Arrow Connector 24"/>
+          <p:cNvCxnSpPr>
+            <a:cxnSpLocks/>
+            <a:endCxn id="38" idx="1"/>
+          </p:cNvCxnSpPr>
+          <p:nvPr/>
+        </p:nvCxnSpPr>
+        <p:spPr>
+          <a:xfrm flipV="1">
+            <a:off x="3563431" y="2999644"/>
+            <a:ext cx="3921077" cy="2636"/>
+          </a:xfrm>
+          <a:prstGeom prst="straightConnector1">
+            <a:avLst/>
+          </a:prstGeom>
+          <a:ln w="57150">
+            <a:solidFill>
+              <a:schemeClr val="accent1"/>
+            </a:solidFill>
+            <a:headEnd type="triangle"/>
+            <a:tailEnd type="triangle"/>
+          </a:ln>
+        </p:spPr>
+        <p:style>
+          <a:lnRef idx="1">
+            <a:schemeClr val="accent1"/>
+          </a:lnRef>
+          <a:fillRef idx="0">
+            <a:schemeClr val="accent1"/>
+          </a:fillRef>
+          <a:effectRef idx="0">
+            <a:schemeClr val="accent1"/>
           </a:effectRef>
           <a:fontRef idx="minor">
             <a:schemeClr val="tx1"/>
@@ -29378,7 +30254,7 @@
                                           </p:stCondLst>
                                         </p:cTn>
                                         <p:tgtEl>
-                                          <p:spTgt spid="53"/>
+                                          <p:spTgt spid="46"/>
                                         </p:tgtEl>
                                         <p:attrNameLst>
                                           <p:attrName>style.visibility</p:attrName>
@@ -29392,7 +30268,7 @@
                                 </p:cTn>
                               </p:par>
                               <p:par>
-                                <p:cTn id="25" presetID="1" presetClass="entr" presetSubtype="0" fill="hold" nodeType="withEffect">
+                                <p:cTn id="25" presetID="1" presetClass="entr" presetSubtype="0" fill="hold" grpId="0" nodeType="withEffect">
                                   <p:stCondLst>
                                     <p:cond delay="0"/>
                                   </p:stCondLst>
@@ -29405,7 +30281,142 @@
                                           </p:stCondLst>
                                         </p:cTn>
                                         <p:tgtEl>
-                                          <p:spTgt spid="57"/>
+                                          <p:spTgt spid="39"/>
+                                        </p:tgtEl>
+                                        <p:attrNameLst>
+                                          <p:attrName>style.visibility</p:attrName>
+                                        </p:attrNameLst>
+                                      </p:cBhvr>
+                                      <p:to>
+                                        <p:strVal val="visible"/>
+                                      </p:to>
+                                    </p:set>
+                                  </p:childTnLst>
+                                </p:cTn>
+                              </p:par>
+                              <p:par>
+                                <p:cTn id="27" presetID="1" presetClass="entr" presetSubtype="0" fill="hold" grpId="0" nodeType="withEffect">
+                                  <p:stCondLst>
+                                    <p:cond delay="0"/>
+                                  </p:stCondLst>
+                                  <p:childTnLst>
+                                    <p:set>
+                                      <p:cBhvr>
+                                        <p:cTn id="28" dur="1" fill="hold">
+                                          <p:stCondLst>
+                                            <p:cond delay="0"/>
+                                          </p:stCondLst>
+                                        </p:cTn>
+                                        <p:tgtEl>
+                                          <p:spTgt spid="49"/>
+                                        </p:tgtEl>
+                                        <p:attrNameLst>
+                                          <p:attrName>style.visibility</p:attrName>
+                                        </p:attrNameLst>
+                                      </p:cBhvr>
+                                      <p:to>
+                                        <p:strVal val="visible"/>
+                                      </p:to>
+                                    </p:set>
+                                  </p:childTnLst>
+                                </p:cTn>
+                              </p:par>
+                            </p:childTnLst>
+                          </p:cTn>
+                        </p:par>
+                        <p:par>
+                          <p:cTn id="29" fill="hold">
+                            <p:stCondLst>
+                              <p:cond delay="0"/>
+                            </p:stCondLst>
+                            <p:childTnLst>
+                              <p:par>
+                                <p:cTn id="30" presetID="1" presetClass="entr" presetSubtype="0" fill="hold" grpId="0" nodeType="afterEffect">
+                                  <p:stCondLst>
+                                    <p:cond delay="0"/>
+                                  </p:stCondLst>
+                                  <p:childTnLst>
+                                    <p:set>
+                                      <p:cBhvr>
+                                        <p:cTn id="31" dur="1" fill="hold">
+                                          <p:stCondLst>
+                                            <p:cond delay="0"/>
+                                          </p:stCondLst>
+                                        </p:cTn>
+                                        <p:tgtEl>
+                                          <p:spTgt spid="50"/>
+                                        </p:tgtEl>
+                                        <p:attrNameLst>
+                                          <p:attrName>style.visibility</p:attrName>
+                                        </p:attrNameLst>
+                                      </p:cBhvr>
+                                      <p:to>
+                                        <p:strVal val="visible"/>
+                                      </p:to>
+                                    </p:set>
+                                  </p:childTnLst>
+                                </p:cTn>
+                              </p:par>
+                            </p:childTnLst>
+                          </p:cTn>
+                        </p:par>
+                        <p:par>
+                          <p:cTn id="32" fill="hold">
+                            <p:stCondLst>
+                              <p:cond delay="0"/>
+                            </p:stCondLst>
+                            <p:childTnLst>
+                              <p:par>
+                                <p:cTn id="33" presetID="1" presetClass="entr" presetSubtype="0" fill="hold" nodeType="afterEffect">
+                                  <p:stCondLst>
+                                    <p:cond delay="0"/>
+                                  </p:stCondLst>
+                                  <p:childTnLst>
+                                    <p:set>
+                                      <p:cBhvr>
+                                        <p:cTn id="34" dur="1" fill="hold">
+                                          <p:stCondLst>
+                                            <p:cond delay="0"/>
+                                          </p:stCondLst>
+                                        </p:cTn>
+                                        <p:tgtEl>
+                                          <p:spTgt spid="47"/>
+                                        </p:tgtEl>
+                                        <p:attrNameLst>
+                                          <p:attrName>style.visibility</p:attrName>
+                                        </p:attrNameLst>
+                                      </p:cBhvr>
+                                      <p:to>
+                                        <p:strVal val="visible"/>
+                                      </p:to>
+                                    </p:set>
+                                  </p:childTnLst>
+                                </p:cTn>
+                              </p:par>
+                            </p:childTnLst>
+                          </p:cTn>
+                        </p:par>
+                        <p:par>
+                          <p:cTn id="35" fill="hold">
+                            <p:stCondLst>
+                              <p:cond delay="0"/>
+                            </p:stCondLst>
+                            <p:childTnLst>
+                              <p:par>
+                                <p:cTn id="36" presetID="1" presetClass="entr" presetSubtype="0" fill="hold" grpId="0" nodeType="afterEffect">
+                                  <p:stCondLst>
+                                    <p:cond delay="0"/>
+                                  </p:stCondLst>
+                                  <p:childTnLst>
+                                    <p:set>
+                                      <p:cBhvr>
+                                        <p:cTn id="37" dur="1" fill="hold">
+                                          <p:stCondLst>
+                                            <p:cond delay="0"/>
+                                          </p:stCondLst>
+                                        </p:cTn>
+                                        <p:tgtEl>
+                                          <p:spTgt spid="40"/>
                                         </p:tgtEl>
                                         <p:attrNameLst>
                                           <p:attrName>style.visibility</p:attrName>
@@ -29445,6 +30456,12 @@
         </p:cTn>
       </p:par>
     </p:tnLst>
+    <p:bldLst>
+      <p:bldP spid="39" grpId="0" animBg="1"/>
+      <p:bldP spid="40" grpId="0" animBg="1"/>
+      <p:bldP spid="49" grpId="0" animBg="1"/>
+      <p:bldP spid="50" grpId="0" animBg="1"/>
+    </p:bldLst>
   </p:timing>
 </p:sld>
 </file>

</xml_diff>

<commit_message>
small changes for minion slide
</commit_message>
<xml_diff>
--- a/kubernetes/01_k8s_core_components.pptx
+++ b/kubernetes/01_k8s_core_components.pptx
@@ -4163,7 +4163,7 @@
           <a:bodyPr/>
           <a:lstStyle/>
           <a:p>
-            <a:endParaRPr lang="en-US"/>
+            <a:endParaRPr lang="en-US" dirty="0"/>
           </a:p>
         </p:txBody>
       </p:sp>
@@ -33409,7 +33409,7 @@
           <a:p>
             <a:r>
               <a:rPr lang="en-US" dirty="0"/>
-              <a:t>What happens if we run </a:t>
+              <a:t>What happens, when “run </a:t>
             </a:r>
             <a:r>
               <a:rPr lang="en-US" dirty="0" err="1"/>
@@ -33417,7 +33417,7 @@
             </a:r>
             <a:r>
               <a:rPr lang="en-US" dirty="0"/>
-              <a:t>?</a:t>
+              <a:t>” is declared?</a:t>
             </a:r>
           </a:p>
         </p:txBody>
@@ -44247,11 +44247,11 @@
               <a:tabLst/>
             </a:pPr>
             <a:r>
-              <a:rPr lang="de-DE" sz="1800" b="1" kern="0" noProof="0" dirty="0" err="1">
+              <a:rPr lang="de-DE" sz="1800" b="1" kern="0" noProof="0" dirty="0">
                 <a:ea typeface="Arial Unicode MS" pitchFamily="34" charset="-128"/>
                 <a:cs typeface="Arial Unicode MS" pitchFamily="34" charset="-128"/>
               </a:rPr>
-              <a:t>kubectl</a:t>
+              <a:t>User</a:t>
             </a:r>
             <a:endParaRPr kumimoji="0" lang="de-DE" sz="1800" b="1" i="0" u="none" strike="noStrike" kern="0" cap="none" spc="0" normalizeH="0" baseline="0" noProof="0" dirty="0">
               <a:ln>
@@ -44577,6 +44577,294 @@
   <p:clrMapOvr>
     <a:masterClrMapping/>
   </p:clrMapOvr>
+  <p:timing>
+    <p:tnLst>
+      <p:par>
+        <p:cTn id="1" dur="indefinite" restart="never" nodeType="tmRoot">
+          <p:childTnLst>
+            <p:seq concurrent="1" nextAc="seek">
+              <p:cTn id="2" dur="indefinite" nodeType="mainSeq">
+                <p:childTnLst>
+                  <p:par>
+                    <p:cTn id="3" fill="hold">
+                      <p:stCondLst>
+                        <p:cond delay="indefinite"/>
+                      </p:stCondLst>
+                      <p:childTnLst>
+                        <p:par>
+                          <p:cTn id="4" fill="hold">
+                            <p:stCondLst>
+                              <p:cond delay="0"/>
+                            </p:stCondLst>
+                            <p:childTnLst>
+                              <p:par>
+                                <p:cTn id="5" presetID="1" presetClass="entr" presetSubtype="0" fill="hold" nodeType="clickEffect">
+                                  <p:stCondLst>
+                                    <p:cond delay="0"/>
+                                  </p:stCondLst>
+                                  <p:childTnLst>
+                                    <p:set>
+                                      <p:cBhvr>
+                                        <p:cTn id="6" dur="1" fill="hold">
+                                          <p:stCondLst>
+                                            <p:cond delay="0"/>
+                                          </p:stCondLst>
+                                        </p:cTn>
+                                        <p:tgtEl>
+                                          <p:spTgt spid="11"/>
+                                        </p:tgtEl>
+                                        <p:attrNameLst>
+                                          <p:attrName>style.visibility</p:attrName>
+                                        </p:attrNameLst>
+                                      </p:cBhvr>
+                                      <p:to>
+                                        <p:strVal val="visible"/>
+                                      </p:to>
+                                    </p:set>
+                                  </p:childTnLst>
+                                </p:cTn>
+                              </p:par>
+                              <p:par>
+                                <p:cTn id="7" presetID="1" presetClass="entr" presetSubtype="0" fill="hold" nodeType="withEffect">
+                                  <p:stCondLst>
+                                    <p:cond delay="0"/>
+                                  </p:stCondLst>
+                                  <p:childTnLst>
+                                    <p:set>
+                                      <p:cBhvr>
+                                        <p:cTn id="8" dur="1" fill="hold">
+                                          <p:stCondLst>
+                                            <p:cond delay="0"/>
+                                          </p:stCondLst>
+                                        </p:cTn>
+                                        <p:tgtEl>
+                                          <p:spTgt spid="1026"/>
+                                        </p:tgtEl>
+                                        <p:attrNameLst>
+                                          <p:attrName>style.visibility</p:attrName>
+                                        </p:attrNameLst>
+                                      </p:cBhvr>
+                                      <p:to>
+                                        <p:strVal val="visible"/>
+                                      </p:to>
+                                    </p:set>
+                                  </p:childTnLst>
+                                </p:cTn>
+                              </p:par>
+                              <p:par>
+                                <p:cTn id="9" presetID="1" presetClass="entr" presetSubtype="0" fill="hold" grpId="0" nodeType="withEffect">
+                                  <p:stCondLst>
+                                    <p:cond delay="0"/>
+                                  </p:stCondLst>
+                                  <p:childTnLst>
+                                    <p:set>
+                                      <p:cBhvr>
+                                        <p:cTn id="10" dur="1" fill="hold">
+                                          <p:stCondLst>
+                                            <p:cond delay="0"/>
+                                          </p:stCondLst>
+                                        </p:cTn>
+                                        <p:tgtEl>
+                                          <p:spTgt spid="3"/>
+                                        </p:tgtEl>
+                                        <p:attrNameLst>
+                                          <p:attrName>style.visibility</p:attrName>
+                                        </p:attrNameLst>
+                                      </p:cBhvr>
+                                      <p:to>
+                                        <p:strVal val="visible"/>
+                                      </p:to>
+                                    </p:set>
+                                  </p:childTnLst>
+                                </p:cTn>
+                              </p:par>
+                            </p:childTnLst>
+                          </p:cTn>
+                        </p:par>
+                      </p:childTnLst>
+                    </p:cTn>
+                  </p:par>
+                  <p:par>
+                    <p:cTn id="11" fill="hold">
+                      <p:stCondLst>
+                        <p:cond delay="indefinite"/>
+                      </p:stCondLst>
+                      <p:childTnLst>
+                        <p:par>
+                          <p:cTn id="12" fill="hold">
+                            <p:stCondLst>
+                              <p:cond delay="0"/>
+                            </p:stCondLst>
+                            <p:childTnLst>
+                              <p:par>
+                                <p:cTn id="13" presetID="1" presetClass="entr" presetSubtype="0" fill="hold" grpId="0" nodeType="clickEffect">
+                                  <p:stCondLst>
+                                    <p:cond delay="0"/>
+                                  </p:stCondLst>
+                                  <p:childTnLst>
+                                    <p:set>
+                                      <p:cBhvr>
+                                        <p:cTn id="14" dur="1" fill="hold">
+                                          <p:stCondLst>
+                                            <p:cond delay="0"/>
+                                          </p:stCondLst>
+                                        </p:cTn>
+                                        <p:tgtEl>
+                                          <p:spTgt spid="30"/>
+                                        </p:tgtEl>
+                                        <p:attrNameLst>
+                                          <p:attrName>style.visibility</p:attrName>
+                                        </p:attrNameLst>
+                                      </p:cBhvr>
+                                      <p:to>
+                                        <p:strVal val="visible"/>
+                                      </p:to>
+                                    </p:set>
+                                  </p:childTnLst>
+                                </p:cTn>
+                              </p:par>
+                              <p:par>
+                                <p:cTn id="15" presetID="1" presetClass="entr" presetSubtype="0" fill="hold" grpId="0" nodeType="withEffect">
+                                  <p:stCondLst>
+                                    <p:cond delay="0"/>
+                                  </p:stCondLst>
+                                  <p:childTnLst>
+                                    <p:set>
+                                      <p:cBhvr>
+                                        <p:cTn id="16" dur="1" fill="hold">
+                                          <p:stCondLst>
+                                            <p:cond delay="0"/>
+                                          </p:stCondLst>
+                                        </p:cTn>
+                                        <p:tgtEl>
+                                          <p:spTgt spid="29"/>
+                                        </p:tgtEl>
+                                        <p:attrNameLst>
+                                          <p:attrName>style.visibility</p:attrName>
+                                        </p:attrNameLst>
+                                      </p:cBhvr>
+                                      <p:to>
+                                        <p:strVal val="visible"/>
+                                      </p:to>
+                                    </p:set>
+                                  </p:childTnLst>
+                                </p:cTn>
+                              </p:par>
+                              <p:par>
+                                <p:cTn id="17" presetID="1" presetClass="entr" presetSubtype="0" fill="hold" grpId="0" nodeType="withEffect">
+                                  <p:stCondLst>
+                                    <p:cond delay="0"/>
+                                  </p:stCondLst>
+                                  <p:childTnLst>
+                                    <p:set>
+                                      <p:cBhvr>
+                                        <p:cTn id="18" dur="1" fill="hold">
+                                          <p:stCondLst>
+                                            <p:cond delay="0"/>
+                                          </p:stCondLst>
+                                        </p:cTn>
+                                        <p:tgtEl>
+                                          <p:spTgt spid="28"/>
+                                        </p:tgtEl>
+                                        <p:attrNameLst>
+                                          <p:attrName>style.visibility</p:attrName>
+                                        </p:attrNameLst>
+                                      </p:cBhvr>
+                                      <p:to>
+                                        <p:strVal val="visible"/>
+                                      </p:to>
+                                    </p:set>
+                                  </p:childTnLst>
+                                </p:cTn>
+                              </p:par>
+                              <p:par>
+                                <p:cTn id="19" presetID="1" presetClass="entr" presetSubtype="0" fill="hold" nodeType="withEffect">
+                                  <p:stCondLst>
+                                    <p:cond delay="0"/>
+                                  </p:stCondLst>
+                                  <p:childTnLst>
+                                    <p:set>
+                                      <p:cBhvr>
+                                        <p:cTn id="20" dur="1" fill="hold">
+                                          <p:stCondLst>
+                                            <p:cond delay="0"/>
+                                          </p:stCondLst>
+                                        </p:cTn>
+                                        <p:tgtEl>
+                                          <p:spTgt spid="1028"/>
+                                        </p:tgtEl>
+                                        <p:attrNameLst>
+                                          <p:attrName>style.visibility</p:attrName>
+                                        </p:attrNameLst>
+                                      </p:cBhvr>
+                                      <p:to>
+                                        <p:strVal val="visible"/>
+                                      </p:to>
+                                    </p:set>
+                                  </p:childTnLst>
+                                </p:cTn>
+                              </p:par>
+                              <p:par>
+                                <p:cTn id="21" presetID="1" presetClass="entr" presetSubtype="0" fill="hold" nodeType="withEffect">
+                                  <p:stCondLst>
+                                    <p:cond delay="0"/>
+                                  </p:stCondLst>
+                                  <p:childTnLst>
+                                    <p:set>
+                                      <p:cBhvr>
+                                        <p:cTn id="22" dur="1" fill="hold">
+                                          <p:stCondLst>
+                                            <p:cond delay="0"/>
+                                          </p:stCondLst>
+                                        </p:cTn>
+                                        <p:tgtEl>
+                                          <p:spTgt spid="60"/>
+                                        </p:tgtEl>
+                                        <p:attrNameLst>
+                                          <p:attrName>style.visibility</p:attrName>
+                                        </p:attrNameLst>
+                                      </p:cBhvr>
+                                      <p:to>
+                                        <p:strVal val="visible"/>
+                                      </p:to>
+                                    </p:set>
+                                  </p:childTnLst>
+                                </p:cTn>
+                              </p:par>
+                            </p:childTnLst>
+                          </p:cTn>
+                        </p:par>
+                      </p:childTnLst>
+                    </p:cTn>
+                  </p:par>
+                </p:childTnLst>
+              </p:cTn>
+              <p:prevCondLst>
+                <p:cond evt="onPrev" delay="0">
+                  <p:tgtEl>
+                    <p:sldTgt/>
+                  </p:tgtEl>
+                </p:cond>
+              </p:prevCondLst>
+              <p:nextCondLst>
+                <p:cond evt="onNext" delay="0">
+                  <p:tgtEl>
+                    <p:sldTgt/>
+                  </p:tgtEl>
+                </p:cond>
+              </p:nextCondLst>
+            </p:seq>
+          </p:childTnLst>
+        </p:cTn>
+      </p:par>
+    </p:tnLst>
+    <p:bldLst>
+      <p:bldP spid="30" grpId="0" animBg="1"/>
+      <p:bldP spid="29" grpId="0" animBg="1"/>
+      <p:bldP spid="3" grpId="0" animBg="1"/>
+      <p:bldP spid="28" grpId="0" animBg="1"/>
+    </p:bldLst>
+  </p:timing>
 </p:sld>
 </file>
 
@@ -46427,7 +46715,7 @@
 </file>
 
 <file path=ppt/slides/slide7.xml><?xml version="1.0" encoding="utf-8"?>
-<p:sld xmlns:a="http://schemas.openxmlformats.org/drawingml/2006/main" xmlns:r="http://schemas.openxmlformats.org/officeDocument/2006/relationships" xmlns:p="http://schemas.openxmlformats.org/presentationml/2006/main">
+<p:sld xmlns:a="http://schemas.openxmlformats.org/drawingml/2006/main" xmlns:r="http://schemas.openxmlformats.org/officeDocument/2006/relationships" xmlns:p="http://schemas.openxmlformats.org/presentationml/2006/main" show="0">
   <p:cSld>
     <p:spTree>
       <p:nvGrpSpPr>
@@ -46575,7 +46863,7 @@
 </file>
 
 <file path=ppt/slides/slide8.xml><?xml version="1.0" encoding="utf-8"?>
-<p:sld xmlns:a="http://schemas.openxmlformats.org/drawingml/2006/main" xmlns:r="http://schemas.openxmlformats.org/officeDocument/2006/relationships" xmlns:p="http://schemas.openxmlformats.org/presentationml/2006/main">
+<p:sld xmlns:a="http://schemas.openxmlformats.org/drawingml/2006/main" xmlns:r="http://schemas.openxmlformats.org/officeDocument/2006/relationships" xmlns:p="http://schemas.openxmlformats.org/presentationml/2006/main" show="0">
   <p:cSld>
     <p:spTree>
       <p:nvGrpSpPr>
@@ -46768,7 +47056,7 @@
 </file>
 
 <file path=ppt/slides/slide9.xml><?xml version="1.0" encoding="utf-8"?>
-<p:sld xmlns:a="http://schemas.openxmlformats.org/drawingml/2006/main" xmlns:r="http://schemas.openxmlformats.org/officeDocument/2006/relationships" xmlns:p="http://schemas.openxmlformats.org/presentationml/2006/main">
+<p:sld xmlns:a="http://schemas.openxmlformats.org/drawingml/2006/main" xmlns:r="http://schemas.openxmlformats.org/officeDocument/2006/relationships" xmlns:p="http://schemas.openxmlformats.org/presentationml/2006/main" show="0">
   <p:cSld>
     <p:spTree>
       <p:nvGrpSpPr>

</xml_diff>